<commit_message>
added pdf, updated problem statement and approach
</commit_message>
<xml_diff>
--- a/LendingClubCaseStudy.pptx
+++ b/LendingClubCaseStudy.pptx
@@ -6,31 +6,33 @@
   </p:sldMasterIdLst>
   <p:sldIdLst>
     <p:sldId id="257" r:id="rId2"/>
-    <p:sldId id="259" r:id="rId3"/>
-    <p:sldId id="258" r:id="rId4"/>
-    <p:sldId id="260" r:id="rId5"/>
-    <p:sldId id="261" r:id="rId6"/>
-    <p:sldId id="262" r:id="rId7"/>
-    <p:sldId id="263" r:id="rId8"/>
-    <p:sldId id="264" r:id="rId9"/>
-    <p:sldId id="265" r:id="rId10"/>
-    <p:sldId id="266" r:id="rId11"/>
-    <p:sldId id="267" r:id="rId12"/>
-    <p:sldId id="268" r:id="rId13"/>
-    <p:sldId id="269" r:id="rId14"/>
-    <p:sldId id="270" r:id="rId15"/>
-    <p:sldId id="271" r:id="rId16"/>
-    <p:sldId id="272" r:id="rId17"/>
-    <p:sldId id="273" r:id="rId18"/>
-    <p:sldId id="274" r:id="rId19"/>
-    <p:sldId id="275" r:id="rId20"/>
-    <p:sldId id="276" r:id="rId21"/>
-    <p:sldId id="277" r:id="rId22"/>
-    <p:sldId id="278" r:id="rId23"/>
-    <p:sldId id="279" r:id="rId24"/>
-    <p:sldId id="280" r:id="rId25"/>
-    <p:sldId id="281" r:id="rId26"/>
-    <p:sldId id="282" r:id="rId27"/>
+    <p:sldId id="283" r:id="rId3"/>
+    <p:sldId id="284" r:id="rId4"/>
+    <p:sldId id="259" r:id="rId5"/>
+    <p:sldId id="258" r:id="rId6"/>
+    <p:sldId id="260" r:id="rId7"/>
+    <p:sldId id="261" r:id="rId8"/>
+    <p:sldId id="262" r:id="rId9"/>
+    <p:sldId id="263" r:id="rId10"/>
+    <p:sldId id="264" r:id="rId11"/>
+    <p:sldId id="265" r:id="rId12"/>
+    <p:sldId id="266" r:id="rId13"/>
+    <p:sldId id="267" r:id="rId14"/>
+    <p:sldId id="268" r:id="rId15"/>
+    <p:sldId id="269" r:id="rId16"/>
+    <p:sldId id="270" r:id="rId17"/>
+    <p:sldId id="271" r:id="rId18"/>
+    <p:sldId id="272" r:id="rId19"/>
+    <p:sldId id="273" r:id="rId20"/>
+    <p:sldId id="274" r:id="rId21"/>
+    <p:sldId id="275" r:id="rId22"/>
+    <p:sldId id="276" r:id="rId23"/>
+    <p:sldId id="277" r:id="rId24"/>
+    <p:sldId id="278" r:id="rId25"/>
+    <p:sldId id="279" r:id="rId26"/>
+    <p:sldId id="280" r:id="rId27"/>
+    <p:sldId id="281" r:id="rId28"/>
+    <p:sldId id="282" r:id="rId29"/>
   </p:sldIdLst>
   <p:sldSz cx="12192000" cy="6858000"/>
   <p:notesSz cx="6858000" cy="9144000"/>
@@ -135,6 +137,3120 @@
     </p:ext>
   </p:extLst>
 </p:presentation>
+</file>
+
+<file path=ppt/diagrams/colors1.xml><?xml version="1.0" encoding="utf-8"?>
+<dgm:colorsDef xmlns:dgm="http://schemas.openxmlformats.org/drawingml/2006/diagram" xmlns:a="http://schemas.openxmlformats.org/drawingml/2006/main" uniqueId="urn:microsoft.com/office/officeart/2005/8/colors/accent1_2">
+  <dgm:title val=""/>
+  <dgm:desc val=""/>
+  <dgm:catLst>
+    <dgm:cat type="accent1" pri="11200"/>
+  </dgm:catLst>
+  <dgm:styleLbl name="node0">
+    <dgm:fillClrLst meth="repeat">
+      <a:schemeClr val="accent1"/>
+    </dgm:fillClrLst>
+    <dgm:linClrLst meth="repeat">
+      <a:schemeClr val="lt1"/>
+    </dgm:linClrLst>
+    <dgm:effectClrLst/>
+    <dgm:txLinClrLst/>
+    <dgm:txFillClrLst/>
+    <dgm:txEffectClrLst/>
+  </dgm:styleLbl>
+  <dgm:styleLbl name="alignNode1">
+    <dgm:fillClrLst meth="repeat">
+      <a:schemeClr val="accent1"/>
+    </dgm:fillClrLst>
+    <dgm:linClrLst meth="repeat">
+      <a:schemeClr val="accent1"/>
+    </dgm:linClrLst>
+    <dgm:effectClrLst/>
+    <dgm:txLinClrLst/>
+    <dgm:txFillClrLst/>
+    <dgm:txEffectClrLst/>
+  </dgm:styleLbl>
+  <dgm:styleLbl name="node1">
+    <dgm:fillClrLst meth="repeat">
+      <a:schemeClr val="accent1"/>
+    </dgm:fillClrLst>
+    <dgm:linClrLst meth="repeat">
+      <a:schemeClr val="lt1"/>
+    </dgm:linClrLst>
+    <dgm:effectClrLst/>
+    <dgm:txLinClrLst/>
+    <dgm:txFillClrLst/>
+    <dgm:txEffectClrLst/>
+  </dgm:styleLbl>
+  <dgm:styleLbl name="lnNode1">
+    <dgm:fillClrLst meth="repeat">
+      <a:schemeClr val="accent1"/>
+    </dgm:fillClrLst>
+    <dgm:linClrLst meth="repeat">
+      <a:schemeClr val="lt1"/>
+    </dgm:linClrLst>
+    <dgm:effectClrLst/>
+    <dgm:txLinClrLst/>
+    <dgm:txFillClrLst/>
+    <dgm:txEffectClrLst/>
+  </dgm:styleLbl>
+  <dgm:styleLbl name="vennNode1">
+    <dgm:fillClrLst meth="repeat">
+      <a:schemeClr val="accent1">
+        <a:alpha val="50000"/>
+      </a:schemeClr>
+    </dgm:fillClrLst>
+    <dgm:linClrLst meth="repeat">
+      <a:schemeClr val="lt1"/>
+    </dgm:linClrLst>
+    <dgm:effectClrLst/>
+    <dgm:txLinClrLst/>
+    <dgm:txFillClrLst/>
+    <dgm:txEffectClrLst/>
+  </dgm:styleLbl>
+  <dgm:styleLbl name="node2">
+    <dgm:fillClrLst meth="repeat">
+      <a:schemeClr val="accent1"/>
+    </dgm:fillClrLst>
+    <dgm:linClrLst meth="repeat">
+      <a:schemeClr val="lt1"/>
+    </dgm:linClrLst>
+    <dgm:effectClrLst/>
+    <dgm:txLinClrLst/>
+    <dgm:txFillClrLst/>
+    <dgm:txEffectClrLst/>
+  </dgm:styleLbl>
+  <dgm:styleLbl name="node3">
+    <dgm:fillClrLst meth="repeat">
+      <a:schemeClr val="accent1"/>
+    </dgm:fillClrLst>
+    <dgm:linClrLst meth="repeat">
+      <a:schemeClr val="lt1"/>
+    </dgm:linClrLst>
+    <dgm:effectClrLst/>
+    <dgm:txLinClrLst/>
+    <dgm:txFillClrLst/>
+    <dgm:txEffectClrLst/>
+  </dgm:styleLbl>
+  <dgm:styleLbl name="node4">
+    <dgm:fillClrLst meth="repeat">
+      <a:schemeClr val="accent1"/>
+    </dgm:fillClrLst>
+    <dgm:linClrLst meth="repeat">
+      <a:schemeClr val="lt1"/>
+    </dgm:linClrLst>
+    <dgm:effectClrLst/>
+    <dgm:txLinClrLst/>
+    <dgm:txFillClrLst/>
+    <dgm:txEffectClrLst/>
+  </dgm:styleLbl>
+  <dgm:styleLbl name="fgImgPlace1">
+    <dgm:fillClrLst meth="repeat">
+      <a:schemeClr val="accent1">
+        <a:tint val="50000"/>
+      </a:schemeClr>
+    </dgm:fillClrLst>
+    <dgm:linClrLst meth="repeat">
+      <a:schemeClr val="lt1"/>
+    </dgm:linClrLst>
+    <dgm:effectClrLst/>
+    <dgm:txLinClrLst/>
+    <dgm:txFillClrLst meth="repeat">
+      <a:schemeClr val="lt1"/>
+    </dgm:txFillClrLst>
+    <dgm:txEffectClrLst/>
+  </dgm:styleLbl>
+  <dgm:styleLbl name="alignImgPlace1">
+    <dgm:fillClrLst meth="repeat">
+      <a:schemeClr val="accent1">
+        <a:tint val="50000"/>
+      </a:schemeClr>
+    </dgm:fillClrLst>
+    <dgm:linClrLst meth="repeat">
+      <a:schemeClr val="lt1"/>
+    </dgm:linClrLst>
+    <dgm:effectClrLst/>
+    <dgm:txLinClrLst/>
+    <dgm:txFillClrLst meth="repeat">
+      <a:schemeClr val="lt1"/>
+    </dgm:txFillClrLst>
+    <dgm:txEffectClrLst/>
+  </dgm:styleLbl>
+  <dgm:styleLbl name="bgImgPlace1">
+    <dgm:fillClrLst meth="repeat">
+      <a:schemeClr val="accent1">
+        <a:tint val="50000"/>
+      </a:schemeClr>
+    </dgm:fillClrLst>
+    <dgm:linClrLst meth="repeat">
+      <a:schemeClr val="lt1"/>
+    </dgm:linClrLst>
+    <dgm:effectClrLst/>
+    <dgm:txLinClrLst/>
+    <dgm:txFillClrLst meth="repeat">
+      <a:schemeClr val="lt1"/>
+    </dgm:txFillClrLst>
+    <dgm:txEffectClrLst/>
+  </dgm:styleLbl>
+  <dgm:styleLbl name="sibTrans2D1">
+    <dgm:fillClrLst meth="repeat">
+      <a:schemeClr val="accent1">
+        <a:tint val="60000"/>
+      </a:schemeClr>
+    </dgm:fillClrLst>
+    <dgm:linClrLst meth="repeat">
+      <a:schemeClr val="accent1">
+        <a:tint val="60000"/>
+      </a:schemeClr>
+    </dgm:linClrLst>
+    <dgm:effectClrLst/>
+    <dgm:txLinClrLst/>
+    <dgm:txFillClrLst/>
+    <dgm:txEffectClrLst/>
+  </dgm:styleLbl>
+  <dgm:styleLbl name="fgSibTrans2D1">
+    <dgm:fillClrLst meth="repeat">
+      <a:schemeClr val="accent1">
+        <a:tint val="60000"/>
+      </a:schemeClr>
+    </dgm:fillClrLst>
+    <dgm:linClrLst meth="repeat">
+      <a:schemeClr val="accent1">
+        <a:tint val="60000"/>
+      </a:schemeClr>
+    </dgm:linClrLst>
+    <dgm:effectClrLst/>
+    <dgm:txLinClrLst/>
+    <dgm:txFillClrLst/>
+    <dgm:txEffectClrLst/>
+  </dgm:styleLbl>
+  <dgm:styleLbl name="bgSibTrans2D1">
+    <dgm:fillClrLst meth="repeat">
+      <a:schemeClr val="accent1">
+        <a:tint val="60000"/>
+      </a:schemeClr>
+    </dgm:fillClrLst>
+    <dgm:linClrLst meth="repeat">
+      <a:schemeClr val="accent1">
+        <a:tint val="60000"/>
+      </a:schemeClr>
+    </dgm:linClrLst>
+    <dgm:effectClrLst/>
+    <dgm:txLinClrLst/>
+    <dgm:txFillClrLst/>
+    <dgm:txEffectClrLst/>
+  </dgm:styleLbl>
+  <dgm:styleLbl name="sibTrans1D1">
+    <dgm:fillClrLst meth="repeat">
+      <a:schemeClr val="accent1"/>
+    </dgm:fillClrLst>
+    <dgm:linClrLst meth="repeat">
+      <a:schemeClr val="accent1"/>
+    </dgm:linClrLst>
+    <dgm:effectClrLst/>
+    <dgm:txLinClrLst/>
+    <dgm:txFillClrLst meth="repeat">
+      <a:schemeClr val="tx1"/>
+    </dgm:txFillClrLst>
+    <dgm:txEffectClrLst/>
+  </dgm:styleLbl>
+  <dgm:styleLbl name="callout">
+    <dgm:fillClrLst meth="repeat">
+      <a:schemeClr val="accent1"/>
+    </dgm:fillClrLst>
+    <dgm:linClrLst meth="repeat">
+      <a:schemeClr val="accent1">
+        <a:tint val="50000"/>
+      </a:schemeClr>
+    </dgm:linClrLst>
+    <dgm:effectClrLst/>
+    <dgm:txLinClrLst/>
+    <dgm:txFillClrLst meth="repeat">
+      <a:schemeClr val="tx1"/>
+    </dgm:txFillClrLst>
+    <dgm:txEffectClrLst/>
+  </dgm:styleLbl>
+  <dgm:styleLbl name="asst0">
+    <dgm:fillClrLst meth="repeat">
+      <a:schemeClr val="accent1"/>
+    </dgm:fillClrLst>
+    <dgm:linClrLst meth="repeat">
+      <a:schemeClr val="lt1"/>
+    </dgm:linClrLst>
+    <dgm:effectClrLst/>
+    <dgm:txLinClrLst/>
+    <dgm:txFillClrLst/>
+    <dgm:txEffectClrLst/>
+  </dgm:styleLbl>
+  <dgm:styleLbl name="asst1">
+    <dgm:fillClrLst meth="repeat">
+      <a:schemeClr val="accent1"/>
+    </dgm:fillClrLst>
+    <dgm:linClrLst meth="repeat">
+      <a:schemeClr val="lt1"/>
+    </dgm:linClrLst>
+    <dgm:effectClrLst/>
+    <dgm:txLinClrLst/>
+    <dgm:txFillClrLst/>
+    <dgm:txEffectClrLst/>
+  </dgm:styleLbl>
+  <dgm:styleLbl name="asst2">
+    <dgm:fillClrLst meth="repeat">
+      <a:schemeClr val="accent1"/>
+    </dgm:fillClrLst>
+    <dgm:linClrLst meth="repeat">
+      <a:schemeClr val="lt1"/>
+    </dgm:linClrLst>
+    <dgm:effectClrLst/>
+    <dgm:txLinClrLst/>
+    <dgm:txFillClrLst/>
+    <dgm:txEffectClrLst/>
+  </dgm:styleLbl>
+  <dgm:styleLbl name="asst3">
+    <dgm:fillClrLst meth="repeat">
+      <a:schemeClr val="accent1"/>
+    </dgm:fillClrLst>
+    <dgm:linClrLst meth="repeat">
+      <a:schemeClr val="lt1"/>
+    </dgm:linClrLst>
+    <dgm:effectClrLst/>
+    <dgm:txLinClrLst/>
+    <dgm:txFillClrLst/>
+    <dgm:txEffectClrLst/>
+  </dgm:styleLbl>
+  <dgm:styleLbl name="asst4">
+    <dgm:fillClrLst meth="repeat">
+      <a:schemeClr val="accent1"/>
+    </dgm:fillClrLst>
+    <dgm:linClrLst meth="repeat">
+      <a:schemeClr val="lt1"/>
+    </dgm:linClrLst>
+    <dgm:effectClrLst/>
+    <dgm:txLinClrLst/>
+    <dgm:txFillClrLst/>
+    <dgm:txEffectClrLst/>
+  </dgm:styleLbl>
+  <dgm:styleLbl name="parChTrans2D1">
+    <dgm:fillClrLst meth="repeat">
+      <a:schemeClr val="accent1">
+        <a:tint val="60000"/>
+      </a:schemeClr>
+    </dgm:fillClrLst>
+    <dgm:linClrLst meth="repeat">
+      <a:schemeClr val="accent1">
+        <a:tint val="60000"/>
+      </a:schemeClr>
+    </dgm:linClrLst>
+    <dgm:effectClrLst/>
+    <dgm:txLinClrLst/>
+    <dgm:txFillClrLst meth="repeat">
+      <a:schemeClr val="lt1"/>
+    </dgm:txFillClrLst>
+    <dgm:txEffectClrLst/>
+  </dgm:styleLbl>
+  <dgm:styleLbl name="parChTrans2D2">
+    <dgm:fillClrLst meth="repeat">
+      <a:schemeClr val="accent1"/>
+    </dgm:fillClrLst>
+    <dgm:linClrLst meth="repeat">
+      <a:schemeClr val="accent1"/>
+    </dgm:linClrLst>
+    <dgm:effectClrLst/>
+    <dgm:txLinClrLst/>
+    <dgm:txFillClrLst meth="repeat">
+      <a:schemeClr val="lt1"/>
+    </dgm:txFillClrLst>
+    <dgm:txEffectClrLst/>
+  </dgm:styleLbl>
+  <dgm:styleLbl name="parChTrans2D3">
+    <dgm:fillClrLst meth="repeat">
+      <a:schemeClr val="accent1"/>
+    </dgm:fillClrLst>
+    <dgm:linClrLst meth="repeat">
+      <a:schemeClr val="accent1"/>
+    </dgm:linClrLst>
+    <dgm:effectClrLst/>
+    <dgm:txLinClrLst/>
+    <dgm:txFillClrLst meth="repeat">
+      <a:schemeClr val="lt1"/>
+    </dgm:txFillClrLst>
+    <dgm:txEffectClrLst/>
+  </dgm:styleLbl>
+  <dgm:styleLbl name="parChTrans2D4">
+    <dgm:fillClrLst meth="repeat">
+      <a:schemeClr val="accent1"/>
+    </dgm:fillClrLst>
+    <dgm:linClrLst meth="repeat">
+      <a:schemeClr val="accent1"/>
+    </dgm:linClrLst>
+    <dgm:effectClrLst/>
+    <dgm:txLinClrLst/>
+    <dgm:txFillClrLst meth="repeat">
+      <a:schemeClr val="lt1"/>
+    </dgm:txFillClrLst>
+    <dgm:txEffectClrLst/>
+  </dgm:styleLbl>
+  <dgm:styleLbl name="parChTrans1D1">
+    <dgm:fillClrLst meth="repeat">
+      <a:schemeClr val="accent1"/>
+    </dgm:fillClrLst>
+    <dgm:linClrLst meth="repeat">
+      <a:schemeClr val="accent1">
+        <a:shade val="60000"/>
+      </a:schemeClr>
+    </dgm:linClrLst>
+    <dgm:effectClrLst/>
+    <dgm:txLinClrLst/>
+    <dgm:txFillClrLst meth="repeat">
+      <a:schemeClr val="tx1"/>
+    </dgm:txFillClrLst>
+    <dgm:txEffectClrLst/>
+  </dgm:styleLbl>
+  <dgm:styleLbl name="parChTrans1D2">
+    <dgm:fillClrLst meth="repeat">
+      <a:schemeClr val="accent1"/>
+    </dgm:fillClrLst>
+    <dgm:linClrLst meth="repeat">
+      <a:schemeClr val="accent1">
+        <a:shade val="60000"/>
+      </a:schemeClr>
+    </dgm:linClrLst>
+    <dgm:effectClrLst/>
+    <dgm:txLinClrLst/>
+    <dgm:txFillClrLst meth="repeat">
+      <a:schemeClr val="tx1"/>
+    </dgm:txFillClrLst>
+    <dgm:txEffectClrLst/>
+  </dgm:styleLbl>
+  <dgm:styleLbl name="parChTrans1D3">
+    <dgm:fillClrLst meth="repeat">
+      <a:schemeClr val="accent1"/>
+    </dgm:fillClrLst>
+    <dgm:linClrLst meth="repeat">
+      <a:schemeClr val="accent1">
+        <a:shade val="80000"/>
+      </a:schemeClr>
+    </dgm:linClrLst>
+    <dgm:effectClrLst/>
+    <dgm:txLinClrLst/>
+    <dgm:txFillClrLst meth="repeat">
+      <a:schemeClr val="tx1"/>
+    </dgm:txFillClrLst>
+    <dgm:txEffectClrLst/>
+  </dgm:styleLbl>
+  <dgm:styleLbl name="parChTrans1D4">
+    <dgm:fillClrLst meth="repeat">
+      <a:schemeClr val="accent1"/>
+    </dgm:fillClrLst>
+    <dgm:linClrLst meth="repeat">
+      <a:schemeClr val="accent1">
+        <a:shade val="80000"/>
+      </a:schemeClr>
+    </dgm:linClrLst>
+    <dgm:effectClrLst/>
+    <dgm:txLinClrLst/>
+    <dgm:txFillClrLst meth="repeat">
+      <a:schemeClr val="tx1"/>
+    </dgm:txFillClrLst>
+    <dgm:txEffectClrLst/>
+  </dgm:styleLbl>
+  <dgm:styleLbl name="fgAcc1">
+    <dgm:fillClrLst meth="repeat">
+      <a:schemeClr val="lt1">
+        <a:alpha val="90000"/>
+      </a:schemeClr>
+    </dgm:fillClrLst>
+    <dgm:linClrLst meth="repeat">
+      <a:schemeClr val="accent1"/>
+    </dgm:linClrLst>
+    <dgm:effectClrLst/>
+    <dgm:txLinClrLst/>
+    <dgm:txFillClrLst meth="repeat">
+      <a:schemeClr val="dk1"/>
+    </dgm:txFillClrLst>
+    <dgm:txEffectClrLst/>
+  </dgm:styleLbl>
+  <dgm:styleLbl name="conFgAcc1">
+    <dgm:fillClrLst meth="repeat">
+      <a:schemeClr val="lt1">
+        <a:alpha val="90000"/>
+      </a:schemeClr>
+    </dgm:fillClrLst>
+    <dgm:linClrLst meth="repeat">
+      <a:schemeClr val="accent1"/>
+    </dgm:linClrLst>
+    <dgm:effectClrLst/>
+    <dgm:txLinClrLst/>
+    <dgm:txFillClrLst meth="repeat">
+      <a:schemeClr val="dk1"/>
+    </dgm:txFillClrLst>
+    <dgm:txEffectClrLst/>
+  </dgm:styleLbl>
+  <dgm:styleLbl name="alignAcc1">
+    <dgm:fillClrLst meth="repeat">
+      <a:schemeClr val="lt1">
+        <a:alpha val="90000"/>
+      </a:schemeClr>
+    </dgm:fillClrLst>
+    <dgm:linClrLst meth="repeat">
+      <a:schemeClr val="accent1"/>
+    </dgm:linClrLst>
+    <dgm:effectClrLst/>
+    <dgm:txLinClrLst/>
+    <dgm:txFillClrLst meth="repeat">
+      <a:schemeClr val="dk1"/>
+    </dgm:txFillClrLst>
+    <dgm:txEffectClrLst/>
+  </dgm:styleLbl>
+  <dgm:styleLbl name="trAlignAcc1">
+    <dgm:fillClrLst meth="repeat">
+      <a:schemeClr val="lt1">
+        <a:alpha val="40000"/>
+      </a:schemeClr>
+    </dgm:fillClrLst>
+    <dgm:linClrLst meth="repeat">
+      <a:schemeClr val="accent1"/>
+    </dgm:linClrLst>
+    <dgm:effectClrLst/>
+    <dgm:txLinClrLst/>
+    <dgm:txFillClrLst meth="repeat">
+      <a:schemeClr val="dk1"/>
+    </dgm:txFillClrLst>
+    <dgm:txEffectClrLst/>
+  </dgm:styleLbl>
+  <dgm:styleLbl name="bgAcc1">
+    <dgm:fillClrLst meth="repeat">
+      <a:schemeClr val="lt1">
+        <a:alpha val="90000"/>
+      </a:schemeClr>
+    </dgm:fillClrLst>
+    <dgm:linClrLst meth="repeat">
+      <a:schemeClr val="accent1"/>
+    </dgm:linClrLst>
+    <dgm:effectClrLst/>
+    <dgm:txLinClrLst/>
+    <dgm:txFillClrLst meth="repeat">
+      <a:schemeClr val="dk1"/>
+    </dgm:txFillClrLst>
+    <dgm:txEffectClrLst/>
+  </dgm:styleLbl>
+  <dgm:styleLbl name="solidFgAcc1">
+    <dgm:fillClrLst meth="repeat">
+      <a:schemeClr val="lt1"/>
+    </dgm:fillClrLst>
+    <dgm:linClrLst meth="repeat">
+      <a:schemeClr val="accent1"/>
+    </dgm:linClrLst>
+    <dgm:effectClrLst/>
+    <dgm:txLinClrLst/>
+    <dgm:txFillClrLst meth="repeat">
+      <a:schemeClr val="dk1"/>
+    </dgm:txFillClrLst>
+    <dgm:txEffectClrLst/>
+  </dgm:styleLbl>
+  <dgm:styleLbl name="solidAlignAcc1">
+    <dgm:fillClrLst meth="repeat">
+      <a:schemeClr val="lt1"/>
+    </dgm:fillClrLst>
+    <dgm:linClrLst meth="repeat">
+      <a:schemeClr val="accent1"/>
+    </dgm:linClrLst>
+    <dgm:effectClrLst/>
+    <dgm:txLinClrLst/>
+    <dgm:txFillClrLst meth="repeat">
+      <a:schemeClr val="dk1"/>
+    </dgm:txFillClrLst>
+    <dgm:txEffectClrLst/>
+  </dgm:styleLbl>
+  <dgm:styleLbl name="solidBgAcc1">
+    <dgm:fillClrLst meth="repeat">
+      <a:schemeClr val="lt1"/>
+    </dgm:fillClrLst>
+    <dgm:linClrLst meth="repeat">
+      <a:schemeClr val="accent1"/>
+    </dgm:linClrLst>
+    <dgm:effectClrLst/>
+    <dgm:txLinClrLst/>
+    <dgm:txFillClrLst meth="repeat">
+      <a:schemeClr val="dk1"/>
+    </dgm:txFillClrLst>
+    <dgm:txEffectClrLst/>
+  </dgm:styleLbl>
+  <dgm:styleLbl name="fgAccFollowNode1">
+    <dgm:fillClrLst meth="repeat">
+      <a:schemeClr val="accent1">
+        <a:alpha val="90000"/>
+        <a:tint val="40000"/>
+      </a:schemeClr>
+    </dgm:fillClrLst>
+    <dgm:linClrLst meth="repeat">
+      <a:schemeClr val="accent1">
+        <a:alpha val="90000"/>
+        <a:tint val="40000"/>
+      </a:schemeClr>
+    </dgm:linClrLst>
+    <dgm:effectClrLst/>
+    <dgm:txLinClrLst/>
+    <dgm:txFillClrLst meth="repeat">
+      <a:schemeClr val="dk1"/>
+    </dgm:txFillClrLst>
+    <dgm:txEffectClrLst/>
+  </dgm:styleLbl>
+  <dgm:styleLbl name="alignAccFollowNode1">
+    <dgm:fillClrLst meth="repeat">
+      <a:schemeClr val="accent1">
+        <a:alpha val="90000"/>
+        <a:tint val="40000"/>
+      </a:schemeClr>
+    </dgm:fillClrLst>
+    <dgm:linClrLst meth="repeat">
+      <a:schemeClr val="accent1">
+        <a:alpha val="90000"/>
+        <a:tint val="40000"/>
+      </a:schemeClr>
+    </dgm:linClrLst>
+    <dgm:effectClrLst/>
+    <dgm:txLinClrLst/>
+    <dgm:txFillClrLst meth="repeat">
+      <a:schemeClr val="dk1"/>
+    </dgm:txFillClrLst>
+    <dgm:txEffectClrLst/>
+  </dgm:styleLbl>
+  <dgm:styleLbl name="bgAccFollowNode1">
+    <dgm:fillClrLst meth="repeat">
+      <a:schemeClr val="accent1">
+        <a:alpha val="90000"/>
+        <a:tint val="40000"/>
+      </a:schemeClr>
+    </dgm:fillClrLst>
+    <dgm:linClrLst meth="repeat">
+      <a:schemeClr val="accent1">
+        <a:alpha val="90000"/>
+        <a:tint val="40000"/>
+      </a:schemeClr>
+    </dgm:linClrLst>
+    <dgm:effectClrLst/>
+    <dgm:txLinClrLst/>
+    <dgm:txFillClrLst meth="repeat">
+      <a:schemeClr val="dk1"/>
+    </dgm:txFillClrLst>
+    <dgm:txEffectClrLst/>
+  </dgm:styleLbl>
+  <dgm:styleLbl name="fgAcc0">
+    <dgm:fillClrLst meth="repeat">
+      <a:schemeClr val="lt1">
+        <a:alpha val="90000"/>
+      </a:schemeClr>
+    </dgm:fillClrLst>
+    <dgm:linClrLst meth="repeat">
+      <a:schemeClr val="accent1"/>
+    </dgm:linClrLst>
+    <dgm:effectClrLst/>
+    <dgm:txLinClrLst/>
+    <dgm:txFillClrLst meth="repeat">
+      <a:schemeClr val="dk1"/>
+    </dgm:txFillClrLst>
+    <dgm:txEffectClrLst/>
+  </dgm:styleLbl>
+  <dgm:styleLbl name="fgAcc2">
+    <dgm:fillClrLst meth="repeat">
+      <a:schemeClr val="lt1">
+        <a:alpha val="90000"/>
+      </a:schemeClr>
+    </dgm:fillClrLst>
+    <dgm:linClrLst meth="repeat">
+      <a:schemeClr val="accent1"/>
+    </dgm:linClrLst>
+    <dgm:effectClrLst/>
+    <dgm:txLinClrLst/>
+    <dgm:txFillClrLst meth="repeat">
+      <a:schemeClr val="dk1"/>
+    </dgm:txFillClrLst>
+    <dgm:txEffectClrLst/>
+  </dgm:styleLbl>
+  <dgm:styleLbl name="fgAcc3">
+    <dgm:fillClrLst meth="repeat">
+      <a:schemeClr val="lt1">
+        <a:alpha val="90000"/>
+      </a:schemeClr>
+    </dgm:fillClrLst>
+    <dgm:linClrLst meth="repeat">
+      <a:schemeClr val="accent1"/>
+    </dgm:linClrLst>
+    <dgm:effectClrLst/>
+    <dgm:txLinClrLst/>
+    <dgm:txFillClrLst meth="repeat">
+      <a:schemeClr val="dk1"/>
+    </dgm:txFillClrLst>
+    <dgm:txEffectClrLst/>
+  </dgm:styleLbl>
+  <dgm:styleLbl name="fgAcc4">
+    <dgm:fillClrLst meth="repeat">
+      <a:schemeClr val="lt1">
+        <a:alpha val="90000"/>
+      </a:schemeClr>
+    </dgm:fillClrLst>
+    <dgm:linClrLst meth="repeat">
+      <a:schemeClr val="accent1"/>
+    </dgm:linClrLst>
+    <dgm:effectClrLst/>
+    <dgm:txLinClrLst/>
+    <dgm:txFillClrLst meth="repeat">
+      <a:schemeClr val="dk1"/>
+    </dgm:txFillClrLst>
+    <dgm:txEffectClrLst/>
+  </dgm:styleLbl>
+  <dgm:styleLbl name="bgShp">
+    <dgm:fillClrLst meth="repeat">
+      <a:schemeClr val="accent1">
+        <a:tint val="40000"/>
+      </a:schemeClr>
+    </dgm:fillClrLst>
+    <dgm:linClrLst meth="repeat">
+      <a:schemeClr val="accent1"/>
+    </dgm:linClrLst>
+    <dgm:effectClrLst/>
+    <dgm:txLinClrLst/>
+    <dgm:txFillClrLst meth="repeat">
+      <a:schemeClr val="dk1"/>
+    </dgm:txFillClrLst>
+    <dgm:txEffectClrLst/>
+  </dgm:styleLbl>
+  <dgm:styleLbl name="dkBgShp">
+    <dgm:fillClrLst meth="repeat">
+      <a:schemeClr val="accent1">
+        <a:shade val="80000"/>
+      </a:schemeClr>
+    </dgm:fillClrLst>
+    <dgm:linClrLst meth="repeat">
+      <a:schemeClr val="accent1"/>
+    </dgm:linClrLst>
+    <dgm:effectClrLst/>
+    <dgm:txLinClrLst/>
+    <dgm:txFillClrLst meth="repeat">
+      <a:schemeClr val="lt1"/>
+    </dgm:txFillClrLst>
+    <dgm:txEffectClrLst/>
+  </dgm:styleLbl>
+  <dgm:styleLbl name="trBgShp">
+    <dgm:fillClrLst meth="repeat">
+      <a:schemeClr val="accent1">
+        <a:tint val="50000"/>
+        <a:alpha val="40000"/>
+      </a:schemeClr>
+    </dgm:fillClrLst>
+    <dgm:linClrLst meth="repeat">
+      <a:schemeClr val="accent1"/>
+    </dgm:linClrLst>
+    <dgm:effectClrLst/>
+    <dgm:txLinClrLst/>
+    <dgm:txFillClrLst meth="repeat">
+      <a:schemeClr val="lt1"/>
+    </dgm:txFillClrLst>
+    <dgm:txEffectClrLst/>
+  </dgm:styleLbl>
+  <dgm:styleLbl name="fgShp">
+    <dgm:fillClrLst meth="repeat">
+      <a:schemeClr val="accent1">
+        <a:tint val="60000"/>
+      </a:schemeClr>
+    </dgm:fillClrLst>
+    <dgm:linClrLst meth="repeat">
+      <a:schemeClr val="lt1"/>
+    </dgm:linClrLst>
+    <dgm:effectClrLst/>
+    <dgm:txLinClrLst/>
+    <dgm:txFillClrLst meth="repeat">
+      <a:schemeClr val="dk1"/>
+    </dgm:txFillClrLst>
+    <dgm:txEffectClrLst/>
+  </dgm:styleLbl>
+  <dgm:styleLbl name="revTx">
+    <dgm:fillClrLst meth="repeat">
+      <a:schemeClr val="lt1">
+        <a:alpha val="0"/>
+      </a:schemeClr>
+    </dgm:fillClrLst>
+    <dgm:linClrLst meth="repeat">
+      <a:schemeClr val="dk1">
+        <a:alpha val="0"/>
+      </a:schemeClr>
+    </dgm:linClrLst>
+    <dgm:effectClrLst/>
+    <dgm:txLinClrLst/>
+    <dgm:txFillClrLst meth="repeat">
+      <a:schemeClr val="tx1"/>
+    </dgm:txFillClrLst>
+    <dgm:txEffectClrLst/>
+  </dgm:styleLbl>
+</dgm:colorsDef>
+</file>
+
+<file path=ppt/diagrams/data1.xml><?xml version="1.0" encoding="utf-8"?>
+<dgm:dataModel xmlns:dgm="http://schemas.openxmlformats.org/drawingml/2006/diagram" xmlns:a="http://schemas.openxmlformats.org/drawingml/2006/main">
+  <dgm:ptLst>
+    <dgm:pt modelId="{7B387CE5-37AB-3446-9F9C-AEEDF56223A0}" type="doc">
+      <dgm:prSet loTypeId="urn:microsoft.com/office/officeart/2005/8/layout/process3" loCatId="" qsTypeId="urn:microsoft.com/office/officeart/2005/8/quickstyle/simple1" qsCatId="simple" csTypeId="urn:microsoft.com/office/officeart/2005/8/colors/accent1_2" csCatId="accent1" phldr="1"/>
+      <dgm:spPr/>
+      <dgm:t>
+        <a:bodyPr/>
+        <a:lstStyle/>
+        <a:p>
+          <a:endParaRPr lang="en-GB"/>
+        </a:p>
+      </dgm:t>
+    </dgm:pt>
+    <dgm:pt modelId="{45BA8630-E9F5-864C-A7A2-8234F0DB15F6}">
+      <dgm:prSet phldrT="[Text]"/>
+      <dgm:spPr/>
+      <dgm:t>
+        <a:bodyPr/>
+        <a:lstStyle/>
+        <a:p>
+          <a:r>
+            <a:rPr lang="en-GB" dirty="0"/>
+            <a:t>Data Understanding</a:t>
+          </a:r>
+        </a:p>
+      </dgm:t>
+    </dgm:pt>
+    <dgm:pt modelId="{39937D44-F614-7E48-B3A0-BF63D0C0FF30}" type="parTrans" cxnId="{2570EB36-41B4-7042-8377-60AEA35F5D39}">
+      <dgm:prSet/>
+      <dgm:spPr/>
+      <dgm:t>
+        <a:bodyPr/>
+        <a:lstStyle/>
+        <a:p>
+          <a:endParaRPr lang="en-GB"/>
+        </a:p>
+      </dgm:t>
+    </dgm:pt>
+    <dgm:pt modelId="{6C8661BC-EC78-EE4C-B218-C58E7510FE9F}" type="sibTrans" cxnId="{2570EB36-41B4-7042-8377-60AEA35F5D39}">
+      <dgm:prSet/>
+      <dgm:spPr/>
+      <dgm:t>
+        <a:bodyPr/>
+        <a:lstStyle/>
+        <a:p>
+          <a:endParaRPr lang="en-GB"/>
+        </a:p>
+      </dgm:t>
+    </dgm:pt>
+    <dgm:pt modelId="{C6ACA521-14E7-1941-ACC6-F67CEE3CFE5E}">
+      <dgm:prSet phldrT="[Text]"/>
+      <dgm:spPr/>
+      <dgm:t>
+        <a:bodyPr/>
+        <a:lstStyle/>
+        <a:p>
+          <a:r>
+            <a:rPr lang="en-GB" dirty="0"/>
+            <a:t>Using given dictionary and excel understand data in </a:t>
+          </a:r>
+          <a:r>
+            <a:rPr lang="en-GB" dirty="0" err="1"/>
+            <a:t>loan.csv</a:t>
+          </a:r>
+          <a:endParaRPr lang="en-GB" dirty="0"/>
+        </a:p>
+      </dgm:t>
+    </dgm:pt>
+    <dgm:pt modelId="{1A2FF7B8-839A-A14A-A2B8-D501E9574800}" type="parTrans" cxnId="{C6D6AF6F-F66E-B845-BB33-C3D0EEE3C24B}">
+      <dgm:prSet/>
+      <dgm:spPr/>
+      <dgm:t>
+        <a:bodyPr/>
+        <a:lstStyle/>
+        <a:p>
+          <a:endParaRPr lang="en-GB"/>
+        </a:p>
+      </dgm:t>
+    </dgm:pt>
+    <dgm:pt modelId="{F3524A3E-7DE4-BB43-99C2-47FBB8B66E5F}" type="sibTrans" cxnId="{C6D6AF6F-F66E-B845-BB33-C3D0EEE3C24B}">
+      <dgm:prSet/>
+      <dgm:spPr/>
+      <dgm:t>
+        <a:bodyPr/>
+        <a:lstStyle/>
+        <a:p>
+          <a:endParaRPr lang="en-GB"/>
+        </a:p>
+      </dgm:t>
+    </dgm:pt>
+    <dgm:pt modelId="{B3EE89E4-23F1-C24F-856A-826ED7776BF6}">
+      <dgm:prSet phldrT="[Text]"/>
+      <dgm:spPr/>
+      <dgm:t>
+        <a:bodyPr/>
+        <a:lstStyle/>
+        <a:p>
+          <a:r>
+            <a:rPr lang="en-GB" dirty="0"/>
+            <a:t>Data Cleaning</a:t>
+          </a:r>
+        </a:p>
+      </dgm:t>
+    </dgm:pt>
+    <dgm:pt modelId="{3F39EB21-EE47-F541-B214-B4673B81706A}" type="parTrans" cxnId="{A019BBBD-E058-F446-940C-960BB165477A}">
+      <dgm:prSet/>
+      <dgm:spPr/>
+      <dgm:t>
+        <a:bodyPr/>
+        <a:lstStyle/>
+        <a:p>
+          <a:endParaRPr lang="en-GB"/>
+        </a:p>
+      </dgm:t>
+    </dgm:pt>
+    <dgm:pt modelId="{F1718F98-BE7D-EF4A-9B01-88B1ED6E99B0}" type="sibTrans" cxnId="{A019BBBD-E058-F446-940C-960BB165477A}">
+      <dgm:prSet/>
+      <dgm:spPr/>
+      <dgm:t>
+        <a:bodyPr/>
+        <a:lstStyle/>
+        <a:p>
+          <a:endParaRPr lang="en-GB"/>
+        </a:p>
+      </dgm:t>
+    </dgm:pt>
+    <dgm:pt modelId="{19119E97-0306-8E47-8B01-49A75A7F97D9}">
+      <dgm:prSet phldrT="[Text]"/>
+      <dgm:spPr/>
+      <dgm:t>
+        <a:bodyPr/>
+        <a:lstStyle/>
+        <a:p>
+          <a:r>
+            <a:rPr lang="en-GB" dirty="0"/>
+            <a:t>Based on understanding, using </a:t>
+          </a:r>
+          <a:r>
+            <a:rPr lang="en-GB" dirty="0" err="1"/>
+            <a:t>klib</a:t>
+          </a:r>
+          <a:r>
+            <a:rPr lang="en-GB" dirty="0"/>
+            <a:t> library or pandas performing cleaning operation</a:t>
+          </a:r>
+        </a:p>
+      </dgm:t>
+    </dgm:pt>
+    <dgm:pt modelId="{4448D23B-ED96-5B4E-B770-5438E1FDE7B0}" type="parTrans" cxnId="{795CF874-E8A3-4C41-9E9A-6E994106365E}">
+      <dgm:prSet/>
+      <dgm:spPr/>
+      <dgm:t>
+        <a:bodyPr/>
+        <a:lstStyle/>
+        <a:p>
+          <a:endParaRPr lang="en-GB"/>
+        </a:p>
+      </dgm:t>
+    </dgm:pt>
+    <dgm:pt modelId="{56AE7CB2-5030-A74C-A06F-F752F8242841}" type="sibTrans" cxnId="{795CF874-E8A3-4C41-9E9A-6E994106365E}">
+      <dgm:prSet/>
+      <dgm:spPr/>
+      <dgm:t>
+        <a:bodyPr/>
+        <a:lstStyle/>
+        <a:p>
+          <a:endParaRPr lang="en-GB"/>
+        </a:p>
+      </dgm:t>
+    </dgm:pt>
+    <dgm:pt modelId="{2903D961-4540-9543-90DC-7C8BF73E34FE}">
+      <dgm:prSet phldrT="[Text]"/>
+      <dgm:spPr/>
+      <dgm:t>
+        <a:bodyPr/>
+        <a:lstStyle/>
+        <a:p>
+          <a:r>
+            <a:rPr lang="en-GB" dirty="0"/>
+            <a:t>Data Interpretation</a:t>
+          </a:r>
+        </a:p>
+      </dgm:t>
+    </dgm:pt>
+    <dgm:pt modelId="{06B65BE0-B841-1C4D-BA35-527D87B3CAA7}" type="parTrans" cxnId="{056EE00E-1196-0145-A199-66D19D82F799}">
+      <dgm:prSet/>
+      <dgm:spPr/>
+      <dgm:t>
+        <a:bodyPr/>
+        <a:lstStyle/>
+        <a:p>
+          <a:endParaRPr lang="en-GB"/>
+        </a:p>
+      </dgm:t>
+    </dgm:pt>
+    <dgm:pt modelId="{D246DD25-1F43-2C40-AD13-02491AD29FED}" type="sibTrans" cxnId="{056EE00E-1196-0145-A199-66D19D82F799}">
+      <dgm:prSet/>
+      <dgm:spPr/>
+      <dgm:t>
+        <a:bodyPr/>
+        <a:lstStyle/>
+        <a:p>
+          <a:endParaRPr lang="en-GB"/>
+        </a:p>
+      </dgm:t>
+    </dgm:pt>
+    <dgm:pt modelId="{7CEF5C6B-F9EC-5F42-A78B-4B713618802C}">
+      <dgm:prSet phldrT="[Text]"/>
+      <dgm:spPr/>
+      <dgm:t>
+        <a:bodyPr/>
+        <a:lstStyle/>
+        <a:p>
+          <a:r>
+            <a:rPr lang="en-GB" dirty="0"/>
+            <a:t>With the cleaned data plot graphs to mention the observations</a:t>
+          </a:r>
+        </a:p>
+      </dgm:t>
+    </dgm:pt>
+    <dgm:pt modelId="{952F1CC6-A572-9F4F-9DC5-DBD84C7DB6AB}" type="parTrans" cxnId="{9932A7CE-E712-AC45-8B9F-4A109863DEDD}">
+      <dgm:prSet/>
+      <dgm:spPr/>
+      <dgm:t>
+        <a:bodyPr/>
+        <a:lstStyle/>
+        <a:p>
+          <a:endParaRPr lang="en-GB"/>
+        </a:p>
+      </dgm:t>
+    </dgm:pt>
+    <dgm:pt modelId="{046FDE65-8C39-D84D-9189-EE9FC79E4BC4}" type="sibTrans" cxnId="{9932A7CE-E712-AC45-8B9F-4A109863DEDD}">
+      <dgm:prSet/>
+      <dgm:spPr/>
+      <dgm:t>
+        <a:bodyPr/>
+        <a:lstStyle/>
+        <a:p>
+          <a:endParaRPr lang="en-GB"/>
+        </a:p>
+      </dgm:t>
+    </dgm:pt>
+    <dgm:pt modelId="{52EB3B27-DA9D-D640-B946-0D9414684B73}" type="pres">
+      <dgm:prSet presAssocID="{7B387CE5-37AB-3446-9F9C-AEEDF56223A0}" presName="linearFlow" presStyleCnt="0">
+        <dgm:presLayoutVars>
+          <dgm:dir/>
+          <dgm:animLvl val="lvl"/>
+          <dgm:resizeHandles val="exact"/>
+        </dgm:presLayoutVars>
+      </dgm:prSet>
+      <dgm:spPr/>
+    </dgm:pt>
+    <dgm:pt modelId="{B50D2C95-00AD-7145-9603-CA694F7CF786}" type="pres">
+      <dgm:prSet presAssocID="{45BA8630-E9F5-864C-A7A2-8234F0DB15F6}" presName="composite" presStyleCnt="0"/>
+      <dgm:spPr/>
+    </dgm:pt>
+    <dgm:pt modelId="{B3F3421B-16D1-9949-AE3C-8BFD9B7A2D7B}" type="pres">
+      <dgm:prSet presAssocID="{45BA8630-E9F5-864C-A7A2-8234F0DB15F6}" presName="parTx" presStyleLbl="node1" presStyleIdx="0" presStyleCnt="3">
+        <dgm:presLayoutVars>
+          <dgm:chMax val="0"/>
+          <dgm:chPref val="0"/>
+          <dgm:bulletEnabled val="1"/>
+        </dgm:presLayoutVars>
+      </dgm:prSet>
+      <dgm:spPr/>
+    </dgm:pt>
+    <dgm:pt modelId="{1E4D6DCD-3766-6740-9B59-85A73695690A}" type="pres">
+      <dgm:prSet presAssocID="{45BA8630-E9F5-864C-A7A2-8234F0DB15F6}" presName="parSh" presStyleLbl="node1" presStyleIdx="0" presStyleCnt="3"/>
+      <dgm:spPr/>
+    </dgm:pt>
+    <dgm:pt modelId="{17DFF97F-18A5-8F42-B3A6-D43BCFC8E29A}" type="pres">
+      <dgm:prSet presAssocID="{45BA8630-E9F5-864C-A7A2-8234F0DB15F6}" presName="desTx" presStyleLbl="fgAcc1" presStyleIdx="0" presStyleCnt="3">
+        <dgm:presLayoutVars>
+          <dgm:bulletEnabled val="1"/>
+        </dgm:presLayoutVars>
+      </dgm:prSet>
+      <dgm:spPr/>
+    </dgm:pt>
+    <dgm:pt modelId="{51576D48-C32E-E249-B872-94B44B2B0550}" type="pres">
+      <dgm:prSet presAssocID="{6C8661BC-EC78-EE4C-B218-C58E7510FE9F}" presName="sibTrans" presStyleLbl="sibTrans2D1" presStyleIdx="0" presStyleCnt="2"/>
+      <dgm:spPr/>
+    </dgm:pt>
+    <dgm:pt modelId="{3B0677CA-36D5-6240-919A-3A9EF728343D}" type="pres">
+      <dgm:prSet presAssocID="{6C8661BC-EC78-EE4C-B218-C58E7510FE9F}" presName="connTx" presStyleLbl="sibTrans2D1" presStyleIdx="0" presStyleCnt="2"/>
+      <dgm:spPr/>
+    </dgm:pt>
+    <dgm:pt modelId="{CA426BE5-39B5-244E-83F2-184FCB9E4006}" type="pres">
+      <dgm:prSet presAssocID="{B3EE89E4-23F1-C24F-856A-826ED7776BF6}" presName="composite" presStyleCnt="0"/>
+      <dgm:spPr/>
+    </dgm:pt>
+    <dgm:pt modelId="{A5E1DF10-AD69-6D4A-8DDC-12A7A3E4BB22}" type="pres">
+      <dgm:prSet presAssocID="{B3EE89E4-23F1-C24F-856A-826ED7776BF6}" presName="parTx" presStyleLbl="node1" presStyleIdx="0" presStyleCnt="3">
+        <dgm:presLayoutVars>
+          <dgm:chMax val="0"/>
+          <dgm:chPref val="0"/>
+          <dgm:bulletEnabled val="1"/>
+        </dgm:presLayoutVars>
+      </dgm:prSet>
+      <dgm:spPr/>
+    </dgm:pt>
+    <dgm:pt modelId="{31285CEB-07F1-AC44-B334-000DB7F6840A}" type="pres">
+      <dgm:prSet presAssocID="{B3EE89E4-23F1-C24F-856A-826ED7776BF6}" presName="parSh" presStyleLbl="node1" presStyleIdx="1" presStyleCnt="3"/>
+      <dgm:spPr/>
+    </dgm:pt>
+    <dgm:pt modelId="{CB48A112-564A-474D-9470-B44834AC9A30}" type="pres">
+      <dgm:prSet presAssocID="{B3EE89E4-23F1-C24F-856A-826ED7776BF6}" presName="desTx" presStyleLbl="fgAcc1" presStyleIdx="1" presStyleCnt="3">
+        <dgm:presLayoutVars>
+          <dgm:bulletEnabled val="1"/>
+        </dgm:presLayoutVars>
+      </dgm:prSet>
+      <dgm:spPr/>
+    </dgm:pt>
+    <dgm:pt modelId="{612E0E29-30C9-DE44-A45B-699928D062FC}" type="pres">
+      <dgm:prSet presAssocID="{F1718F98-BE7D-EF4A-9B01-88B1ED6E99B0}" presName="sibTrans" presStyleLbl="sibTrans2D1" presStyleIdx="1" presStyleCnt="2"/>
+      <dgm:spPr/>
+    </dgm:pt>
+    <dgm:pt modelId="{F1F2AA72-F900-094A-9CF7-8A7CB1471CE1}" type="pres">
+      <dgm:prSet presAssocID="{F1718F98-BE7D-EF4A-9B01-88B1ED6E99B0}" presName="connTx" presStyleLbl="sibTrans2D1" presStyleIdx="1" presStyleCnt="2"/>
+      <dgm:spPr/>
+    </dgm:pt>
+    <dgm:pt modelId="{759F5B96-23BD-234E-98DA-B4E9CB132EF8}" type="pres">
+      <dgm:prSet presAssocID="{2903D961-4540-9543-90DC-7C8BF73E34FE}" presName="composite" presStyleCnt="0"/>
+      <dgm:spPr/>
+    </dgm:pt>
+    <dgm:pt modelId="{FC396D6E-9E8F-C949-B7A3-D4AE8EE8B0F1}" type="pres">
+      <dgm:prSet presAssocID="{2903D961-4540-9543-90DC-7C8BF73E34FE}" presName="parTx" presStyleLbl="node1" presStyleIdx="1" presStyleCnt="3">
+        <dgm:presLayoutVars>
+          <dgm:chMax val="0"/>
+          <dgm:chPref val="0"/>
+          <dgm:bulletEnabled val="1"/>
+        </dgm:presLayoutVars>
+      </dgm:prSet>
+      <dgm:spPr/>
+    </dgm:pt>
+    <dgm:pt modelId="{D28E7AE1-B38D-7A4B-AF05-34BB595DFCAE}" type="pres">
+      <dgm:prSet presAssocID="{2903D961-4540-9543-90DC-7C8BF73E34FE}" presName="parSh" presStyleLbl="node1" presStyleIdx="2" presStyleCnt="3"/>
+      <dgm:spPr/>
+    </dgm:pt>
+    <dgm:pt modelId="{4E61D208-4CBD-284A-9D71-A81369B1BB53}" type="pres">
+      <dgm:prSet presAssocID="{2903D961-4540-9543-90DC-7C8BF73E34FE}" presName="desTx" presStyleLbl="fgAcc1" presStyleIdx="2" presStyleCnt="3">
+        <dgm:presLayoutVars>
+          <dgm:bulletEnabled val="1"/>
+        </dgm:presLayoutVars>
+      </dgm:prSet>
+      <dgm:spPr/>
+    </dgm:pt>
+  </dgm:ptLst>
+  <dgm:cxnLst>
+    <dgm:cxn modelId="{8FF8650E-BCE1-8E44-891E-7488EF4C1B5B}" type="presOf" srcId="{F1718F98-BE7D-EF4A-9B01-88B1ED6E99B0}" destId="{612E0E29-30C9-DE44-A45B-699928D062FC}" srcOrd="0" destOrd="0" presId="urn:microsoft.com/office/officeart/2005/8/layout/process3"/>
+    <dgm:cxn modelId="{056EE00E-1196-0145-A199-66D19D82F799}" srcId="{7B387CE5-37AB-3446-9F9C-AEEDF56223A0}" destId="{2903D961-4540-9543-90DC-7C8BF73E34FE}" srcOrd="2" destOrd="0" parTransId="{06B65BE0-B841-1C4D-BA35-527D87B3CAA7}" sibTransId="{D246DD25-1F43-2C40-AD13-02491AD29FED}"/>
+    <dgm:cxn modelId="{7B112611-9280-AB4E-9B6A-7A17DC6F82BD}" type="presOf" srcId="{6C8661BC-EC78-EE4C-B218-C58E7510FE9F}" destId="{51576D48-C32E-E249-B872-94B44B2B0550}" srcOrd="0" destOrd="0" presId="urn:microsoft.com/office/officeart/2005/8/layout/process3"/>
+    <dgm:cxn modelId="{D9825E13-E2F0-8B43-8C29-7647FB7E5428}" type="presOf" srcId="{2903D961-4540-9543-90DC-7C8BF73E34FE}" destId="{D28E7AE1-B38D-7A4B-AF05-34BB595DFCAE}" srcOrd="1" destOrd="0" presId="urn:microsoft.com/office/officeart/2005/8/layout/process3"/>
+    <dgm:cxn modelId="{A0F52817-EDC1-354F-8323-2911DC32906D}" type="presOf" srcId="{F1718F98-BE7D-EF4A-9B01-88B1ED6E99B0}" destId="{F1F2AA72-F900-094A-9CF7-8A7CB1471CE1}" srcOrd="1" destOrd="0" presId="urn:microsoft.com/office/officeart/2005/8/layout/process3"/>
+    <dgm:cxn modelId="{47B44D21-310B-E84A-8329-DDC4502717A4}" type="presOf" srcId="{B3EE89E4-23F1-C24F-856A-826ED7776BF6}" destId="{A5E1DF10-AD69-6D4A-8DDC-12A7A3E4BB22}" srcOrd="0" destOrd="0" presId="urn:microsoft.com/office/officeart/2005/8/layout/process3"/>
+    <dgm:cxn modelId="{78D75722-1184-6341-8706-72C29E4B1F60}" type="presOf" srcId="{6C8661BC-EC78-EE4C-B218-C58E7510FE9F}" destId="{3B0677CA-36D5-6240-919A-3A9EF728343D}" srcOrd="1" destOrd="0" presId="urn:microsoft.com/office/officeart/2005/8/layout/process3"/>
+    <dgm:cxn modelId="{2570EB36-41B4-7042-8377-60AEA35F5D39}" srcId="{7B387CE5-37AB-3446-9F9C-AEEDF56223A0}" destId="{45BA8630-E9F5-864C-A7A2-8234F0DB15F6}" srcOrd="0" destOrd="0" parTransId="{39937D44-F614-7E48-B3A0-BF63D0C0FF30}" sibTransId="{6C8661BC-EC78-EE4C-B218-C58E7510FE9F}"/>
+    <dgm:cxn modelId="{E5F0E046-50FA-0643-8546-2014BD9FBDC4}" type="presOf" srcId="{45BA8630-E9F5-864C-A7A2-8234F0DB15F6}" destId="{1E4D6DCD-3766-6740-9B59-85A73695690A}" srcOrd="1" destOrd="0" presId="urn:microsoft.com/office/officeart/2005/8/layout/process3"/>
+    <dgm:cxn modelId="{0536ED53-6B63-1549-8D0C-9F933E88FE84}" type="presOf" srcId="{19119E97-0306-8E47-8B01-49A75A7F97D9}" destId="{CB48A112-564A-474D-9470-B44834AC9A30}" srcOrd="0" destOrd="0" presId="urn:microsoft.com/office/officeart/2005/8/layout/process3"/>
+    <dgm:cxn modelId="{C6D6AF6F-F66E-B845-BB33-C3D0EEE3C24B}" srcId="{45BA8630-E9F5-864C-A7A2-8234F0DB15F6}" destId="{C6ACA521-14E7-1941-ACC6-F67CEE3CFE5E}" srcOrd="0" destOrd="0" parTransId="{1A2FF7B8-839A-A14A-A2B8-D501E9574800}" sibTransId="{F3524A3E-7DE4-BB43-99C2-47FBB8B66E5F}"/>
+    <dgm:cxn modelId="{795CF874-E8A3-4C41-9E9A-6E994106365E}" srcId="{B3EE89E4-23F1-C24F-856A-826ED7776BF6}" destId="{19119E97-0306-8E47-8B01-49A75A7F97D9}" srcOrd="0" destOrd="0" parTransId="{4448D23B-ED96-5B4E-B770-5438E1FDE7B0}" sibTransId="{56AE7CB2-5030-A74C-A06F-F752F8242841}"/>
+    <dgm:cxn modelId="{CB847E76-84C9-8A40-A1A9-19F267F24424}" type="presOf" srcId="{2903D961-4540-9543-90DC-7C8BF73E34FE}" destId="{FC396D6E-9E8F-C949-B7A3-D4AE8EE8B0F1}" srcOrd="0" destOrd="0" presId="urn:microsoft.com/office/officeart/2005/8/layout/process3"/>
+    <dgm:cxn modelId="{78887A97-FDF7-2A48-8755-269B16BD7D78}" type="presOf" srcId="{7CEF5C6B-F9EC-5F42-A78B-4B713618802C}" destId="{4E61D208-4CBD-284A-9D71-A81369B1BB53}" srcOrd="0" destOrd="0" presId="urn:microsoft.com/office/officeart/2005/8/layout/process3"/>
+    <dgm:cxn modelId="{8350EAA2-F9F7-654A-8DD6-B5006C221C20}" type="presOf" srcId="{45BA8630-E9F5-864C-A7A2-8234F0DB15F6}" destId="{B3F3421B-16D1-9949-AE3C-8BFD9B7A2D7B}" srcOrd="0" destOrd="0" presId="urn:microsoft.com/office/officeart/2005/8/layout/process3"/>
+    <dgm:cxn modelId="{2D660AA8-25E6-734E-AA57-9981CEBFB3F7}" type="presOf" srcId="{C6ACA521-14E7-1941-ACC6-F67CEE3CFE5E}" destId="{17DFF97F-18A5-8F42-B3A6-D43BCFC8E29A}" srcOrd="0" destOrd="0" presId="urn:microsoft.com/office/officeart/2005/8/layout/process3"/>
+    <dgm:cxn modelId="{A019BBBD-E058-F446-940C-960BB165477A}" srcId="{7B387CE5-37AB-3446-9F9C-AEEDF56223A0}" destId="{B3EE89E4-23F1-C24F-856A-826ED7776BF6}" srcOrd="1" destOrd="0" parTransId="{3F39EB21-EE47-F541-B214-B4673B81706A}" sibTransId="{F1718F98-BE7D-EF4A-9B01-88B1ED6E99B0}"/>
+    <dgm:cxn modelId="{9932A7CE-E712-AC45-8B9F-4A109863DEDD}" srcId="{2903D961-4540-9543-90DC-7C8BF73E34FE}" destId="{7CEF5C6B-F9EC-5F42-A78B-4B713618802C}" srcOrd="0" destOrd="0" parTransId="{952F1CC6-A572-9F4F-9DC5-DBD84C7DB6AB}" sibTransId="{046FDE65-8C39-D84D-9189-EE9FC79E4BC4}"/>
+    <dgm:cxn modelId="{CB91E7D7-44F8-2E4A-A8D3-B5DF83138372}" type="presOf" srcId="{7B387CE5-37AB-3446-9F9C-AEEDF56223A0}" destId="{52EB3B27-DA9D-D640-B946-0D9414684B73}" srcOrd="0" destOrd="0" presId="urn:microsoft.com/office/officeart/2005/8/layout/process3"/>
+    <dgm:cxn modelId="{95B58DEB-2DE0-7742-A33C-9023731B3F99}" type="presOf" srcId="{B3EE89E4-23F1-C24F-856A-826ED7776BF6}" destId="{31285CEB-07F1-AC44-B334-000DB7F6840A}" srcOrd="1" destOrd="0" presId="urn:microsoft.com/office/officeart/2005/8/layout/process3"/>
+    <dgm:cxn modelId="{ECC5BC7B-AAC7-4C47-AB78-7840EE5894A2}" type="presParOf" srcId="{52EB3B27-DA9D-D640-B946-0D9414684B73}" destId="{B50D2C95-00AD-7145-9603-CA694F7CF786}" srcOrd="0" destOrd="0" presId="urn:microsoft.com/office/officeart/2005/8/layout/process3"/>
+    <dgm:cxn modelId="{16ABD9C8-09F3-DD46-A3E5-81F5633B54C6}" type="presParOf" srcId="{B50D2C95-00AD-7145-9603-CA694F7CF786}" destId="{B3F3421B-16D1-9949-AE3C-8BFD9B7A2D7B}" srcOrd="0" destOrd="0" presId="urn:microsoft.com/office/officeart/2005/8/layout/process3"/>
+    <dgm:cxn modelId="{E0676C1B-A700-994E-B083-71B2EF0D68D8}" type="presParOf" srcId="{B50D2C95-00AD-7145-9603-CA694F7CF786}" destId="{1E4D6DCD-3766-6740-9B59-85A73695690A}" srcOrd="1" destOrd="0" presId="urn:microsoft.com/office/officeart/2005/8/layout/process3"/>
+    <dgm:cxn modelId="{106E649F-DFDF-B348-981B-B8667846B232}" type="presParOf" srcId="{B50D2C95-00AD-7145-9603-CA694F7CF786}" destId="{17DFF97F-18A5-8F42-B3A6-D43BCFC8E29A}" srcOrd="2" destOrd="0" presId="urn:microsoft.com/office/officeart/2005/8/layout/process3"/>
+    <dgm:cxn modelId="{8098FD2E-C5E6-BC4B-83D5-FA01C84F332F}" type="presParOf" srcId="{52EB3B27-DA9D-D640-B946-0D9414684B73}" destId="{51576D48-C32E-E249-B872-94B44B2B0550}" srcOrd="1" destOrd="0" presId="urn:microsoft.com/office/officeart/2005/8/layout/process3"/>
+    <dgm:cxn modelId="{F9D84902-0B67-2049-81E9-4F9FEE6ADE9A}" type="presParOf" srcId="{51576D48-C32E-E249-B872-94B44B2B0550}" destId="{3B0677CA-36D5-6240-919A-3A9EF728343D}" srcOrd="0" destOrd="0" presId="urn:microsoft.com/office/officeart/2005/8/layout/process3"/>
+    <dgm:cxn modelId="{FA17E75B-CB1A-8F4D-B3CB-4536CA372A8B}" type="presParOf" srcId="{52EB3B27-DA9D-D640-B946-0D9414684B73}" destId="{CA426BE5-39B5-244E-83F2-184FCB9E4006}" srcOrd="2" destOrd="0" presId="urn:microsoft.com/office/officeart/2005/8/layout/process3"/>
+    <dgm:cxn modelId="{7820867F-DD76-FE4B-B406-4DE596A84081}" type="presParOf" srcId="{CA426BE5-39B5-244E-83F2-184FCB9E4006}" destId="{A5E1DF10-AD69-6D4A-8DDC-12A7A3E4BB22}" srcOrd="0" destOrd="0" presId="urn:microsoft.com/office/officeart/2005/8/layout/process3"/>
+    <dgm:cxn modelId="{245D92D7-8998-E445-926C-55836E19D695}" type="presParOf" srcId="{CA426BE5-39B5-244E-83F2-184FCB9E4006}" destId="{31285CEB-07F1-AC44-B334-000DB7F6840A}" srcOrd="1" destOrd="0" presId="urn:microsoft.com/office/officeart/2005/8/layout/process3"/>
+    <dgm:cxn modelId="{A3C7BE3E-59A3-104B-80B3-1913EB9C1357}" type="presParOf" srcId="{CA426BE5-39B5-244E-83F2-184FCB9E4006}" destId="{CB48A112-564A-474D-9470-B44834AC9A30}" srcOrd="2" destOrd="0" presId="urn:microsoft.com/office/officeart/2005/8/layout/process3"/>
+    <dgm:cxn modelId="{EACB599B-D42C-0741-BB30-BC11A54BD266}" type="presParOf" srcId="{52EB3B27-DA9D-D640-B946-0D9414684B73}" destId="{612E0E29-30C9-DE44-A45B-699928D062FC}" srcOrd="3" destOrd="0" presId="urn:microsoft.com/office/officeart/2005/8/layout/process3"/>
+    <dgm:cxn modelId="{9D062309-15B4-5B42-B2DD-457FAC214B77}" type="presParOf" srcId="{612E0E29-30C9-DE44-A45B-699928D062FC}" destId="{F1F2AA72-F900-094A-9CF7-8A7CB1471CE1}" srcOrd="0" destOrd="0" presId="urn:microsoft.com/office/officeart/2005/8/layout/process3"/>
+    <dgm:cxn modelId="{BB4C6BE1-6B87-FF44-889B-FA78DACCE80F}" type="presParOf" srcId="{52EB3B27-DA9D-D640-B946-0D9414684B73}" destId="{759F5B96-23BD-234E-98DA-B4E9CB132EF8}" srcOrd="4" destOrd="0" presId="urn:microsoft.com/office/officeart/2005/8/layout/process3"/>
+    <dgm:cxn modelId="{C4C402C0-6298-E14C-91F6-91E921BACD8D}" type="presParOf" srcId="{759F5B96-23BD-234E-98DA-B4E9CB132EF8}" destId="{FC396D6E-9E8F-C949-B7A3-D4AE8EE8B0F1}" srcOrd="0" destOrd="0" presId="urn:microsoft.com/office/officeart/2005/8/layout/process3"/>
+    <dgm:cxn modelId="{FCFC318D-9DBB-B545-B690-64AF20EE6DD4}" type="presParOf" srcId="{759F5B96-23BD-234E-98DA-B4E9CB132EF8}" destId="{D28E7AE1-B38D-7A4B-AF05-34BB595DFCAE}" srcOrd="1" destOrd="0" presId="urn:microsoft.com/office/officeart/2005/8/layout/process3"/>
+    <dgm:cxn modelId="{7912CC17-A55D-684A-811A-7182DA937715}" type="presParOf" srcId="{759F5B96-23BD-234E-98DA-B4E9CB132EF8}" destId="{4E61D208-4CBD-284A-9D71-A81369B1BB53}" srcOrd="2" destOrd="0" presId="urn:microsoft.com/office/officeart/2005/8/layout/process3"/>
+  </dgm:cxnLst>
+  <dgm:bg/>
+  <dgm:whole/>
+  <dgm:extLst>
+    <a:ext uri="http://schemas.microsoft.com/office/drawing/2008/diagram">
+      <dsp:dataModelExt xmlns:dsp="http://schemas.microsoft.com/office/drawing/2008/diagram" relId="rId6" minVer="http://schemas.openxmlformats.org/drawingml/2006/diagram"/>
+    </a:ext>
+  </dgm:extLst>
+</dgm:dataModel>
+</file>
+
+<file path=ppt/diagrams/drawing1.xml><?xml version="1.0" encoding="utf-8"?>
+<dsp:drawing xmlns:dgm="http://schemas.openxmlformats.org/drawingml/2006/diagram" xmlns:dsp="http://schemas.microsoft.com/office/drawing/2008/diagram" xmlns:a="http://schemas.openxmlformats.org/drawingml/2006/main">
+  <dsp:spTree>
+    <dsp:nvGrpSpPr>
+      <dsp:cNvPr id="0" name=""/>
+      <dsp:cNvGrpSpPr/>
+    </dsp:nvGrpSpPr>
+    <dsp:grpSpPr/>
+    <dsp:sp modelId="{1E4D6DCD-3766-6740-9B59-85A73695690A}">
+      <dsp:nvSpPr>
+        <dsp:cNvPr id="0" name=""/>
+        <dsp:cNvSpPr/>
+      </dsp:nvSpPr>
+      <dsp:spPr>
+        <a:xfrm>
+          <a:off x="5002" y="430186"/>
+          <a:ext cx="2274632" cy="1092789"/>
+        </a:xfrm>
+        <a:prstGeom prst="roundRect">
+          <a:avLst>
+            <a:gd name="adj" fmla="val 10000"/>
+          </a:avLst>
+        </a:prstGeom>
+        <a:solidFill>
+          <a:schemeClr val="accent1">
+            <a:hueOff val="0"/>
+            <a:satOff val="0"/>
+            <a:lumOff val="0"/>
+            <a:alphaOff val="0"/>
+          </a:schemeClr>
+        </a:solidFill>
+        <a:ln w="12700" cap="flat" cmpd="sng" algn="ctr">
+          <a:solidFill>
+            <a:schemeClr val="lt1">
+              <a:hueOff val="0"/>
+              <a:satOff val="0"/>
+              <a:lumOff val="0"/>
+              <a:alphaOff val="0"/>
+            </a:schemeClr>
+          </a:solidFill>
+          <a:prstDash val="solid"/>
+        </a:ln>
+        <a:effectLst/>
+      </dsp:spPr>
+      <dsp:style>
+        <a:lnRef idx="2">
+          <a:scrgbClr r="0" g="0" b="0"/>
+        </a:lnRef>
+        <a:fillRef idx="1">
+          <a:scrgbClr r="0" g="0" b="0"/>
+        </a:fillRef>
+        <a:effectRef idx="0">
+          <a:scrgbClr r="0" g="0" b="0"/>
+        </a:effectRef>
+        <a:fontRef idx="minor">
+          <a:schemeClr val="lt1"/>
+        </a:fontRef>
+      </dsp:style>
+      <dsp:txBody>
+        <a:bodyPr spcFirstLastPara="0" vert="horz" wrap="square" lIns="135128" tIns="135128" rIns="135128" bIns="72390" numCol="1" spcCol="1270" anchor="t" anchorCtr="0">
+          <a:noAutofit/>
+        </a:bodyPr>
+        <a:lstStyle/>
+        <a:p>
+          <a:pPr marL="0" lvl="0" indent="0" algn="l" defTabSz="844550">
+            <a:lnSpc>
+              <a:spcPct val="90000"/>
+            </a:lnSpc>
+            <a:spcBef>
+              <a:spcPct val="0"/>
+            </a:spcBef>
+            <a:spcAft>
+              <a:spcPct val="35000"/>
+            </a:spcAft>
+            <a:buNone/>
+          </a:pPr>
+          <a:r>
+            <a:rPr lang="en-GB" sz="1900" kern="1200" dirty="0"/>
+            <a:t>Data Understanding</a:t>
+          </a:r>
+        </a:p>
+      </dsp:txBody>
+      <dsp:txXfrm>
+        <a:off x="5002" y="430186"/>
+        <a:ext cx="2274632" cy="728526"/>
+      </dsp:txXfrm>
+    </dsp:sp>
+    <dsp:sp modelId="{17DFF97F-18A5-8F42-B3A6-D43BCFC8E29A}">
+      <dsp:nvSpPr>
+        <dsp:cNvPr id="0" name=""/>
+        <dsp:cNvSpPr/>
+      </dsp:nvSpPr>
+      <dsp:spPr>
+        <a:xfrm>
+          <a:off x="470891" y="1158713"/>
+          <a:ext cx="2274632" cy="2462400"/>
+        </a:xfrm>
+        <a:prstGeom prst="roundRect">
+          <a:avLst>
+            <a:gd name="adj" fmla="val 10000"/>
+          </a:avLst>
+        </a:prstGeom>
+        <a:solidFill>
+          <a:schemeClr val="lt1">
+            <a:alpha val="90000"/>
+            <a:hueOff val="0"/>
+            <a:satOff val="0"/>
+            <a:lumOff val="0"/>
+            <a:alphaOff val="0"/>
+          </a:schemeClr>
+        </a:solidFill>
+        <a:ln w="12700" cap="flat" cmpd="sng" algn="ctr">
+          <a:solidFill>
+            <a:schemeClr val="accent1">
+              <a:hueOff val="0"/>
+              <a:satOff val="0"/>
+              <a:lumOff val="0"/>
+              <a:alphaOff val="0"/>
+            </a:schemeClr>
+          </a:solidFill>
+          <a:prstDash val="solid"/>
+        </a:ln>
+        <a:effectLst/>
+      </dsp:spPr>
+      <dsp:style>
+        <a:lnRef idx="2">
+          <a:scrgbClr r="0" g="0" b="0"/>
+        </a:lnRef>
+        <a:fillRef idx="1">
+          <a:scrgbClr r="0" g="0" b="0"/>
+        </a:fillRef>
+        <a:effectRef idx="0">
+          <a:scrgbClr r="0" g="0" b="0"/>
+        </a:effectRef>
+        <a:fontRef idx="minor"/>
+      </dsp:style>
+      <dsp:txBody>
+        <a:bodyPr spcFirstLastPara="0" vert="horz" wrap="square" lIns="135128" tIns="135128" rIns="135128" bIns="135128" numCol="1" spcCol="1270" anchor="t" anchorCtr="0">
+          <a:noAutofit/>
+        </a:bodyPr>
+        <a:lstStyle/>
+        <a:p>
+          <a:pPr marL="171450" lvl="1" indent="-171450" algn="l" defTabSz="844550">
+            <a:lnSpc>
+              <a:spcPct val="90000"/>
+            </a:lnSpc>
+            <a:spcBef>
+              <a:spcPct val="0"/>
+            </a:spcBef>
+            <a:spcAft>
+              <a:spcPct val="15000"/>
+            </a:spcAft>
+            <a:buChar char="•"/>
+          </a:pPr>
+          <a:r>
+            <a:rPr lang="en-GB" sz="1900" kern="1200" dirty="0"/>
+            <a:t>Using given dictionary and excel understand data in </a:t>
+          </a:r>
+          <a:r>
+            <a:rPr lang="en-GB" sz="1900" kern="1200" dirty="0" err="1"/>
+            <a:t>loan.csv</a:t>
+          </a:r>
+          <a:endParaRPr lang="en-GB" sz="1900" kern="1200" dirty="0"/>
+        </a:p>
+      </dsp:txBody>
+      <dsp:txXfrm>
+        <a:off x="537513" y="1225335"/>
+        <a:ext cx="2141388" cy="2329156"/>
+      </dsp:txXfrm>
+    </dsp:sp>
+    <dsp:sp modelId="{51576D48-C32E-E249-B872-94B44B2B0550}">
+      <dsp:nvSpPr>
+        <dsp:cNvPr id="0" name=""/>
+        <dsp:cNvSpPr/>
+      </dsp:nvSpPr>
+      <dsp:spPr>
+        <a:xfrm>
+          <a:off x="2624461" y="511291"/>
+          <a:ext cx="731031" cy="566317"/>
+        </a:xfrm>
+        <a:prstGeom prst="rightArrow">
+          <a:avLst>
+            <a:gd name="adj1" fmla="val 60000"/>
+            <a:gd name="adj2" fmla="val 50000"/>
+          </a:avLst>
+        </a:prstGeom>
+        <a:solidFill>
+          <a:schemeClr val="accent1">
+            <a:tint val="60000"/>
+            <a:hueOff val="0"/>
+            <a:satOff val="0"/>
+            <a:lumOff val="0"/>
+            <a:alphaOff val="0"/>
+          </a:schemeClr>
+        </a:solidFill>
+        <a:ln>
+          <a:noFill/>
+        </a:ln>
+        <a:effectLst/>
+      </dsp:spPr>
+      <dsp:style>
+        <a:lnRef idx="0">
+          <a:scrgbClr r="0" g="0" b="0"/>
+        </a:lnRef>
+        <a:fillRef idx="1">
+          <a:scrgbClr r="0" g="0" b="0"/>
+        </a:fillRef>
+        <a:effectRef idx="0">
+          <a:scrgbClr r="0" g="0" b="0"/>
+        </a:effectRef>
+        <a:fontRef idx="minor">
+          <a:schemeClr val="lt1"/>
+        </a:fontRef>
+      </dsp:style>
+      <dsp:txBody>
+        <a:bodyPr spcFirstLastPara="0" vert="horz" wrap="square" lIns="0" tIns="0" rIns="0" bIns="0" numCol="1" spcCol="1270" anchor="ctr" anchorCtr="0">
+          <a:noAutofit/>
+        </a:bodyPr>
+        <a:lstStyle/>
+        <a:p>
+          <a:pPr marL="0" lvl="0" indent="0" algn="ctr" defTabSz="666750">
+            <a:lnSpc>
+              <a:spcPct val="90000"/>
+            </a:lnSpc>
+            <a:spcBef>
+              <a:spcPct val="0"/>
+            </a:spcBef>
+            <a:spcAft>
+              <a:spcPct val="35000"/>
+            </a:spcAft>
+            <a:buNone/>
+          </a:pPr>
+          <a:endParaRPr lang="en-GB" sz="1500" kern="1200"/>
+        </a:p>
+      </dsp:txBody>
+      <dsp:txXfrm>
+        <a:off x="2624461" y="624554"/>
+        <a:ext cx="561136" cy="339791"/>
+      </dsp:txXfrm>
+    </dsp:sp>
+    <dsp:sp modelId="{31285CEB-07F1-AC44-B334-000DB7F6840A}">
+      <dsp:nvSpPr>
+        <dsp:cNvPr id="0" name=""/>
+        <dsp:cNvSpPr/>
+      </dsp:nvSpPr>
+      <dsp:spPr>
+        <a:xfrm>
+          <a:off x="3658939" y="430186"/>
+          <a:ext cx="2274632" cy="1092789"/>
+        </a:xfrm>
+        <a:prstGeom prst="roundRect">
+          <a:avLst>
+            <a:gd name="adj" fmla="val 10000"/>
+          </a:avLst>
+        </a:prstGeom>
+        <a:solidFill>
+          <a:schemeClr val="accent1">
+            <a:hueOff val="0"/>
+            <a:satOff val="0"/>
+            <a:lumOff val="0"/>
+            <a:alphaOff val="0"/>
+          </a:schemeClr>
+        </a:solidFill>
+        <a:ln w="12700" cap="flat" cmpd="sng" algn="ctr">
+          <a:solidFill>
+            <a:schemeClr val="lt1">
+              <a:hueOff val="0"/>
+              <a:satOff val="0"/>
+              <a:lumOff val="0"/>
+              <a:alphaOff val="0"/>
+            </a:schemeClr>
+          </a:solidFill>
+          <a:prstDash val="solid"/>
+        </a:ln>
+        <a:effectLst/>
+      </dsp:spPr>
+      <dsp:style>
+        <a:lnRef idx="2">
+          <a:scrgbClr r="0" g="0" b="0"/>
+        </a:lnRef>
+        <a:fillRef idx="1">
+          <a:scrgbClr r="0" g="0" b="0"/>
+        </a:fillRef>
+        <a:effectRef idx="0">
+          <a:scrgbClr r="0" g="0" b="0"/>
+        </a:effectRef>
+        <a:fontRef idx="minor">
+          <a:schemeClr val="lt1"/>
+        </a:fontRef>
+      </dsp:style>
+      <dsp:txBody>
+        <a:bodyPr spcFirstLastPara="0" vert="horz" wrap="square" lIns="135128" tIns="135128" rIns="135128" bIns="72390" numCol="1" spcCol="1270" anchor="t" anchorCtr="0">
+          <a:noAutofit/>
+        </a:bodyPr>
+        <a:lstStyle/>
+        <a:p>
+          <a:pPr marL="0" lvl="0" indent="0" algn="l" defTabSz="844550">
+            <a:lnSpc>
+              <a:spcPct val="90000"/>
+            </a:lnSpc>
+            <a:spcBef>
+              <a:spcPct val="0"/>
+            </a:spcBef>
+            <a:spcAft>
+              <a:spcPct val="35000"/>
+            </a:spcAft>
+            <a:buNone/>
+          </a:pPr>
+          <a:r>
+            <a:rPr lang="en-GB" sz="1900" kern="1200" dirty="0"/>
+            <a:t>Data Cleaning</a:t>
+          </a:r>
+        </a:p>
+      </dsp:txBody>
+      <dsp:txXfrm>
+        <a:off x="3658939" y="430186"/>
+        <a:ext cx="2274632" cy="728526"/>
+      </dsp:txXfrm>
+    </dsp:sp>
+    <dsp:sp modelId="{CB48A112-564A-474D-9470-B44834AC9A30}">
+      <dsp:nvSpPr>
+        <dsp:cNvPr id="0" name=""/>
+        <dsp:cNvSpPr/>
+      </dsp:nvSpPr>
+      <dsp:spPr>
+        <a:xfrm>
+          <a:off x="4124828" y="1158713"/>
+          <a:ext cx="2274632" cy="2462400"/>
+        </a:xfrm>
+        <a:prstGeom prst="roundRect">
+          <a:avLst>
+            <a:gd name="adj" fmla="val 10000"/>
+          </a:avLst>
+        </a:prstGeom>
+        <a:solidFill>
+          <a:schemeClr val="lt1">
+            <a:alpha val="90000"/>
+            <a:hueOff val="0"/>
+            <a:satOff val="0"/>
+            <a:lumOff val="0"/>
+            <a:alphaOff val="0"/>
+          </a:schemeClr>
+        </a:solidFill>
+        <a:ln w="12700" cap="flat" cmpd="sng" algn="ctr">
+          <a:solidFill>
+            <a:schemeClr val="accent1">
+              <a:hueOff val="0"/>
+              <a:satOff val="0"/>
+              <a:lumOff val="0"/>
+              <a:alphaOff val="0"/>
+            </a:schemeClr>
+          </a:solidFill>
+          <a:prstDash val="solid"/>
+        </a:ln>
+        <a:effectLst/>
+      </dsp:spPr>
+      <dsp:style>
+        <a:lnRef idx="2">
+          <a:scrgbClr r="0" g="0" b="0"/>
+        </a:lnRef>
+        <a:fillRef idx="1">
+          <a:scrgbClr r="0" g="0" b="0"/>
+        </a:fillRef>
+        <a:effectRef idx="0">
+          <a:scrgbClr r="0" g="0" b="0"/>
+        </a:effectRef>
+        <a:fontRef idx="minor"/>
+      </dsp:style>
+      <dsp:txBody>
+        <a:bodyPr spcFirstLastPara="0" vert="horz" wrap="square" lIns="135128" tIns="135128" rIns="135128" bIns="135128" numCol="1" spcCol="1270" anchor="t" anchorCtr="0">
+          <a:noAutofit/>
+        </a:bodyPr>
+        <a:lstStyle/>
+        <a:p>
+          <a:pPr marL="171450" lvl="1" indent="-171450" algn="l" defTabSz="844550">
+            <a:lnSpc>
+              <a:spcPct val="90000"/>
+            </a:lnSpc>
+            <a:spcBef>
+              <a:spcPct val="0"/>
+            </a:spcBef>
+            <a:spcAft>
+              <a:spcPct val="15000"/>
+            </a:spcAft>
+            <a:buChar char="•"/>
+          </a:pPr>
+          <a:r>
+            <a:rPr lang="en-GB" sz="1900" kern="1200" dirty="0"/>
+            <a:t>Based on understanding, using </a:t>
+          </a:r>
+          <a:r>
+            <a:rPr lang="en-GB" sz="1900" kern="1200" dirty="0" err="1"/>
+            <a:t>klib</a:t>
+          </a:r>
+          <a:r>
+            <a:rPr lang="en-GB" sz="1900" kern="1200" dirty="0"/>
+            <a:t> library or pandas performing cleaning operation</a:t>
+          </a:r>
+        </a:p>
+      </dsp:txBody>
+      <dsp:txXfrm>
+        <a:off x="4191450" y="1225335"/>
+        <a:ext cx="2141388" cy="2329156"/>
+      </dsp:txXfrm>
+    </dsp:sp>
+    <dsp:sp modelId="{612E0E29-30C9-DE44-A45B-699928D062FC}">
+      <dsp:nvSpPr>
+        <dsp:cNvPr id="0" name=""/>
+        <dsp:cNvSpPr/>
+      </dsp:nvSpPr>
+      <dsp:spPr>
+        <a:xfrm>
+          <a:off x="6278398" y="511291"/>
+          <a:ext cx="731031" cy="566317"/>
+        </a:xfrm>
+        <a:prstGeom prst="rightArrow">
+          <a:avLst>
+            <a:gd name="adj1" fmla="val 60000"/>
+            <a:gd name="adj2" fmla="val 50000"/>
+          </a:avLst>
+        </a:prstGeom>
+        <a:solidFill>
+          <a:schemeClr val="accent1">
+            <a:tint val="60000"/>
+            <a:hueOff val="0"/>
+            <a:satOff val="0"/>
+            <a:lumOff val="0"/>
+            <a:alphaOff val="0"/>
+          </a:schemeClr>
+        </a:solidFill>
+        <a:ln>
+          <a:noFill/>
+        </a:ln>
+        <a:effectLst/>
+      </dsp:spPr>
+      <dsp:style>
+        <a:lnRef idx="0">
+          <a:scrgbClr r="0" g="0" b="0"/>
+        </a:lnRef>
+        <a:fillRef idx="1">
+          <a:scrgbClr r="0" g="0" b="0"/>
+        </a:fillRef>
+        <a:effectRef idx="0">
+          <a:scrgbClr r="0" g="0" b="0"/>
+        </a:effectRef>
+        <a:fontRef idx="minor">
+          <a:schemeClr val="lt1"/>
+        </a:fontRef>
+      </dsp:style>
+      <dsp:txBody>
+        <a:bodyPr spcFirstLastPara="0" vert="horz" wrap="square" lIns="0" tIns="0" rIns="0" bIns="0" numCol="1" spcCol="1270" anchor="ctr" anchorCtr="0">
+          <a:noAutofit/>
+        </a:bodyPr>
+        <a:lstStyle/>
+        <a:p>
+          <a:pPr marL="0" lvl="0" indent="0" algn="ctr" defTabSz="666750">
+            <a:lnSpc>
+              <a:spcPct val="90000"/>
+            </a:lnSpc>
+            <a:spcBef>
+              <a:spcPct val="0"/>
+            </a:spcBef>
+            <a:spcAft>
+              <a:spcPct val="35000"/>
+            </a:spcAft>
+            <a:buNone/>
+          </a:pPr>
+          <a:endParaRPr lang="en-GB" sz="1500" kern="1200"/>
+        </a:p>
+      </dsp:txBody>
+      <dsp:txXfrm>
+        <a:off x="6278398" y="624554"/>
+        <a:ext cx="561136" cy="339791"/>
+      </dsp:txXfrm>
+    </dsp:sp>
+    <dsp:sp modelId="{D28E7AE1-B38D-7A4B-AF05-34BB595DFCAE}">
+      <dsp:nvSpPr>
+        <dsp:cNvPr id="0" name=""/>
+        <dsp:cNvSpPr/>
+      </dsp:nvSpPr>
+      <dsp:spPr>
+        <a:xfrm>
+          <a:off x="7312876" y="430186"/>
+          <a:ext cx="2274632" cy="1092789"/>
+        </a:xfrm>
+        <a:prstGeom prst="roundRect">
+          <a:avLst>
+            <a:gd name="adj" fmla="val 10000"/>
+          </a:avLst>
+        </a:prstGeom>
+        <a:solidFill>
+          <a:schemeClr val="accent1">
+            <a:hueOff val="0"/>
+            <a:satOff val="0"/>
+            <a:lumOff val="0"/>
+            <a:alphaOff val="0"/>
+          </a:schemeClr>
+        </a:solidFill>
+        <a:ln w="12700" cap="flat" cmpd="sng" algn="ctr">
+          <a:solidFill>
+            <a:schemeClr val="lt1">
+              <a:hueOff val="0"/>
+              <a:satOff val="0"/>
+              <a:lumOff val="0"/>
+              <a:alphaOff val="0"/>
+            </a:schemeClr>
+          </a:solidFill>
+          <a:prstDash val="solid"/>
+        </a:ln>
+        <a:effectLst/>
+      </dsp:spPr>
+      <dsp:style>
+        <a:lnRef idx="2">
+          <a:scrgbClr r="0" g="0" b="0"/>
+        </a:lnRef>
+        <a:fillRef idx="1">
+          <a:scrgbClr r="0" g="0" b="0"/>
+        </a:fillRef>
+        <a:effectRef idx="0">
+          <a:scrgbClr r="0" g="0" b="0"/>
+        </a:effectRef>
+        <a:fontRef idx="minor">
+          <a:schemeClr val="lt1"/>
+        </a:fontRef>
+      </dsp:style>
+      <dsp:txBody>
+        <a:bodyPr spcFirstLastPara="0" vert="horz" wrap="square" lIns="135128" tIns="135128" rIns="135128" bIns="72390" numCol="1" spcCol="1270" anchor="t" anchorCtr="0">
+          <a:noAutofit/>
+        </a:bodyPr>
+        <a:lstStyle/>
+        <a:p>
+          <a:pPr marL="0" lvl="0" indent="0" algn="l" defTabSz="844550">
+            <a:lnSpc>
+              <a:spcPct val="90000"/>
+            </a:lnSpc>
+            <a:spcBef>
+              <a:spcPct val="0"/>
+            </a:spcBef>
+            <a:spcAft>
+              <a:spcPct val="35000"/>
+            </a:spcAft>
+            <a:buNone/>
+          </a:pPr>
+          <a:r>
+            <a:rPr lang="en-GB" sz="1900" kern="1200" dirty="0"/>
+            <a:t>Data Interpretation</a:t>
+          </a:r>
+        </a:p>
+      </dsp:txBody>
+      <dsp:txXfrm>
+        <a:off x="7312876" y="430186"/>
+        <a:ext cx="2274632" cy="728526"/>
+      </dsp:txXfrm>
+    </dsp:sp>
+    <dsp:sp modelId="{4E61D208-4CBD-284A-9D71-A81369B1BB53}">
+      <dsp:nvSpPr>
+        <dsp:cNvPr id="0" name=""/>
+        <dsp:cNvSpPr/>
+      </dsp:nvSpPr>
+      <dsp:spPr>
+        <a:xfrm>
+          <a:off x="7778764" y="1158713"/>
+          <a:ext cx="2274632" cy="2462400"/>
+        </a:xfrm>
+        <a:prstGeom prst="roundRect">
+          <a:avLst>
+            <a:gd name="adj" fmla="val 10000"/>
+          </a:avLst>
+        </a:prstGeom>
+        <a:solidFill>
+          <a:schemeClr val="lt1">
+            <a:alpha val="90000"/>
+            <a:hueOff val="0"/>
+            <a:satOff val="0"/>
+            <a:lumOff val="0"/>
+            <a:alphaOff val="0"/>
+          </a:schemeClr>
+        </a:solidFill>
+        <a:ln w="12700" cap="flat" cmpd="sng" algn="ctr">
+          <a:solidFill>
+            <a:schemeClr val="accent1">
+              <a:hueOff val="0"/>
+              <a:satOff val="0"/>
+              <a:lumOff val="0"/>
+              <a:alphaOff val="0"/>
+            </a:schemeClr>
+          </a:solidFill>
+          <a:prstDash val="solid"/>
+        </a:ln>
+        <a:effectLst/>
+      </dsp:spPr>
+      <dsp:style>
+        <a:lnRef idx="2">
+          <a:scrgbClr r="0" g="0" b="0"/>
+        </a:lnRef>
+        <a:fillRef idx="1">
+          <a:scrgbClr r="0" g="0" b="0"/>
+        </a:fillRef>
+        <a:effectRef idx="0">
+          <a:scrgbClr r="0" g="0" b="0"/>
+        </a:effectRef>
+        <a:fontRef idx="minor"/>
+      </dsp:style>
+      <dsp:txBody>
+        <a:bodyPr spcFirstLastPara="0" vert="horz" wrap="square" lIns="135128" tIns="135128" rIns="135128" bIns="135128" numCol="1" spcCol="1270" anchor="t" anchorCtr="0">
+          <a:noAutofit/>
+        </a:bodyPr>
+        <a:lstStyle/>
+        <a:p>
+          <a:pPr marL="171450" lvl="1" indent="-171450" algn="l" defTabSz="844550">
+            <a:lnSpc>
+              <a:spcPct val="90000"/>
+            </a:lnSpc>
+            <a:spcBef>
+              <a:spcPct val="0"/>
+            </a:spcBef>
+            <a:spcAft>
+              <a:spcPct val="15000"/>
+            </a:spcAft>
+            <a:buChar char="•"/>
+          </a:pPr>
+          <a:r>
+            <a:rPr lang="en-GB" sz="1900" kern="1200" dirty="0"/>
+            <a:t>With the cleaned data plot graphs to mention the observations</a:t>
+          </a:r>
+        </a:p>
+      </dsp:txBody>
+      <dsp:txXfrm>
+        <a:off x="7845386" y="1225335"/>
+        <a:ext cx="2141388" cy="2329156"/>
+      </dsp:txXfrm>
+    </dsp:sp>
+  </dsp:spTree>
+</dsp:drawing>
+</file>
+
+<file path=ppt/diagrams/layout1.xml><?xml version="1.0" encoding="utf-8"?>
+<dgm:layoutDef xmlns:dgm="http://schemas.openxmlformats.org/drawingml/2006/diagram" xmlns:a="http://schemas.openxmlformats.org/drawingml/2006/main" uniqueId="urn:microsoft.com/office/officeart/2005/8/layout/process3">
+  <dgm:title val=""/>
+  <dgm:desc val=""/>
+  <dgm:catLst>
+    <dgm:cat type="process" pri="2000"/>
+  </dgm:catLst>
+  <dgm:sampData>
+    <dgm:dataModel>
+      <dgm:ptLst>
+        <dgm:pt modelId="0" type="doc"/>
+        <dgm:pt modelId="1">
+          <dgm:prSet phldr="1"/>
+        </dgm:pt>
+        <dgm:pt modelId="11">
+          <dgm:prSet phldr="1"/>
+        </dgm:pt>
+        <dgm:pt modelId="2">
+          <dgm:prSet phldr="1"/>
+        </dgm:pt>
+        <dgm:pt modelId="21">
+          <dgm:prSet phldr="1"/>
+        </dgm:pt>
+        <dgm:pt modelId="3">
+          <dgm:prSet phldr="1"/>
+        </dgm:pt>
+        <dgm:pt modelId="31">
+          <dgm:prSet phldr="1"/>
+        </dgm:pt>
+      </dgm:ptLst>
+      <dgm:cxnLst>
+        <dgm:cxn modelId="4" srcId="0" destId="1" srcOrd="0" destOrd="0"/>
+        <dgm:cxn modelId="5" srcId="0" destId="2" srcOrd="1" destOrd="0"/>
+        <dgm:cxn modelId="6" srcId="0" destId="3" srcOrd="3" destOrd="0"/>
+        <dgm:cxn modelId="12" srcId="1" destId="11" srcOrd="0" destOrd="0"/>
+        <dgm:cxn modelId="23" srcId="2" destId="21" srcOrd="0" destOrd="0"/>
+        <dgm:cxn modelId="34" srcId="3" destId="31" srcOrd="0" destOrd="0"/>
+      </dgm:cxnLst>
+      <dgm:bg/>
+      <dgm:whole/>
+    </dgm:dataModel>
+  </dgm:sampData>
+  <dgm:styleData>
+    <dgm:dataModel>
+      <dgm:ptLst>
+        <dgm:pt modelId="0" type="doc"/>
+        <dgm:pt modelId="1">
+          <dgm:prSet phldr="1"/>
+        </dgm:pt>
+        <dgm:pt modelId="11">
+          <dgm:prSet phldr="1"/>
+        </dgm:pt>
+        <dgm:pt modelId="2">
+          <dgm:prSet phldr="1"/>
+        </dgm:pt>
+        <dgm:pt modelId="21">
+          <dgm:prSet phldr="1"/>
+        </dgm:pt>
+      </dgm:ptLst>
+      <dgm:cxnLst>
+        <dgm:cxn modelId="4" srcId="0" destId="1" srcOrd="0" destOrd="0"/>
+        <dgm:cxn modelId="5" srcId="0" destId="2" srcOrd="1" destOrd="0"/>
+        <dgm:cxn modelId="13" srcId="1" destId="11" srcOrd="0" destOrd="0"/>
+        <dgm:cxn modelId="23" srcId="2" destId="21" srcOrd="0" destOrd="0"/>
+      </dgm:cxnLst>
+      <dgm:bg/>
+      <dgm:whole/>
+    </dgm:dataModel>
+  </dgm:styleData>
+  <dgm:clrData>
+    <dgm:dataModel>
+      <dgm:ptLst>
+        <dgm:pt modelId="0" type="doc"/>
+        <dgm:pt modelId="1">
+          <dgm:prSet phldr="1"/>
+        </dgm:pt>
+        <dgm:pt modelId="11">
+          <dgm:prSet phldr="1"/>
+        </dgm:pt>
+        <dgm:pt modelId="2">
+          <dgm:prSet phldr="1"/>
+        </dgm:pt>
+        <dgm:pt modelId="21">
+          <dgm:prSet phldr="1"/>
+        </dgm:pt>
+        <dgm:pt modelId="3">
+          <dgm:prSet phldr="1"/>
+        </dgm:pt>
+        <dgm:pt modelId="31">
+          <dgm:prSet phldr="1"/>
+        </dgm:pt>
+        <dgm:pt modelId="4">
+          <dgm:prSet phldr="1"/>
+        </dgm:pt>
+        <dgm:pt modelId="41">
+          <dgm:prSet phldr="1"/>
+        </dgm:pt>
+      </dgm:ptLst>
+      <dgm:cxnLst>
+        <dgm:cxn modelId="5" srcId="0" destId="1" srcOrd="0" destOrd="0"/>
+        <dgm:cxn modelId="6" srcId="0" destId="2" srcOrd="1" destOrd="0"/>
+        <dgm:cxn modelId="7" srcId="0" destId="3" srcOrd="2" destOrd="0"/>
+        <dgm:cxn modelId="8" srcId="0" destId="4" srcOrd="3" destOrd="0"/>
+        <dgm:cxn modelId="13" srcId="1" destId="11" srcOrd="0" destOrd="0"/>
+        <dgm:cxn modelId="23" srcId="2" destId="21" srcOrd="0" destOrd="0"/>
+        <dgm:cxn modelId="33" srcId="3" destId="31" srcOrd="0" destOrd="0"/>
+        <dgm:cxn modelId="43" srcId="4" destId="41" srcOrd="0" destOrd="0"/>
+      </dgm:cxnLst>
+      <dgm:bg/>
+      <dgm:whole/>
+    </dgm:dataModel>
+  </dgm:clrData>
+  <dgm:layoutNode name="linearFlow">
+    <dgm:varLst>
+      <dgm:dir/>
+      <dgm:animLvl val="lvl"/>
+      <dgm:resizeHandles val="exact"/>
+    </dgm:varLst>
+    <dgm:choose name="Name0">
+      <dgm:if name="Name1" func="var" arg="dir" op="equ" val="norm">
+        <dgm:alg type="lin"/>
+      </dgm:if>
+      <dgm:else name="Name2">
+        <dgm:alg type="lin">
+          <dgm:param type="linDir" val="fromR"/>
+        </dgm:alg>
+      </dgm:else>
+    </dgm:choose>
+    <dgm:shape xmlns:r="http://schemas.openxmlformats.org/officeDocument/2006/relationships" r:blip="">
+      <dgm:adjLst/>
+    </dgm:shape>
+    <dgm:presOf/>
+    <dgm:constrLst>
+      <dgm:constr type="w" for="ch" forName="composite" refType="w"/>
+      <dgm:constr type="w" for="ch" ptType="sibTrans" refType="w" refFor="ch" refForName="composite" fact="0.3333"/>
+      <dgm:constr type="w" for="des" forName="parTx"/>
+      <dgm:constr type="h" for="des" forName="parTx" op="equ"/>
+      <dgm:constr type="h" for="des" forName="parSh" op="equ"/>
+      <dgm:constr type="w" for="des" forName="desTx"/>
+      <dgm:constr type="h" for="des" forName="desTx" op="equ"/>
+      <dgm:constr type="w" for="des" forName="parSh"/>
+      <dgm:constr type="primFontSz" for="des" forName="parTx" val="65"/>
+      <dgm:constr type="secFontSz" for="des" forName="desTx" refType="primFontSz" refFor="des" refForName="parTx" op="equ"/>
+      <dgm:constr type="primFontSz" for="des" forName="connTx" refType="primFontSz" refFor="des" refForName="parTx" fact="0.8"/>
+      <dgm:constr type="primFontSz" for="des" forName="connTx" refType="primFontSz" refFor="des" refForName="parTx" op="lte" fact="0.8"/>
+      <dgm:constr type="h" for="des" forName="parTx" refType="primFontSz" refFor="des" refForName="parTx" fact="0.8"/>
+      <dgm:constr type="h" for="des" forName="parSh" refType="primFontSz" refFor="des" refForName="parTx" fact="1.2"/>
+      <dgm:constr type="h" for="des" forName="desTx" refType="primFontSz" refFor="des" refForName="parTx" fact="1.6"/>
+      <dgm:constr type="h" for="des" forName="parSh" refType="h" refFor="des" refForName="parTx" op="lte" fact="1.5"/>
+      <dgm:constr type="h" for="des" forName="parSh" refType="h" refFor="des" refForName="parTx" op="gte" fact="1.5"/>
+    </dgm:constrLst>
+    <dgm:ruleLst>
+      <dgm:rule type="w" for="ch" forName="composite" val="0" fact="NaN" max="NaN"/>
+      <dgm:rule type="primFontSz" for="des" forName="parTx" val="5" fact="NaN" max="NaN"/>
+    </dgm:ruleLst>
+    <dgm:forEach name="Name3" axis="ch" ptType="node">
+      <dgm:layoutNode name="composite">
+        <dgm:alg type="composite"/>
+        <dgm:shape xmlns:r="http://schemas.openxmlformats.org/officeDocument/2006/relationships" r:blip="">
+          <dgm:adjLst/>
+        </dgm:shape>
+        <dgm:presOf/>
+        <dgm:choose name="Name4">
+          <dgm:if name="Name5" func="var" arg="dir" op="equ" val="norm">
+            <dgm:constrLst>
+              <dgm:constr type="h" refType="w" fact="1000"/>
+              <dgm:constr type="l" for="ch" forName="parTx"/>
+              <dgm:constr type="w" for="ch" forName="parTx" refType="w" fact="0.83"/>
+              <dgm:constr type="t" for="ch" forName="parTx"/>
+              <dgm:constr type="l" for="ch" forName="parSh"/>
+              <dgm:constr type="w" for="ch" forName="parSh" refType="w" refFor="ch" refForName="parTx"/>
+              <dgm:constr type="t" for="ch" forName="parSh"/>
+              <dgm:constr type="l" for="ch" forName="desTx" refType="w" fact="0.17"/>
+              <dgm:constr type="w" for="ch" forName="desTx" refType="w" refFor="ch" refForName="parTx"/>
+              <dgm:constr type="t" for="ch" forName="desTx" refType="h" refFor="ch" refForName="parTx"/>
+            </dgm:constrLst>
+          </dgm:if>
+          <dgm:else name="Name6">
+            <dgm:constrLst>
+              <dgm:constr type="h" refType="w" fact="1000"/>
+              <dgm:constr type="l" for="ch" forName="parTx" refType="w" fact="0.17"/>
+              <dgm:constr type="w" for="ch" forName="parTx" refType="w" fact="0.83"/>
+              <dgm:constr type="t" for="ch" forName="parTx"/>
+              <dgm:constr type="l" for="ch" forName="parSh" refType="w" fact="0.15"/>
+              <dgm:constr type="w" for="ch" forName="parSh" refType="w" refFor="ch" refForName="parTx"/>
+              <dgm:constr type="t" for="ch" forName="parSh"/>
+              <dgm:constr type="l" for="ch" forName="desTx"/>
+              <dgm:constr type="w" for="ch" forName="desTx" refType="w" refFor="ch" refForName="parTx"/>
+              <dgm:constr type="t" for="ch" forName="desTx" refType="h" refFor="ch" refForName="parTx"/>
+            </dgm:constrLst>
+          </dgm:else>
+        </dgm:choose>
+        <dgm:ruleLst>
+          <dgm:rule type="h" val="INF" fact="NaN" max="NaN"/>
+        </dgm:ruleLst>
+        <dgm:layoutNode name="parTx">
+          <dgm:varLst>
+            <dgm:chMax val="0"/>
+            <dgm:chPref val="0"/>
+            <dgm:bulletEnabled val="1"/>
+          </dgm:varLst>
+          <dgm:alg type="tx">
+            <dgm:param type="parTxLTRAlign" val="l"/>
+            <dgm:param type="parTxRTLAlign" val="r"/>
+            <dgm:param type="txAnchorVert" val="t"/>
+          </dgm:alg>
+          <dgm:shape xmlns:r="http://schemas.openxmlformats.org/officeDocument/2006/relationships" type="rect" r:blip="" zOrderOff="1" hideGeom="1">
+            <dgm:adjLst>
+              <dgm:adj idx="1" val="0.1"/>
+            </dgm:adjLst>
+          </dgm:shape>
+          <dgm:presOf axis="self" ptType="node"/>
+          <dgm:constrLst>
+            <dgm:constr type="h" refType="w" op="lte" fact="0.4"/>
+            <dgm:constr type="bMarg" refType="primFontSz" fact="0.3"/>
+            <dgm:constr type="h"/>
+          </dgm:constrLst>
+          <dgm:ruleLst>
+            <dgm:rule type="h" val="INF" fact="NaN" max="NaN"/>
+          </dgm:ruleLst>
+        </dgm:layoutNode>
+        <dgm:layoutNode name="parSh">
+          <dgm:alg type="sp"/>
+          <dgm:shape xmlns:r="http://schemas.openxmlformats.org/officeDocument/2006/relationships" type="roundRect" r:blip="">
+            <dgm:adjLst>
+              <dgm:adj idx="1" val="0.1"/>
+            </dgm:adjLst>
+          </dgm:shape>
+          <dgm:presOf axis="self" ptType="node"/>
+          <dgm:constrLst>
+            <dgm:constr type="h"/>
+          </dgm:constrLst>
+          <dgm:ruleLst/>
+        </dgm:layoutNode>
+        <dgm:layoutNode name="desTx" styleLbl="fgAcc1">
+          <dgm:varLst>
+            <dgm:bulletEnabled val="1"/>
+          </dgm:varLst>
+          <dgm:alg type="tx">
+            <dgm:param type="stBulletLvl" val="1"/>
+          </dgm:alg>
+          <dgm:shape xmlns:r="http://schemas.openxmlformats.org/officeDocument/2006/relationships" type="roundRect" r:blip="">
+            <dgm:adjLst>
+              <dgm:adj idx="1" val="0.1"/>
+            </dgm:adjLst>
+          </dgm:shape>
+          <dgm:presOf axis="des" ptType="node"/>
+          <dgm:constrLst>
+            <dgm:constr type="secFontSz" val="65"/>
+            <dgm:constr type="primFontSz" refType="secFontSz"/>
+            <dgm:constr type="h"/>
+          </dgm:constrLst>
+          <dgm:ruleLst>
+            <dgm:rule type="h" val="INF" fact="NaN" max="NaN"/>
+          </dgm:ruleLst>
+        </dgm:layoutNode>
+      </dgm:layoutNode>
+      <dgm:forEach name="sibTransForEach" axis="followSib" ptType="sibTrans" cnt="1">
+        <dgm:layoutNode name="sibTrans">
+          <dgm:alg type="conn">
+            <dgm:param type="begPts" val="auto"/>
+            <dgm:param type="endPts" val="auto"/>
+            <dgm:param type="srcNode" val="parTx"/>
+            <dgm:param type="dstNode" val="parTx"/>
+          </dgm:alg>
+          <dgm:shape xmlns:r="http://schemas.openxmlformats.org/officeDocument/2006/relationships" type="conn" r:blip="">
+            <dgm:adjLst/>
+          </dgm:shape>
+          <dgm:presOf axis="self"/>
+          <dgm:constrLst>
+            <dgm:constr type="h" refType="w" fact="0.62"/>
+            <dgm:constr type="connDist"/>
+            <dgm:constr type="begPad" refType="connDist" fact="0.25"/>
+            <dgm:constr type="endPad" refType="connDist" fact="0.22"/>
+          </dgm:constrLst>
+          <dgm:ruleLst/>
+          <dgm:layoutNode name="connTx">
+            <dgm:alg type="tx">
+              <dgm:param type="autoTxRot" val="grav"/>
+            </dgm:alg>
+            <dgm:shape xmlns:r="http://schemas.openxmlformats.org/officeDocument/2006/relationships" type="conn" r:blip="" hideGeom="1">
+              <dgm:adjLst/>
+            </dgm:shape>
+            <dgm:presOf axis="self"/>
+            <dgm:constrLst>
+              <dgm:constr type="lMarg"/>
+              <dgm:constr type="rMarg"/>
+              <dgm:constr type="tMarg"/>
+              <dgm:constr type="bMarg"/>
+            </dgm:constrLst>
+            <dgm:ruleLst>
+              <dgm:rule type="primFontSz" val="5" fact="NaN" max="NaN"/>
+            </dgm:ruleLst>
+          </dgm:layoutNode>
+        </dgm:layoutNode>
+      </dgm:forEach>
+    </dgm:forEach>
+  </dgm:layoutNode>
+</dgm:layoutDef>
+</file>
+
+<file path=ppt/diagrams/quickStyle1.xml><?xml version="1.0" encoding="utf-8"?>
+<dgm:styleDef xmlns:dgm="http://schemas.openxmlformats.org/drawingml/2006/diagram" xmlns:a="http://schemas.openxmlformats.org/drawingml/2006/main" uniqueId="urn:microsoft.com/office/officeart/2005/8/quickstyle/simple1">
+  <dgm:title val=""/>
+  <dgm:desc val=""/>
+  <dgm:catLst>
+    <dgm:cat type="simple" pri="10100"/>
+  </dgm:catLst>
+  <dgm:scene3d>
+    <a:camera prst="orthographicFront"/>
+    <a:lightRig rig="threePt" dir="t"/>
+  </dgm:scene3d>
+  <dgm:styleLbl name="node0">
+    <dgm:scene3d>
+      <a:camera prst="orthographicFront"/>
+      <a:lightRig rig="threePt" dir="t"/>
+    </dgm:scene3d>
+    <dgm:sp3d/>
+    <dgm:txPr/>
+    <dgm:style>
+      <a:lnRef idx="2">
+        <a:scrgbClr r="0" g="0" b="0"/>
+      </a:lnRef>
+      <a:fillRef idx="1">
+        <a:scrgbClr r="0" g="0" b="0"/>
+      </a:fillRef>
+      <a:effectRef idx="0">
+        <a:scrgbClr r="0" g="0" b="0"/>
+      </a:effectRef>
+      <a:fontRef idx="minor">
+        <a:schemeClr val="lt1"/>
+      </a:fontRef>
+    </dgm:style>
+  </dgm:styleLbl>
+  <dgm:styleLbl name="lnNode1">
+    <dgm:scene3d>
+      <a:camera prst="orthographicFront"/>
+      <a:lightRig rig="threePt" dir="t"/>
+    </dgm:scene3d>
+    <dgm:sp3d/>
+    <dgm:txPr/>
+    <dgm:style>
+      <a:lnRef idx="2">
+        <a:scrgbClr r="0" g="0" b="0"/>
+      </a:lnRef>
+      <a:fillRef idx="1">
+        <a:scrgbClr r="0" g="0" b="0"/>
+      </a:fillRef>
+      <a:effectRef idx="0">
+        <a:scrgbClr r="0" g="0" b="0"/>
+      </a:effectRef>
+      <a:fontRef idx="minor">
+        <a:schemeClr val="lt1"/>
+      </a:fontRef>
+    </dgm:style>
+  </dgm:styleLbl>
+  <dgm:styleLbl name="vennNode1">
+    <dgm:scene3d>
+      <a:camera prst="orthographicFront"/>
+      <a:lightRig rig="threePt" dir="t"/>
+    </dgm:scene3d>
+    <dgm:sp3d/>
+    <dgm:txPr/>
+    <dgm:style>
+      <a:lnRef idx="2">
+        <a:scrgbClr r="0" g="0" b="0"/>
+      </a:lnRef>
+      <a:fillRef idx="1">
+        <a:scrgbClr r="0" g="0" b="0"/>
+      </a:fillRef>
+      <a:effectRef idx="0">
+        <a:scrgbClr r="0" g="0" b="0"/>
+      </a:effectRef>
+      <a:fontRef idx="minor">
+        <a:schemeClr val="tx1"/>
+      </a:fontRef>
+    </dgm:style>
+  </dgm:styleLbl>
+  <dgm:styleLbl name="alignNode1">
+    <dgm:scene3d>
+      <a:camera prst="orthographicFront"/>
+      <a:lightRig rig="threePt" dir="t"/>
+    </dgm:scene3d>
+    <dgm:sp3d/>
+    <dgm:txPr/>
+    <dgm:style>
+      <a:lnRef idx="2">
+        <a:scrgbClr r="0" g="0" b="0"/>
+      </a:lnRef>
+      <a:fillRef idx="1">
+        <a:scrgbClr r="0" g="0" b="0"/>
+      </a:fillRef>
+      <a:effectRef idx="0">
+        <a:scrgbClr r="0" g="0" b="0"/>
+      </a:effectRef>
+      <a:fontRef idx="minor">
+        <a:schemeClr val="lt1"/>
+      </a:fontRef>
+    </dgm:style>
+  </dgm:styleLbl>
+  <dgm:styleLbl name="node1">
+    <dgm:scene3d>
+      <a:camera prst="orthographicFront"/>
+      <a:lightRig rig="threePt" dir="t"/>
+    </dgm:scene3d>
+    <dgm:sp3d/>
+    <dgm:txPr/>
+    <dgm:style>
+      <a:lnRef idx="2">
+        <a:scrgbClr r="0" g="0" b="0"/>
+      </a:lnRef>
+      <a:fillRef idx="1">
+        <a:scrgbClr r="0" g="0" b="0"/>
+      </a:fillRef>
+      <a:effectRef idx="0">
+        <a:scrgbClr r="0" g="0" b="0"/>
+      </a:effectRef>
+      <a:fontRef idx="minor">
+        <a:schemeClr val="lt1"/>
+      </a:fontRef>
+    </dgm:style>
+  </dgm:styleLbl>
+  <dgm:styleLbl name="node2">
+    <dgm:scene3d>
+      <a:camera prst="orthographicFront"/>
+      <a:lightRig rig="threePt" dir="t"/>
+    </dgm:scene3d>
+    <dgm:sp3d/>
+    <dgm:txPr/>
+    <dgm:style>
+      <a:lnRef idx="2">
+        <a:scrgbClr r="0" g="0" b="0"/>
+      </a:lnRef>
+      <a:fillRef idx="1">
+        <a:scrgbClr r="0" g="0" b="0"/>
+      </a:fillRef>
+      <a:effectRef idx="0">
+        <a:scrgbClr r="0" g="0" b="0"/>
+      </a:effectRef>
+      <a:fontRef idx="minor">
+        <a:schemeClr val="lt1"/>
+      </a:fontRef>
+    </dgm:style>
+  </dgm:styleLbl>
+  <dgm:styleLbl name="node3">
+    <dgm:scene3d>
+      <a:camera prst="orthographicFront"/>
+      <a:lightRig rig="threePt" dir="t"/>
+    </dgm:scene3d>
+    <dgm:sp3d/>
+    <dgm:txPr/>
+    <dgm:style>
+      <a:lnRef idx="2">
+        <a:scrgbClr r="0" g="0" b="0"/>
+      </a:lnRef>
+      <a:fillRef idx="1">
+        <a:scrgbClr r="0" g="0" b="0"/>
+      </a:fillRef>
+      <a:effectRef idx="0">
+        <a:scrgbClr r="0" g="0" b="0"/>
+      </a:effectRef>
+      <a:fontRef idx="minor">
+        <a:schemeClr val="lt1"/>
+      </a:fontRef>
+    </dgm:style>
+  </dgm:styleLbl>
+  <dgm:styleLbl name="node4">
+    <dgm:scene3d>
+      <a:camera prst="orthographicFront"/>
+      <a:lightRig rig="threePt" dir="t"/>
+    </dgm:scene3d>
+    <dgm:sp3d/>
+    <dgm:txPr/>
+    <dgm:style>
+      <a:lnRef idx="2">
+        <a:scrgbClr r="0" g="0" b="0"/>
+      </a:lnRef>
+      <a:fillRef idx="1">
+        <a:scrgbClr r="0" g="0" b="0"/>
+      </a:fillRef>
+      <a:effectRef idx="0">
+        <a:scrgbClr r="0" g="0" b="0"/>
+      </a:effectRef>
+      <a:fontRef idx="minor">
+        <a:schemeClr val="lt1"/>
+      </a:fontRef>
+    </dgm:style>
+  </dgm:styleLbl>
+  <dgm:styleLbl name="fgImgPlace1">
+    <dgm:scene3d>
+      <a:camera prst="orthographicFront"/>
+      <a:lightRig rig="threePt" dir="t"/>
+    </dgm:scene3d>
+    <dgm:sp3d/>
+    <dgm:txPr/>
+    <dgm:style>
+      <a:lnRef idx="2">
+        <a:scrgbClr r="0" g="0" b="0"/>
+      </a:lnRef>
+      <a:fillRef idx="1">
+        <a:scrgbClr r="0" g="0" b="0"/>
+      </a:fillRef>
+      <a:effectRef idx="0">
+        <a:scrgbClr r="0" g="0" b="0"/>
+      </a:effectRef>
+      <a:fontRef idx="minor"/>
+    </dgm:style>
+  </dgm:styleLbl>
+  <dgm:styleLbl name="alignImgPlace1">
+    <dgm:scene3d>
+      <a:camera prst="orthographicFront"/>
+      <a:lightRig rig="threePt" dir="t"/>
+    </dgm:scene3d>
+    <dgm:sp3d/>
+    <dgm:txPr/>
+    <dgm:style>
+      <a:lnRef idx="2">
+        <a:scrgbClr r="0" g="0" b="0"/>
+      </a:lnRef>
+      <a:fillRef idx="1">
+        <a:scrgbClr r="0" g="0" b="0"/>
+      </a:fillRef>
+      <a:effectRef idx="0">
+        <a:scrgbClr r="0" g="0" b="0"/>
+      </a:effectRef>
+      <a:fontRef idx="minor"/>
+    </dgm:style>
+  </dgm:styleLbl>
+  <dgm:styleLbl name="bgImgPlace1">
+    <dgm:scene3d>
+      <a:camera prst="orthographicFront"/>
+      <a:lightRig rig="threePt" dir="t"/>
+    </dgm:scene3d>
+    <dgm:sp3d/>
+    <dgm:txPr/>
+    <dgm:style>
+      <a:lnRef idx="2">
+        <a:scrgbClr r="0" g="0" b="0"/>
+      </a:lnRef>
+      <a:fillRef idx="1">
+        <a:scrgbClr r="0" g="0" b="0"/>
+      </a:fillRef>
+      <a:effectRef idx="0">
+        <a:scrgbClr r="0" g="0" b="0"/>
+      </a:effectRef>
+      <a:fontRef idx="minor"/>
+    </dgm:style>
+  </dgm:styleLbl>
+  <dgm:styleLbl name="sibTrans2D1">
+    <dgm:scene3d>
+      <a:camera prst="orthographicFront"/>
+      <a:lightRig rig="threePt" dir="t"/>
+    </dgm:scene3d>
+    <dgm:sp3d/>
+    <dgm:txPr/>
+    <dgm:style>
+      <a:lnRef idx="0">
+        <a:scrgbClr r="0" g="0" b="0"/>
+      </a:lnRef>
+      <a:fillRef idx="1">
+        <a:scrgbClr r="0" g="0" b="0"/>
+      </a:fillRef>
+      <a:effectRef idx="0">
+        <a:scrgbClr r="0" g="0" b="0"/>
+      </a:effectRef>
+      <a:fontRef idx="minor">
+        <a:schemeClr val="lt1"/>
+      </a:fontRef>
+    </dgm:style>
+  </dgm:styleLbl>
+  <dgm:styleLbl name="fgSibTrans2D1">
+    <dgm:scene3d>
+      <a:camera prst="orthographicFront"/>
+      <a:lightRig rig="threePt" dir="t"/>
+    </dgm:scene3d>
+    <dgm:sp3d/>
+    <dgm:txPr/>
+    <dgm:style>
+      <a:lnRef idx="0">
+        <a:scrgbClr r="0" g="0" b="0"/>
+      </a:lnRef>
+      <a:fillRef idx="1">
+        <a:scrgbClr r="0" g="0" b="0"/>
+      </a:fillRef>
+      <a:effectRef idx="0">
+        <a:scrgbClr r="0" g="0" b="0"/>
+      </a:effectRef>
+      <a:fontRef idx="minor">
+        <a:schemeClr val="lt1"/>
+      </a:fontRef>
+    </dgm:style>
+  </dgm:styleLbl>
+  <dgm:styleLbl name="bgSibTrans2D1">
+    <dgm:scene3d>
+      <a:camera prst="orthographicFront"/>
+      <a:lightRig rig="threePt" dir="t"/>
+    </dgm:scene3d>
+    <dgm:sp3d/>
+    <dgm:txPr/>
+    <dgm:style>
+      <a:lnRef idx="0">
+        <a:scrgbClr r="0" g="0" b="0"/>
+      </a:lnRef>
+      <a:fillRef idx="1">
+        <a:scrgbClr r="0" g="0" b="0"/>
+      </a:fillRef>
+      <a:effectRef idx="0">
+        <a:scrgbClr r="0" g="0" b="0"/>
+      </a:effectRef>
+      <a:fontRef idx="minor">
+        <a:schemeClr val="lt1"/>
+      </a:fontRef>
+    </dgm:style>
+  </dgm:styleLbl>
+  <dgm:styleLbl name="sibTrans1D1">
+    <dgm:scene3d>
+      <a:camera prst="orthographicFront"/>
+      <a:lightRig rig="threePt" dir="t"/>
+    </dgm:scene3d>
+    <dgm:sp3d/>
+    <dgm:txPr/>
+    <dgm:style>
+      <a:lnRef idx="1">
+        <a:scrgbClr r="0" g="0" b="0"/>
+      </a:lnRef>
+      <a:fillRef idx="0">
+        <a:scrgbClr r="0" g="0" b="0"/>
+      </a:fillRef>
+      <a:effectRef idx="0">
+        <a:scrgbClr r="0" g="0" b="0"/>
+      </a:effectRef>
+      <a:fontRef idx="minor"/>
+    </dgm:style>
+  </dgm:styleLbl>
+  <dgm:styleLbl name="callout">
+    <dgm:scene3d>
+      <a:camera prst="orthographicFront"/>
+      <a:lightRig rig="threePt" dir="t"/>
+    </dgm:scene3d>
+    <dgm:sp3d/>
+    <dgm:txPr/>
+    <dgm:style>
+      <a:lnRef idx="2">
+        <a:scrgbClr r="0" g="0" b="0"/>
+      </a:lnRef>
+      <a:fillRef idx="1">
+        <a:scrgbClr r="0" g="0" b="0"/>
+      </a:fillRef>
+      <a:effectRef idx="0">
+        <a:scrgbClr r="0" g="0" b="0"/>
+      </a:effectRef>
+      <a:fontRef idx="minor"/>
+    </dgm:style>
+  </dgm:styleLbl>
+  <dgm:styleLbl name="asst0">
+    <dgm:scene3d>
+      <a:camera prst="orthographicFront"/>
+      <a:lightRig rig="threePt" dir="t"/>
+    </dgm:scene3d>
+    <dgm:sp3d/>
+    <dgm:txPr/>
+    <dgm:style>
+      <a:lnRef idx="2">
+        <a:scrgbClr r="0" g="0" b="0"/>
+      </a:lnRef>
+      <a:fillRef idx="1">
+        <a:scrgbClr r="0" g="0" b="0"/>
+      </a:fillRef>
+      <a:effectRef idx="0">
+        <a:scrgbClr r="0" g="0" b="0"/>
+      </a:effectRef>
+      <a:fontRef idx="minor">
+        <a:schemeClr val="lt1"/>
+      </a:fontRef>
+    </dgm:style>
+  </dgm:styleLbl>
+  <dgm:styleLbl name="asst1">
+    <dgm:scene3d>
+      <a:camera prst="orthographicFront"/>
+      <a:lightRig rig="threePt" dir="t"/>
+    </dgm:scene3d>
+    <dgm:sp3d/>
+    <dgm:txPr/>
+    <dgm:style>
+      <a:lnRef idx="2">
+        <a:scrgbClr r="0" g="0" b="0"/>
+      </a:lnRef>
+      <a:fillRef idx="1">
+        <a:scrgbClr r="0" g="0" b="0"/>
+      </a:fillRef>
+      <a:effectRef idx="0">
+        <a:scrgbClr r="0" g="0" b="0"/>
+      </a:effectRef>
+      <a:fontRef idx="minor">
+        <a:schemeClr val="lt1"/>
+      </a:fontRef>
+    </dgm:style>
+  </dgm:styleLbl>
+  <dgm:styleLbl name="asst2">
+    <dgm:scene3d>
+      <a:camera prst="orthographicFront"/>
+      <a:lightRig rig="threePt" dir="t"/>
+    </dgm:scene3d>
+    <dgm:sp3d/>
+    <dgm:txPr/>
+    <dgm:style>
+      <a:lnRef idx="2">
+        <a:scrgbClr r="0" g="0" b="0"/>
+      </a:lnRef>
+      <a:fillRef idx="1">
+        <a:scrgbClr r="0" g="0" b="0"/>
+      </a:fillRef>
+      <a:effectRef idx="0">
+        <a:scrgbClr r="0" g="0" b="0"/>
+      </a:effectRef>
+      <a:fontRef idx="minor">
+        <a:schemeClr val="lt1"/>
+      </a:fontRef>
+    </dgm:style>
+  </dgm:styleLbl>
+  <dgm:styleLbl name="asst3">
+    <dgm:scene3d>
+      <a:camera prst="orthographicFront"/>
+      <a:lightRig rig="threePt" dir="t"/>
+    </dgm:scene3d>
+    <dgm:sp3d/>
+    <dgm:txPr/>
+    <dgm:style>
+      <a:lnRef idx="2">
+        <a:scrgbClr r="0" g="0" b="0"/>
+      </a:lnRef>
+      <a:fillRef idx="1">
+        <a:scrgbClr r="0" g="0" b="0"/>
+      </a:fillRef>
+      <a:effectRef idx="0">
+        <a:scrgbClr r="0" g="0" b="0"/>
+      </a:effectRef>
+      <a:fontRef idx="minor">
+        <a:schemeClr val="lt1"/>
+      </a:fontRef>
+    </dgm:style>
+  </dgm:styleLbl>
+  <dgm:styleLbl name="asst4">
+    <dgm:scene3d>
+      <a:camera prst="orthographicFront"/>
+      <a:lightRig rig="threePt" dir="t"/>
+    </dgm:scene3d>
+    <dgm:sp3d/>
+    <dgm:txPr/>
+    <dgm:style>
+      <a:lnRef idx="2">
+        <a:scrgbClr r="0" g="0" b="0"/>
+      </a:lnRef>
+      <a:fillRef idx="1">
+        <a:scrgbClr r="0" g="0" b="0"/>
+      </a:fillRef>
+      <a:effectRef idx="0">
+        <a:scrgbClr r="0" g="0" b="0"/>
+      </a:effectRef>
+      <a:fontRef idx="minor">
+        <a:schemeClr val="lt1"/>
+      </a:fontRef>
+    </dgm:style>
+  </dgm:styleLbl>
+  <dgm:styleLbl name="parChTrans2D1">
+    <dgm:scene3d>
+      <a:camera prst="orthographicFront"/>
+      <a:lightRig rig="threePt" dir="t"/>
+    </dgm:scene3d>
+    <dgm:sp3d/>
+    <dgm:txPr/>
+    <dgm:style>
+      <a:lnRef idx="2">
+        <a:scrgbClr r="0" g="0" b="0"/>
+      </a:lnRef>
+      <a:fillRef idx="1">
+        <a:scrgbClr r="0" g="0" b="0"/>
+      </a:fillRef>
+      <a:effectRef idx="0">
+        <a:scrgbClr r="0" g="0" b="0"/>
+      </a:effectRef>
+      <a:fontRef idx="minor">
+        <a:schemeClr val="lt1"/>
+      </a:fontRef>
+    </dgm:style>
+  </dgm:styleLbl>
+  <dgm:styleLbl name="parChTrans2D2">
+    <dgm:scene3d>
+      <a:camera prst="orthographicFront"/>
+      <a:lightRig rig="threePt" dir="t"/>
+    </dgm:scene3d>
+    <dgm:sp3d/>
+    <dgm:txPr/>
+    <dgm:style>
+      <a:lnRef idx="2">
+        <a:scrgbClr r="0" g="0" b="0"/>
+      </a:lnRef>
+      <a:fillRef idx="1">
+        <a:scrgbClr r="0" g="0" b="0"/>
+      </a:fillRef>
+      <a:effectRef idx="0">
+        <a:scrgbClr r="0" g="0" b="0"/>
+      </a:effectRef>
+      <a:fontRef idx="minor">
+        <a:schemeClr val="lt1"/>
+      </a:fontRef>
+    </dgm:style>
+  </dgm:styleLbl>
+  <dgm:styleLbl name="parChTrans2D3">
+    <dgm:scene3d>
+      <a:camera prst="orthographicFront"/>
+      <a:lightRig rig="threePt" dir="t"/>
+    </dgm:scene3d>
+    <dgm:sp3d/>
+    <dgm:txPr/>
+    <dgm:style>
+      <a:lnRef idx="2">
+        <a:scrgbClr r="0" g="0" b="0"/>
+      </a:lnRef>
+      <a:fillRef idx="1">
+        <a:scrgbClr r="0" g="0" b="0"/>
+      </a:fillRef>
+      <a:effectRef idx="0">
+        <a:scrgbClr r="0" g="0" b="0"/>
+      </a:effectRef>
+      <a:fontRef idx="minor">
+        <a:schemeClr val="lt1"/>
+      </a:fontRef>
+    </dgm:style>
+  </dgm:styleLbl>
+  <dgm:styleLbl name="parChTrans2D4">
+    <dgm:scene3d>
+      <a:camera prst="orthographicFront"/>
+      <a:lightRig rig="threePt" dir="t"/>
+    </dgm:scene3d>
+    <dgm:sp3d/>
+    <dgm:txPr/>
+    <dgm:style>
+      <a:lnRef idx="2">
+        <a:scrgbClr r="0" g="0" b="0"/>
+      </a:lnRef>
+      <a:fillRef idx="1">
+        <a:scrgbClr r="0" g="0" b="0"/>
+      </a:fillRef>
+      <a:effectRef idx="0">
+        <a:scrgbClr r="0" g="0" b="0"/>
+      </a:effectRef>
+      <a:fontRef idx="minor">
+        <a:schemeClr val="lt1"/>
+      </a:fontRef>
+    </dgm:style>
+  </dgm:styleLbl>
+  <dgm:styleLbl name="parChTrans1D1">
+    <dgm:scene3d>
+      <a:camera prst="orthographicFront"/>
+      <a:lightRig rig="threePt" dir="t"/>
+    </dgm:scene3d>
+    <dgm:sp3d/>
+    <dgm:txPr/>
+    <dgm:style>
+      <a:lnRef idx="2">
+        <a:scrgbClr r="0" g="0" b="0"/>
+      </a:lnRef>
+      <a:fillRef idx="0">
+        <a:scrgbClr r="0" g="0" b="0"/>
+      </a:fillRef>
+      <a:effectRef idx="0">
+        <a:scrgbClr r="0" g="0" b="0"/>
+      </a:effectRef>
+      <a:fontRef idx="minor"/>
+    </dgm:style>
+  </dgm:styleLbl>
+  <dgm:styleLbl name="parChTrans1D2">
+    <dgm:scene3d>
+      <a:camera prst="orthographicFront"/>
+      <a:lightRig rig="threePt" dir="t"/>
+    </dgm:scene3d>
+    <dgm:sp3d/>
+    <dgm:txPr/>
+    <dgm:style>
+      <a:lnRef idx="2">
+        <a:scrgbClr r="0" g="0" b="0"/>
+      </a:lnRef>
+      <a:fillRef idx="0">
+        <a:scrgbClr r="0" g="0" b="0"/>
+      </a:fillRef>
+      <a:effectRef idx="0">
+        <a:scrgbClr r="0" g="0" b="0"/>
+      </a:effectRef>
+      <a:fontRef idx="minor"/>
+    </dgm:style>
+  </dgm:styleLbl>
+  <dgm:styleLbl name="parChTrans1D3">
+    <dgm:scene3d>
+      <a:camera prst="orthographicFront"/>
+      <a:lightRig rig="threePt" dir="t"/>
+    </dgm:scene3d>
+    <dgm:sp3d/>
+    <dgm:txPr/>
+    <dgm:style>
+      <a:lnRef idx="2">
+        <a:scrgbClr r="0" g="0" b="0"/>
+      </a:lnRef>
+      <a:fillRef idx="0">
+        <a:scrgbClr r="0" g="0" b="0"/>
+      </a:fillRef>
+      <a:effectRef idx="0">
+        <a:scrgbClr r="0" g="0" b="0"/>
+      </a:effectRef>
+      <a:fontRef idx="minor"/>
+    </dgm:style>
+  </dgm:styleLbl>
+  <dgm:styleLbl name="parChTrans1D4">
+    <dgm:scene3d>
+      <a:camera prst="orthographicFront"/>
+      <a:lightRig rig="threePt" dir="t"/>
+    </dgm:scene3d>
+    <dgm:sp3d/>
+    <dgm:txPr/>
+    <dgm:style>
+      <a:lnRef idx="2">
+        <a:scrgbClr r="0" g="0" b="0"/>
+      </a:lnRef>
+      <a:fillRef idx="0">
+        <a:scrgbClr r="0" g="0" b="0"/>
+      </a:fillRef>
+      <a:effectRef idx="0">
+        <a:scrgbClr r="0" g="0" b="0"/>
+      </a:effectRef>
+      <a:fontRef idx="minor"/>
+    </dgm:style>
+  </dgm:styleLbl>
+  <dgm:styleLbl name="fgAcc1">
+    <dgm:scene3d>
+      <a:camera prst="orthographicFront"/>
+      <a:lightRig rig="threePt" dir="t"/>
+    </dgm:scene3d>
+    <dgm:sp3d/>
+    <dgm:txPr/>
+    <dgm:style>
+      <a:lnRef idx="2">
+        <a:scrgbClr r="0" g="0" b="0"/>
+      </a:lnRef>
+      <a:fillRef idx="1">
+        <a:scrgbClr r="0" g="0" b="0"/>
+      </a:fillRef>
+      <a:effectRef idx="0">
+        <a:scrgbClr r="0" g="0" b="0"/>
+      </a:effectRef>
+      <a:fontRef idx="minor"/>
+    </dgm:style>
+  </dgm:styleLbl>
+  <dgm:styleLbl name="conFgAcc1">
+    <dgm:scene3d>
+      <a:camera prst="orthographicFront"/>
+      <a:lightRig rig="threePt" dir="t"/>
+    </dgm:scene3d>
+    <dgm:sp3d/>
+    <dgm:txPr/>
+    <dgm:style>
+      <a:lnRef idx="2">
+        <a:scrgbClr r="0" g="0" b="0"/>
+      </a:lnRef>
+      <a:fillRef idx="1">
+        <a:scrgbClr r="0" g="0" b="0"/>
+      </a:fillRef>
+      <a:effectRef idx="0">
+        <a:scrgbClr r="0" g="0" b="0"/>
+      </a:effectRef>
+      <a:fontRef idx="minor"/>
+    </dgm:style>
+  </dgm:styleLbl>
+  <dgm:styleLbl name="alignAcc1">
+    <dgm:scene3d>
+      <a:camera prst="orthographicFront"/>
+      <a:lightRig rig="threePt" dir="t"/>
+    </dgm:scene3d>
+    <dgm:sp3d/>
+    <dgm:txPr/>
+    <dgm:style>
+      <a:lnRef idx="2">
+        <a:scrgbClr r="0" g="0" b="0"/>
+      </a:lnRef>
+      <a:fillRef idx="1">
+        <a:scrgbClr r="0" g="0" b="0"/>
+      </a:fillRef>
+      <a:effectRef idx="0">
+        <a:scrgbClr r="0" g="0" b="0"/>
+      </a:effectRef>
+      <a:fontRef idx="minor"/>
+    </dgm:style>
+  </dgm:styleLbl>
+  <dgm:styleLbl name="trAlignAcc1">
+    <dgm:scene3d>
+      <a:camera prst="orthographicFront"/>
+      <a:lightRig rig="threePt" dir="t"/>
+    </dgm:scene3d>
+    <dgm:sp3d/>
+    <dgm:txPr/>
+    <dgm:style>
+      <a:lnRef idx="1">
+        <a:scrgbClr r="0" g="0" b="0"/>
+      </a:lnRef>
+      <a:fillRef idx="1">
+        <a:scrgbClr r="0" g="0" b="0"/>
+      </a:fillRef>
+      <a:effectRef idx="0">
+        <a:scrgbClr r="0" g="0" b="0"/>
+      </a:effectRef>
+      <a:fontRef idx="minor"/>
+    </dgm:style>
+  </dgm:styleLbl>
+  <dgm:styleLbl name="bgAcc1">
+    <dgm:scene3d>
+      <a:camera prst="orthographicFront"/>
+      <a:lightRig rig="threePt" dir="t"/>
+    </dgm:scene3d>
+    <dgm:sp3d/>
+    <dgm:txPr/>
+    <dgm:style>
+      <a:lnRef idx="2">
+        <a:scrgbClr r="0" g="0" b="0"/>
+      </a:lnRef>
+      <a:fillRef idx="1">
+        <a:scrgbClr r="0" g="0" b="0"/>
+      </a:fillRef>
+      <a:effectRef idx="0">
+        <a:scrgbClr r="0" g="0" b="0"/>
+      </a:effectRef>
+      <a:fontRef idx="minor"/>
+    </dgm:style>
+  </dgm:styleLbl>
+  <dgm:styleLbl name="solidFgAcc1">
+    <dgm:scene3d>
+      <a:camera prst="orthographicFront"/>
+      <a:lightRig rig="threePt" dir="t"/>
+    </dgm:scene3d>
+    <dgm:sp3d/>
+    <dgm:txPr/>
+    <dgm:style>
+      <a:lnRef idx="2">
+        <a:scrgbClr r="0" g="0" b="0"/>
+      </a:lnRef>
+      <a:fillRef idx="1">
+        <a:scrgbClr r="0" g="0" b="0"/>
+      </a:fillRef>
+      <a:effectRef idx="0">
+        <a:scrgbClr r="0" g="0" b="0"/>
+      </a:effectRef>
+      <a:fontRef idx="minor"/>
+    </dgm:style>
+  </dgm:styleLbl>
+  <dgm:styleLbl name="solidAlignAcc1">
+    <dgm:scene3d>
+      <a:camera prst="orthographicFront"/>
+      <a:lightRig rig="threePt" dir="t"/>
+    </dgm:scene3d>
+    <dgm:sp3d/>
+    <dgm:txPr/>
+    <dgm:style>
+      <a:lnRef idx="2">
+        <a:scrgbClr r="0" g="0" b="0"/>
+      </a:lnRef>
+      <a:fillRef idx="1">
+        <a:scrgbClr r="0" g="0" b="0"/>
+      </a:fillRef>
+      <a:effectRef idx="0">
+        <a:scrgbClr r="0" g="0" b="0"/>
+      </a:effectRef>
+      <a:fontRef idx="minor"/>
+    </dgm:style>
+  </dgm:styleLbl>
+  <dgm:styleLbl name="solidBgAcc1">
+    <dgm:scene3d>
+      <a:camera prst="orthographicFront"/>
+      <a:lightRig rig="threePt" dir="t"/>
+    </dgm:scene3d>
+    <dgm:sp3d/>
+    <dgm:txPr/>
+    <dgm:style>
+      <a:lnRef idx="2">
+        <a:scrgbClr r="0" g="0" b="0"/>
+      </a:lnRef>
+      <a:fillRef idx="1">
+        <a:scrgbClr r="0" g="0" b="0"/>
+      </a:fillRef>
+      <a:effectRef idx="0">
+        <a:scrgbClr r="0" g="0" b="0"/>
+      </a:effectRef>
+      <a:fontRef idx="minor"/>
+    </dgm:style>
+  </dgm:styleLbl>
+  <dgm:styleLbl name="fgAccFollowNode1">
+    <dgm:scene3d>
+      <a:camera prst="orthographicFront"/>
+      <a:lightRig rig="threePt" dir="t"/>
+    </dgm:scene3d>
+    <dgm:sp3d/>
+    <dgm:txPr/>
+    <dgm:style>
+      <a:lnRef idx="2">
+        <a:scrgbClr r="0" g="0" b="0"/>
+      </a:lnRef>
+      <a:fillRef idx="1">
+        <a:scrgbClr r="0" g="0" b="0"/>
+      </a:fillRef>
+      <a:effectRef idx="0">
+        <a:scrgbClr r="0" g="0" b="0"/>
+      </a:effectRef>
+      <a:fontRef idx="minor"/>
+    </dgm:style>
+  </dgm:styleLbl>
+  <dgm:styleLbl name="alignAccFollowNode1">
+    <dgm:scene3d>
+      <a:camera prst="orthographicFront"/>
+      <a:lightRig rig="threePt" dir="t"/>
+    </dgm:scene3d>
+    <dgm:sp3d/>
+    <dgm:txPr/>
+    <dgm:style>
+      <a:lnRef idx="2">
+        <a:scrgbClr r="0" g="0" b="0"/>
+      </a:lnRef>
+      <a:fillRef idx="1">
+        <a:scrgbClr r="0" g="0" b="0"/>
+      </a:fillRef>
+      <a:effectRef idx="0">
+        <a:scrgbClr r="0" g="0" b="0"/>
+      </a:effectRef>
+      <a:fontRef idx="minor"/>
+    </dgm:style>
+  </dgm:styleLbl>
+  <dgm:styleLbl name="bgAccFollowNode1">
+    <dgm:scene3d>
+      <a:camera prst="orthographicFront"/>
+      <a:lightRig rig="threePt" dir="t"/>
+    </dgm:scene3d>
+    <dgm:sp3d/>
+    <dgm:txPr/>
+    <dgm:style>
+      <a:lnRef idx="2">
+        <a:scrgbClr r="0" g="0" b="0"/>
+      </a:lnRef>
+      <a:fillRef idx="1">
+        <a:scrgbClr r="0" g="0" b="0"/>
+      </a:fillRef>
+      <a:effectRef idx="0">
+        <a:scrgbClr r="0" g="0" b="0"/>
+      </a:effectRef>
+      <a:fontRef idx="minor"/>
+    </dgm:style>
+  </dgm:styleLbl>
+  <dgm:styleLbl name="fgAcc0">
+    <dgm:scene3d>
+      <a:camera prst="orthographicFront"/>
+      <a:lightRig rig="threePt" dir="t"/>
+    </dgm:scene3d>
+    <dgm:sp3d/>
+    <dgm:txPr/>
+    <dgm:style>
+      <a:lnRef idx="2">
+        <a:scrgbClr r="0" g="0" b="0"/>
+      </a:lnRef>
+      <a:fillRef idx="1">
+        <a:scrgbClr r="0" g="0" b="0"/>
+      </a:fillRef>
+      <a:effectRef idx="0">
+        <a:scrgbClr r="0" g="0" b="0"/>
+      </a:effectRef>
+      <a:fontRef idx="minor"/>
+    </dgm:style>
+  </dgm:styleLbl>
+  <dgm:styleLbl name="fgAcc2">
+    <dgm:scene3d>
+      <a:camera prst="orthographicFront"/>
+      <a:lightRig rig="threePt" dir="t"/>
+    </dgm:scene3d>
+    <dgm:sp3d/>
+    <dgm:txPr/>
+    <dgm:style>
+      <a:lnRef idx="2">
+        <a:scrgbClr r="0" g="0" b="0"/>
+      </a:lnRef>
+      <a:fillRef idx="1">
+        <a:scrgbClr r="0" g="0" b="0"/>
+      </a:fillRef>
+      <a:effectRef idx="0">
+        <a:scrgbClr r="0" g="0" b="0"/>
+      </a:effectRef>
+      <a:fontRef idx="minor"/>
+    </dgm:style>
+  </dgm:styleLbl>
+  <dgm:styleLbl name="fgAcc3">
+    <dgm:scene3d>
+      <a:camera prst="orthographicFront"/>
+      <a:lightRig rig="threePt" dir="t"/>
+    </dgm:scene3d>
+    <dgm:sp3d/>
+    <dgm:txPr/>
+    <dgm:style>
+      <a:lnRef idx="2">
+        <a:scrgbClr r="0" g="0" b="0"/>
+      </a:lnRef>
+      <a:fillRef idx="1">
+        <a:scrgbClr r="0" g="0" b="0"/>
+      </a:fillRef>
+      <a:effectRef idx="0">
+        <a:scrgbClr r="0" g="0" b="0"/>
+      </a:effectRef>
+      <a:fontRef idx="minor"/>
+    </dgm:style>
+  </dgm:styleLbl>
+  <dgm:styleLbl name="fgAcc4">
+    <dgm:scene3d>
+      <a:camera prst="orthographicFront"/>
+      <a:lightRig rig="threePt" dir="t"/>
+    </dgm:scene3d>
+    <dgm:sp3d/>
+    <dgm:txPr/>
+    <dgm:style>
+      <a:lnRef idx="2">
+        <a:scrgbClr r="0" g="0" b="0"/>
+      </a:lnRef>
+      <a:fillRef idx="1">
+        <a:scrgbClr r="0" g="0" b="0"/>
+      </a:fillRef>
+      <a:effectRef idx="0">
+        <a:scrgbClr r="0" g="0" b="0"/>
+      </a:effectRef>
+      <a:fontRef idx="minor"/>
+    </dgm:style>
+  </dgm:styleLbl>
+  <dgm:styleLbl name="bgShp">
+    <dgm:scene3d>
+      <a:camera prst="orthographicFront"/>
+      <a:lightRig rig="threePt" dir="t"/>
+    </dgm:scene3d>
+    <dgm:sp3d/>
+    <dgm:txPr/>
+    <dgm:style>
+      <a:lnRef idx="0">
+        <a:scrgbClr r="0" g="0" b="0"/>
+      </a:lnRef>
+      <a:fillRef idx="1">
+        <a:scrgbClr r="0" g="0" b="0"/>
+      </a:fillRef>
+      <a:effectRef idx="0">
+        <a:scrgbClr r="0" g="0" b="0"/>
+      </a:effectRef>
+      <a:fontRef idx="minor"/>
+    </dgm:style>
+  </dgm:styleLbl>
+  <dgm:styleLbl name="dkBgShp">
+    <dgm:scene3d>
+      <a:camera prst="orthographicFront"/>
+      <a:lightRig rig="threePt" dir="t"/>
+    </dgm:scene3d>
+    <dgm:sp3d/>
+    <dgm:txPr/>
+    <dgm:style>
+      <a:lnRef idx="0">
+        <a:scrgbClr r="0" g="0" b="0"/>
+      </a:lnRef>
+      <a:fillRef idx="1">
+        <a:scrgbClr r="0" g="0" b="0"/>
+      </a:fillRef>
+      <a:effectRef idx="0">
+        <a:scrgbClr r="0" g="0" b="0"/>
+      </a:effectRef>
+      <a:fontRef idx="minor"/>
+    </dgm:style>
+  </dgm:styleLbl>
+  <dgm:styleLbl name="trBgShp">
+    <dgm:scene3d>
+      <a:camera prst="orthographicFront"/>
+      <a:lightRig rig="threePt" dir="t"/>
+    </dgm:scene3d>
+    <dgm:sp3d/>
+    <dgm:txPr/>
+    <dgm:style>
+      <a:lnRef idx="0">
+        <a:scrgbClr r="0" g="0" b="0"/>
+      </a:lnRef>
+      <a:fillRef idx="1">
+        <a:scrgbClr r="0" g="0" b="0"/>
+      </a:fillRef>
+      <a:effectRef idx="0">
+        <a:scrgbClr r="0" g="0" b="0"/>
+      </a:effectRef>
+      <a:fontRef idx="minor"/>
+    </dgm:style>
+  </dgm:styleLbl>
+  <dgm:styleLbl name="fgShp">
+    <dgm:scene3d>
+      <a:camera prst="orthographicFront"/>
+      <a:lightRig rig="threePt" dir="t"/>
+    </dgm:scene3d>
+    <dgm:sp3d/>
+    <dgm:txPr/>
+    <dgm:style>
+      <a:lnRef idx="2">
+        <a:scrgbClr r="0" g="0" b="0"/>
+      </a:lnRef>
+      <a:fillRef idx="1">
+        <a:scrgbClr r="0" g="0" b="0"/>
+      </a:fillRef>
+      <a:effectRef idx="0">
+        <a:scrgbClr r="0" g="0" b="0"/>
+      </a:effectRef>
+      <a:fontRef idx="minor"/>
+    </dgm:style>
+  </dgm:styleLbl>
+  <dgm:styleLbl name="revTx">
+    <dgm:scene3d>
+      <a:camera prst="orthographicFront"/>
+      <a:lightRig rig="threePt" dir="t"/>
+    </dgm:scene3d>
+    <dgm:sp3d/>
+    <dgm:txPr/>
+    <dgm:style>
+      <a:lnRef idx="0">
+        <a:scrgbClr r="0" g="0" b="0"/>
+      </a:lnRef>
+      <a:fillRef idx="0">
+        <a:scrgbClr r="0" g="0" b="0"/>
+      </a:fillRef>
+      <a:effectRef idx="0">
+        <a:scrgbClr r="0" g="0" b="0"/>
+      </a:effectRef>
+      <a:fontRef idx="minor"/>
+    </dgm:style>
+  </dgm:styleLbl>
+</dgm:styleDef>
 </file>
 
 <file path=ppt/slideLayouts/slideLayout1.xml><?xml version="1.0" encoding="utf-8"?>
@@ -4844,6 +7960,315 @@
           <a:p>
             <a:r>
               <a:rPr lang="en-US" dirty="0"/>
+              <a:t>Applicant’s verification status if Not verified, then most changes for defaulting</a:t>
+            </a:r>
+          </a:p>
+        </p:txBody>
+      </p:sp>
+      <p:sp>
+        <p:nvSpPr>
+          <p:cNvPr id="4" name="Content Placeholder 3">
+            <a:extLst>
+              <a:ext uri="{FF2B5EF4-FFF2-40B4-BE49-F238E27FC236}">
+                <a16:creationId xmlns:a16="http://schemas.microsoft.com/office/drawing/2014/main" id="{0DCB427B-AEC3-94A2-9F4D-3B43C74DA463}"/>
+              </a:ext>
+            </a:extLst>
+          </p:cNvPr>
+          <p:cNvSpPr>
+            <a:spLocks noGrp="1"/>
+          </p:cNvSpPr>
+          <p:nvPr>
+            <p:ph idx="1"/>
+          </p:nvPr>
+        </p:nvSpPr>
+        <p:spPr/>
+        <p:txBody>
+          <a:bodyPr/>
+          <a:lstStyle/>
+          <a:p>
+            <a:endParaRPr lang="en-US"/>
+          </a:p>
+        </p:txBody>
+      </p:sp>
+      <p:sp>
+        <p:nvSpPr>
+          <p:cNvPr id="5" name="TextBox 4">
+            <a:extLst>
+              <a:ext uri="{FF2B5EF4-FFF2-40B4-BE49-F238E27FC236}">
+                <a16:creationId xmlns:a16="http://schemas.microsoft.com/office/drawing/2014/main" id="{F9D8EC37-0652-4CB8-D329-4FAB280EF4D1}"/>
+              </a:ext>
+            </a:extLst>
+          </p:cNvPr>
+          <p:cNvSpPr txBox="1"/>
+          <p:nvPr/>
+        </p:nvSpPr>
+        <p:spPr>
+          <a:xfrm>
+            <a:off x="8610600" y="4931765"/>
+            <a:ext cx="3066738" cy="923330"/>
+          </a:xfrm>
+          <a:prstGeom prst="rect">
+            <a:avLst/>
+          </a:prstGeom>
+          <a:noFill/>
+        </p:spPr>
+        <p:txBody>
+          <a:bodyPr wrap="square" rtlCol="0">
+            <a:spAutoFit/>
+          </a:bodyPr>
+          <a:lstStyle/>
+          <a:p>
+            <a:r>
+              <a:rPr lang="en-US" dirty="0"/>
+              <a:t>A bank may consider Source Verified over Verified/Not Verified</a:t>
+            </a:r>
+          </a:p>
+        </p:txBody>
+      </p:sp>
+      <p:pic>
+        <p:nvPicPr>
+          <p:cNvPr id="6" name="Picture 5">
+            <a:extLst>
+              <a:ext uri="{FF2B5EF4-FFF2-40B4-BE49-F238E27FC236}">
+                <a16:creationId xmlns:a16="http://schemas.microsoft.com/office/drawing/2014/main" id="{555044DB-4823-BF43-FC73-3982E70D89F9}"/>
+              </a:ext>
+            </a:extLst>
+          </p:cNvPr>
+          <p:cNvPicPr>
+            <a:picLocks noChangeAspect="1"/>
+          </p:cNvPicPr>
+          <p:nvPr/>
+        </p:nvPicPr>
+        <p:blipFill>
+          <a:blip r:embed="rId2"/>
+          <a:stretch>
+            <a:fillRect/>
+          </a:stretch>
+        </p:blipFill>
+        <p:spPr>
+          <a:xfrm>
+            <a:off x="382927" y="172387"/>
+            <a:ext cx="7166969" cy="6513226"/>
+          </a:xfrm>
+          <a:prstGeom prst="rect">
+            <a:avLst/>
+          </a:prstGeom>
+        </p:spPr>
+      </p:pic>
+    </p:spTree>
+    <p:extLst>
+      <p:ext uri="{BB962C8B-B14F-4D97-AF65-F5344CB8AC3E}">
+        <p14:creationId xmlns:p14="http://schemas.microsoft.com/office/powerpoint/2010/main" val="3061500286"/>
+      </p:ext>
+    </p:extLst>
+  </p:cSld>
+  <p:clrMapOvr>
+    <a:masterClrMapping/>
+  </p:clrMapOvr>
+</p:sld>
+</file>
+
+<file path=ppt/slides/slide11.xml><?xml version="1.0" encoding="utf-8"?>
+<p:sld xmlns:a="http://schemas.openxmlformats.org/drawingml/2006/main" xmlns:r="http://schemas.openxmlformats.org/officeDocument/2006/relationships" xmlns:p="http://schemas.openxmlformats.org/presentationml/2006/main">
+  <p:cSld>
+    <p:spTree>
+      <p:nvGrpSpPr>
+        <p:cNvPr id="1" name=""/>
+        <p:cNvGrpSpPr/>
+        <p:nvPr/>
+      </p:nvGrpSpPr>
+      <p:grpSpPr>
+        <a:xfrm>
+          <a:off x="0" y="0"/>
+          <a:ext cx="0" cy="0"/>
+          <a:chOff x="0" y="0"/>
+          <a:chExt cx="0" cy="0"/>
+        </a:xfrm>
+      </p:grpSpPr>
+      <p:sp>
+        <p:nvSpPr>
+          <p:cNvPr id="2" name="Title 1">
+            <a:extLst>
+              <a:ext uri="{FF2B5EF4-FFF2-40B4-BE49-F238E27FC236}">
+                <a16:creationId xmlns:a16="http://schemas.microsoft.com/office/drawing/2014/main" id="{5E28134D-6B5F-5844-284E-FAD8B9F06950}"/>
+              </a:ext>
+            </a:extLst>
+          </p:cNvPr>
+          <p:cNvSpPr>
+            <a:spLocks noGrp="1"/>
+          </p:cNvSpPr>
+          <p:nvPr>
+            <p:ph type="title"/>
+          </p:nvPr>
+        </p:nvSpPr>
+        <p:spPr>
+          <a:xfrm>
+            <a:off x="8631836" y="918652"/>
+            <a:ext cx="3420256" cy="3733764"/>
+          </a:xfrm>
+        </p:spPr>
+        <p:txBody>
+          <a:bodyPr>
+            <a:normAutofit/>
+          </a:bodyPr>
+          <a:lstStyle/>
+          <a:p>
+            <a:r>
+              <a:rPr lang="en-US" dirty="0"/>
+              <a:t>Applicants’ probability of defaulting is high if he/she is from California state</a:t>
+            </a:r>
+          </a:p>
+        </p:txBody>
+      </p:sp>
+      <p:sp>
+        <p:nvSpPr>
+          <p:cNvPr id="4" name="Content Placeholder 3">
+            <a:extLst>
+              <a:ext uri="{FF2B5EF4-FFF2-40B4-BE49-F238E27FC236}">
+                <a16:creationId xmlns:a16="http://schemas.microsoft.com/office/drawing/2014/main" id="{0DCB427B-AEC3-94A2-9F4D-3B43C74DA463}"/>
+              </a:ext>
+            </a:extLst>
+          </p:cNvPr>
+          <p:cNvSpPr>
+            <a:spLocks noGrp="1"/>
+          </p:cNvSpPr>
+          <p:nvPr>
+            <p:ph idx="1"/>
+          </p:nvPr>
+        </p:nvSpPr>
+        <p:spPr/>
+        <p:txBody>
+          <a:bodyPr/>
+          <a:lstStyle/>
+          <a:p>
+            <a:endParaRPr lang="en-US"/>
+          </a:p>
+        </p:txBody>
+      </p:sp>
+      <p:sp>
+        <p:nvSpPr>
+          <p:cNvPr id="5" name="TextBox 4">
+            <a:extLst>
+              <a:ext uri="{FF2B5EF4-FFF2-40B4-BE49-F238E27FC236}">
+                <a16:creationId xmlns:a16="http://schemas.microsoft.com/office/drawing/2014/main" id="{F9D8EC37-0652-4CB8-D329-4FAB280EF4D1}"/>
+              </a:ext>
+            </a:extLst>
+          </p:cNvPr>
+          <p:cNvSpPr txBox="1"/>
+          <p:nvPr/>
+        </p:nvSpPr>
+        <p:spPr>
+          <a:xfrm>
+            <a:off x="8610600" y="4931765"/>
+            <a:ext cx="3066738" cy="923330"/>
+          </a:xfrm>
+          <a:prstGeom prst="rect">
+            <a:avLst/>
+          </a:prstGeom>
+          <a:noFill/>
+        </p:spPr>
+        <p:txBody>
+          <a:bodyPr wrap="square" rtlCol="0">
+            <a:spAutoFit/>
+          </a:bodyPr>
+          <a:lstStyle/>
+          <a:p>
+            <a:r>
+              <a:rPr lang="en-US" dirty="0"/>
+              <a:t>A bank can take extra steps/scrutiny before giving loan to CA residents</a:t>
+            </a:r>
+          </a:p>
+        </p:txBody>
+      </p:sp>
+      <p:pic>
+        <p:nvPicPr>
+          <p:cNvPr id="3" name="Picture 2">
+            <a:extLst>
+              <a:ext uri="{FF2B5EF4-FFF2-40B4-BE49-F238E27FC236}">
+                <a16:creationId xmlns:a16="http://schemas.microsoft.com/office/drawing/2014/main" id="{591AC3CA-73EE-9EDD-C1F1-39563517D0FE}"/>
+              </a:ext>
+            </a:extLst>
+          </p:cNvPr>
+          <p:cNvPicPr>
+            <a:picLocks noChangeAspect="1"/>
+          </p:cNvPicPr>
+          <p:nvPr/>
+        </p:nvPicPr>
+        <p:blipFill rotWithShape="1">
+          <a:blip r:embed="rId2"/>
+          <a:srcRect l="2483" t="3005"/>
+          <a:stretch/>
+        </p:blipFill>
+        <p:spPr>
+          <a:xfrm>
+            <a:off x="292158" y="292345"/>
+            <a:ext cx="7257738" cy="5806966"/>
+          </a:xfrm>
+          <a:prstGeom prst="rect">
+            <a:avLst/>
+          </a:prstGeom>
+        </p:spPr>
+      </p:pic>
+    </p:spTree>
+    <p:extLst>
+      <p:ext uri="{BB962C8B-B14F-4D97-AF65-F5344CB8AC3E}">
+        <p14:creationId xmlns:p14="http://schemas.microsoft.com/office/powerpoint/2010/main" val="742544243"/>
+      </p:ext>
+    </p:extLst>
+  </p:cSld>
+  <p:clrMapOvr>
+    <a:masterClrMapping/>
+  </p:clrMapOvr>
+</p:sld>
+</file>
+
+<file path=ppt/slides/slide12.xml><?xml version="1.0" encoding="utf-8"?>
+<p:sld xmlns:a="http://schemas.openxmlformats.org/drawingml/2006/main" xmlns:r="http://schemas.openxmlformats.org/officeDocument/2006/relationships" xmlns:p="http://schemas.openxmlformats.org/presentationml/2006/main">
+  <p:cSld>
+    <p:spTree>
+      <p:nvGrpSpPr>
+        <p:cNvPr id="1" name=""/>
+        <p:cNvGrpSpPr/>
+        <p:nvPr/>
+      </p:nvGrpSpPr>
+      <p:grpSpPr>
+        <a:xfrm>
+          <a:off x="0" y="0"/>
+          <a:ext cx="0" cy="0"/>
+          <a:chOff x="0" y="0"/>
+          <a:chExt cx="0" cy="0"/>
+        </a:xfrm>
+      </p:grpSpPr>
+      <p:sp>
+        <p:nvSpPr>
+          <p:cNvPr id="2" name="Title 1">
+            <a:extLst>
+              <a:ext uri="{FF2B5EF4-FFF2-40B4-BE49-F238E27FC236}">
+                <a16:creationId xmlns:a16="http://schemas.microsoft.com/office/drawing/2014/main" id="{5E28134D-6B5F-5844-284E-FAD8B9F06950}"/>
+              </a:ext>
+            </a:extLst>
+          </p:cNvPr>
+          <p:cNvSpPr>
+            <a:spLocks noGrp="1"/>
+          </p:cNvSpPr>
+          <p:nvPr>
+            <p:ph type="title"/>
+          </p:nvPr>
+        </p:nvSpPr>
+        <p:spPr>
+          <a:xfrm>
+            <a:off x="8631836" y="918652"/>
+            <a:ext cx="3420256" cy="3733764"/>
+          </a:xfrm>
+        </p:spPr>
+        <p:txBody>
+          <a:bodyPr>
+            <a:normAutofit/>
+          </a:bodyPr>
+          <a:lstStyle/>
+          <a:p>
+            <a:r>
+              <a:rPr lang="en-US" dirty="0"/>
               <a:t>Based on experience level, Mid level (3-6 years)	 applicants are likely to default more than the rest. </a:t>
             </a:r>
           </a:p>
@@ -4952,7 +8377,7 @@
 </p:sld>
 </file>
 
-<file path=ppt/slides/slide11.xml><?xml version="1.0" encoding="utf-8"?>
+<file path=ppt/slides/slide13.xml><?xml version="1.0" encoding="utf-8"?>
 <p:sld xmlns:a="http://schemas.openxmlformats.org/drawingml/2006/main" xmlns:r="http://schemas.openxmlformats.org/officeDocument/2006/relationships" xmlns:p="http://schemas.openxmlformats.org/presentationml/2006/main">
   <p:cSld>
     <p:spTree>
@@ -5107,7 +8532,7 @@
 </p:sld>
 </file>
 
-<file path=ppt/slides/slide12.xml><?xml version="1.0" encoding="utf-8"?>
+<file path=ppt/slides/slide14.xml><?xml version="1.0" encoding="utf-8"?>
 <p:sld xmlns:a="http://schemas.openxmlformats.org/drawingml/2006/main" xmlns:r="http://schemas.openxmlformats.org/officeDocument/2006/relationships" xmlns:p="http://schemas.openxmlformats.org/presentationml/2006/main">
   <p:cSld>
     <p:spTree>
@@ -5227,7 +8652,7 @@
 </p:sld>
 </file>
 
-<file path=ppt/slides/slide13.xml><?xml version="1.0" encoding="utf-8"?>
+<file path=ppt/slides/slide15.xml><?xml version="1.0" encoding="utf-8"?>
 <p:sld xmlns:a="http://schemas.openxmlformats.org/drawingml/2006/main" xmlns:r="http://schemas.openxmlformats.org/officeDocument/2006/relationships" xmlns:p="http://schemas.openxmlformats.org/presentationml/2006/main">
   <p:cSld>
     <p:spTree>
@@ -5347,7 +8772,7 @@
 </p:sld>
 </file>
 
-<file path=ppt/slides/slide14.xml><?xml version="1.0" encoding="utf-8"?>
+<file path=ppt/slides/slide16.xml><?xml version="1.0" encoding="utf-8"?>
 <p:sld xmlns:a="http://schemas.openxmlformats.org/drawingml/2006/main" xmlns:r="http://schemas.openxmlformats.org/officeDocument/2006/relationships" xmlns:p="http://schemas.openxmlformats.org/presentationml/2006/main">
   <p:cSld>
     <p:spTree>
@@ -5467,7 +8892,7 @@
 </p:sld>
 </file>
 
-<file path=ppt/slides/slide15.xml><?xml version="1.0" encoding="utf-8"?>
+<file path=ppt/slides/slide17.xml><?xml version="1.0" encoding="utf-8"?>
 <p:sld xmlns:a="http://schemas.openxmlformats.org/drawingml/2006/main" xmlns:r="http://schemas.openxmlformats.org/officeDocument/2006/relationships" xmlns:p="http://schemas.openxmlformats.org/presentationml/2006/main">
   <p:cSld>
     <p:spTree>
@@ -5629,7 +9054,7 @@
 </p:sld>
 </file>
 
-<file path=ppt/slides/slide16.xml><?xml version="1.0" encoding="utf-8"?>
+<file path=ppt/slides/slide18.xml><?xml version="1.0" encoding="utf-8"?>
 <p:sld xmlns:a="http://schemas.openxmlformats.org/drawingml/2006/main" xmlns:r="http://schemas.openxmlformats.org/officeDocument/2006/relationships" xmlns:p="http://schemas.openxmlformats.org/presentationml/2006/main">
   <p:cSld>
     <p:spTree>
@@ -5749,7 +9174,7 @@
 </p:sld>
 </file>
 
-<file path=ppt/slides/slide17.xml><?xml version="1.0" encoding="utf-8"?>
+<file path=ppt/slides/slide19.xml><?xml version="1.0" encoding="utf-8"?>
 <p:sld xmlns:a="http://schemas.openxmlformats.org/drawingml/2006/main" xmlns:r="http://schemas.openxmlformats.org/officeDocument/2006/relationships" xmlns:p="http://schemas.openxmlformats.org/presentationml/2006/main">
   <p:cSld>
     <p:spTree>
@@ -5869,7 +9294,244 @@
 </p:sld>
 </file>
 
-<file path=ppt/slides/slide18.xml><?xml version="1.0" encoding="utf-8"?>
+<file path=ppt/slides/slide2.xml><?xml version="1.0" encoding="utf-8"?>
+<p:sld xmlns:a="http://schemas.openxmlformats.org/drawingml/2006/main" xmlns:r="http://schemas.openxmlformats.org/officeDocument/2006/relationships" xmlns:p="http://schemas.openxmlformats.org/presentationml/2006/main">
+  <p:cSld>
+    <p:spTree>
+      <p:nvGrpSpPr>
+        <p:cNvPr id="1" name=""/>
+        <p:cNvGrpSpPr/>
+        <p:nvPr/>
+      </p:nvGrpSpPr>
+      <p:grpSpPr>
+        <a:xfrm>
+          <a:off x="0" y="0"/>
+          <a:ext cx="0" cy="0"/>
+          <a:chOff x="0" y="0"/>
+          <a:chExt cx="0" cy="0"/>
+        </a:xfrm>
+      </p:grpSpPr>
+      <p:sp>
+        <p:nvSpPr>
+          <p:cNvPr id="2" name="Title 1">
+            <a:extLst>
+              <a:ext uri="{FF2B5EF4-FFF2-40B4-BE49-F238E27FC236}">
+                <a16:creationId xmlns:a16="http://schemas.microsoft.com/office/drawing/2014/main" id="{B864CA2A-B001-E918-1549-5C7B52CDBB15}"/>
+              </a:ext>
+            </a:extLst>
+          </p:cNvPr>
+          <p:cNvSpPr>
+            <a:spLocks noGrp="1"/>
+          </p:cNvSpPr>
+          <p:nvPr>
+            <p:ph type="title"/>
+          </p:nvPr>
+        </p:nvSpPr>
+        <p:spPr/>
+        <p:txBody>
+          <a:bodyPr/>
+          <a:lstStyle/>
+          <a:p>
+            <a:r>
+              <a:rPr lang="en-US" dirty="0"/>
+              <a:t>Problem Statement</a:t>
+            </a:r>
+          </a:p>
+        </p:txBody>
+      </p:sp>
+      <p:sp>
+        <p:nvSpPr>
+          <p:cNvPr id="3" name="Content Placeholder 2">
+            <a:extLst>
+              <a:ext uri="{FF2B5EF4-FFF2-40B4-BE49-F238E27FC236}">
+                <a16:creationId xmlns:a16="http://schemas.microsoft.com/office/drawing/2014/main" id="{501DD7EB-AB34-8F7A-045A-2AA4E6027954}"/>
+              </a:ext>
+            </a:extLst>
+          </p:cNvPr>
+          <p:cNvSpPr>
+            <a:spLocks noGrp="1"/>
+          </p:cNvSpPr>
+          <p:nvPr>
+            <p:ph idx="1"/>
+          </p:nvPr>
+        </p:nvSpPr>
+        <p:spPr>
+          <a:xfrm>
+            <a:off x="1069848" y="2121408"/>
+            <a:ext cx="5876384" cy="4050792"/>
+          </a:xfrm>
+        </p:spPr>
+        <p:txBody>
+          <a:bodyPr/>
+          <a:lstStyle/>
+          <a:p>
+            <a:pPr marL="0" indent="0">
+              <a:buNone/>
+            </a:pPr>
+            <a:r>
+              <a:rPr lang="en-IN" i="0" dirty="0">
+                <a:solidFill>
+                  <a:srgbClr val="091E42"/>
+                </a:solidFill>
+                <a:effectLst/>
+                <a:latin typeface="freight-text-pro"/>
+              </a:rPr>
+              <a:t>For a </a:t>
+            </a:r>
+            <a:r>
+              <a:rPr lang="en-IN" b="1" i="0" dirty="0">
+                <a:solidFill>
+                  <a:srgbClr val="091E42"/>
+                </a:solidFill>
+                <a:effectLst/>
+                <a:latin typeface="freight-text-pro"/>
+              </a:rPr>
+              <a:t>consumer finance company </a:t>
+            </a:r>
+            <a:r>
+              <a:rPr lang="en-IN" b="0" i="0" dirty="0">
+                <a:solidFill>
+                  <a:srgbClr val="091E42"/>
+                </a:solidFill>
+                <a:effectLst/>
+                <a:latin typeface="freight-text-pro"/>
+              </a:rPr>
+              <a:t>understand the </a:t>
+            </a:r>
+            <a:r>
+              <a:rPr lang="en-IN" b="1" i="0" dirty="0">
+                <a:solidFill>
+                  <a:srgbClr val="091E42"/>
+                </a:solidFill>
+                <a:effectLst/>
+                <a:latin typeface="freight-text-pro"/>
+              </a:rPr>
+              <a:t>driving factors (or driver variables) </a:t>
+            </a:r>
+            <a:r>
+              <a:rPr lang="en-IN" b="0" i="0" dirty="0">
+                <a:solidFill>
+                  <a:srgbClr val="091E42"/>
+                </a:solidFill>
+                <a:effectLst/>
+                <a:latin typeface="freight-text-pro"/>
+              </a:rPr>
+              <a:t>behind loan default | loan charged off.</a:t>
+            </a:r>
+          </a:p>
+          <a:p>
+            <a:pPr marL="0" indent="0">
+              <a:buNone/>
+            </a:pPr>
+            <a:endParaRPr lang="en-IN" dirty="0">
+              <a:solidFill>
+                <a:srgbClr val="091E42"/>
+              </a:solidFill>
+              <a:latin typeface="freight-text-pro"/>
+            </a:endParaRPr>
+          </a:p>
+          <a:p>
+            <a:pPr marL="0" indent="0">
+              <a:buNone/>
+            </a:pPr>
+            <a:r>
+              <a:rPr lang="en-IN" dirty="0">
+                <a:solidFill>
+                  <a:srgbClr val="091E42"/>
+                </a:solidFill>
+                <a:latin typeface="freight-text-pro"/>
+              </a:rPr>
+              <a:t>Given d</a:t>
+            </a:r>
+            <a:r>
+              <a:rPr lang="en-IN" b="0" i="0" dirty="0">
+                <a:solidFill>
+                  <a:srgbClr val="091E42"/>
+                </a:solidFill>
+                <a:effectLst/>
+                <a:latin typeface="freight-text-pro"/>
+              </a:rPr>
+              <a:t>ataset which contains the complete loan data for all loans issued through the time period 2007 to 2011.</a:t>
+            </a:r>
+          </a:p>
+          <a:p>
+            <a:pPr marL="0" indent="0">
+              <a:buNone/>
+            </a:pPr>
+            <a:r>
+              <a:rPr lang="en-IN" dirty="0">
+                <a:solidFill>
+                  <a:srgbClr val="091E42"/>
+                </a:solidFill>
+                <a:latin typeface="freight-text-pro"/>
+              </a:rPr>
+              <a:t>Each column meanings are defined a given data dictionary.</a:t>
+            </a:r>
+            <a:endParaRPr lang="en-US" dirty="0"/>
+          </a:p>
+        </p:txBody>
+      </p:sp>
+      <p:pic>
+        <p:nvPicPr>
+          <p:cNvPr id="1026" name="Picture 2" descr="300 Credit Score Loans - Saral Credit">
+            <a:extLst>
+              <a:ext uri="{FF2B5EF4-FFF2-40B4-BE49-F238E27FC236}">
+                <a16:creationId xmlns:a16="http://schemas.microsoft.com/office/drawing/2014/main" id="{50B33AAA-2567-CE9D-FF2E-F65B2FAAB528}"/>
+              </a:ext>
+            </a:extLst>
+          </p:cNvPr>
+          <p:cNvPicPr>
+            <a:picLocks noChangeAspect="1" noChangeArrowheads="1"/>
+          </p:cNvPicPr>
+          <p:nvPr/>
+        </p:nvPicPr>
+        <p:blipFill>
+          <a:blip r:embed="rId2">
+            <a:extLst>
+              <a:ext uri="{28A0092B-C50C-407E-A947-70E740481C1C}">
+                <a14:useLocalDpi xmlns:a14="http://schemas.microsoft.com/office/drawing/2010/main" val="0"/>
+              </a:ext>
+            </a:extLst>
+          </a:blip>
+          <a:srcRect/>
+          <a:stretch>
+            <a:fillRect/>
+          </a:stretch>
+        </p:blipFill>
+        <p:spPr bwMode="auto">
+          <a:xfrm>
+            <a:off x="6946232" y="1950975"/>
+            <a:ext cx="5087072" cy="2813050"/>
+          </a:xfrm>
+          <a:prstGeom prst="rect">
+            <a:avLst/>
+          </a:prstGeom>
+          <a:noFill/>
+          <a:extLst>
+            <a:ext uri="{909E8E84-426E-40DD-AFC4-6F175D3DCCD1}">
+              <a14:hiddenFill xmlns:a14="http://schemas.microsoft.com/office/drawing/2010/main">
+                <a:solidFill>
+                  <a:srgbClr val="FFFFFF"/>
+                </a:solidFill>
+              </a14:hiddenFill>
+            </a:ext>
+          </a:extLst>
+        </p:spPr>
+      </p:pic>
+    </p:spTree>
+    <p:extLst>
+      <p:ext uri="{BB962C8B-B14F-4D97-AF65-F5344CB8AC3E}">
+        <p14:creationId xmlns:p14="http://schemas.microsoft.com/office/powerpoint/2010/main" val="851788632"/>
+      </p:ext>
+    </p:extLst>
+  </p:cSld>
+  <p:clrMapOvr>
+    <a:masterClrMapping/>
+  </p:clrMapOvr>
+</p:sld>
+</file>
+
+<file path=ppt/slides/slide20.xml><?xml version="1.0" encoding="utf-8"?>
 <p:sld xmlns:a="http://schemas.openxmlformats.org/drawingml/2006/main" xmlns:r="http://schemas.openxmlformats.org/officeDocument/2006/relationships" xmlns:p="http://schemas.openxmlformats.org/presentationml/2006/main">
   <p:cSld>
     <p:spTree>
@@ -6020,7 +9682,7 @@
 </p:sld>
 </file>
 
-<file path=ppt/slides/slide19.xml><?xml version="1.0" encoding="utf-8"?>
+<file path=ppt/slides/slide21.xml><?xml version="1.0" encoding="utf-8"?>
 <p:sld xmlns:a="http://schemas.openxmlformats.org/drawingml/2006/main" xmlns:r="http://schemas.openxmlformats.org/officeDocument/2006/relationships" xmlns:p="http://schemas.openxmlformats.org/presentationml/2006/main">
   <p:cSld>
     <p:spTree>
@@ -6140,90 +9802,7 @@
 </p:sld>
 </file>
 
-<file path=ppt/slides/slide2.xml><?xml version="1.0" encoding="utf-8"?>
-<p:sld xmlns:a="http://schemas.openxmlformats.org/drawingml/2006/main" xmlns:r="http://schemas.openxmlformats.org/officeDocument/2006/relationships" xmlns:p="http://schemas.openxmlformats.org/presentationml/2006/main">
-  <p:cSld>
-    <p:spTree>
-      <p:nvGrpSpPr>
-        <p:cNvPr id="1" name=""/>
-        <p:cNvGrpSpPr/>
-        <p:nvPr/>
-      </p:nvGrpSpPr>
-      <p:grpSpPr>
-        <a:xfrm>
-          <a:off x="0" y="0"/>
-          <a:ext cx="0" cy="0"/>
-          <a:chOff x="0" y="0"/>
-          <a:chExt cx="0" cy="0"/>
-        </a:xfrm>
-      </p:grpSpPr>
-      <p:sp>
-        <p:nvSpPr>
-          <p:cNvPr id="2" name="Title 1">
-            <a:extLst>
-              <a:ext uri="{FF2B5EF4-FFF2-40B4-BE49-F238E27FC236}">
-                <a16:creationId xmlns:a16="http://schemas.microsoft.com/office/drawing/2014/main" id="{9587873E-309C-EFBA-5A6B-336CECAC87F1}"/>
-              </a:ext>
-            </a:extLst>
-          </p:cNvPr>
-          <p:cNvSpPr>
-            <a:spLocks noGrp="1"/>
-          </p:cNvSpPr>
-          <p:nvPr>
-            <p:ph type="title"/>
-          </p:nvPr>
-        </p:nvSpPr>
-        <p:spPr/>
-        <p:txBody>
-          <a:bodyPr/>
-          <a:lstStyle/>
-          <a:p>
-            <a:r>
-              <a:rPr lang="en-US" dirty="0"/>
-              <a:t>Let us understand the factors which Influence Charged Off</a:t>
-            </a:r>
-          </a:p>
-        </p:txBody>
-      </p:sp>
-      <p:sp>
-        <p:nvSpPr>
-          <p:cNvPr id="3" name="Text Placeholder 2">
-            <a:extLst>
-              <a:ext uri="{FF2B5EF4-FFF2-40B4-BE49-F238E27FC236}">
-                <a16:creationId xmlns:a16="http://schemas.microsoft.com/office/drawing/2014/main" id="{E7ABF87F-D147-993C-4CC7-1FABDBAEC819}"/>
-              </a:ext>
-            </a:extLst>
-          </p:cNvPr>
-          <p:cNvSpPr>
-            <a:spLocks noGrp="1"/>
-          </p:cNvSpPr>
-          <p:nvPr>
-            <p:ph type="body" idx="1"/>
-          </p:nvPr>
-        </p:nvSpPr>
-        <p:spPr/>
-        <p:txBody>
-          <a:bodyPr/>
-          <a:lstStyle/>
-          <a:p>
-            <a:endParaRPr lang="en-US"/>
-          </a:p>
-        </p:txBody>
-      </p:sp>
-    </p:spTree>
-    <p:extLst>
-      <p:ext uri="{BB962C8B-B14F-4D97-AF65-F5344CB8AC3E}">
-        <p14:creationId xmlns:p14="http://schemas.microsoft.com/office/powerpoint/2010/main" val="2713953449"/>
-      </p:ext>
-    </p:extLst>
-  </p:cSld>
-  <p:clrMapOvr>
-    <a:masterClrMapping/>
-  </p:clrMapOvr>
-</p:sld>
-</file>
-
-<file path=ppt/slides/slide20.xml><?xml version="1.0" encoding="utf-8"?>
+<file path=ppt/slides/slide22.xml><?xml version="1.0" encoding="utf-8"?>
 <p:sld xmlns:a="http://schemas.openxmlformats.org/drawingml/2006/main" xmlns:r="http://schemas.openxmlformats.org/officeDocument/2006/relationships" xmlns:p="http://schemas.openxmlformats.org/presentationml/2006/main">
   <p:cSld>
     <p:spTree>
@@ -6343,7 +9922,7 @@
 </p:sld>
 </file>
 
-<file path=ppt/slides/slide21.xml><?xml version="1.0" encoding="utf-8"?>
+<file path=ppt/slides/slide23.xml><?xml version="1.0" encoding="utf-8"?>
 <p:sld xmlns:a="http://schemas.openxmlformats.org/drawingml/2006/main" xmlns:r="http://schemas.openxmlformats.org/officeDocument/2006/relationships" xmlns:p="http://schemas.openxmlformats.org/presentationml/2006/main">
   <p:cSld>
     <p:spTree>
@@ -6470,7 +10049,7 @@
 </p:sld>
 </file>
 
-<file path=ppt/slides/slide22.xml><?xml version="1.0" encoding="utf-8"?>
+<file path=ppt/slides/slide24.xml><?xml version="1.0" encoding="utf-8"?>
 <p:sld xmlns:a="http://schemas.openxmlformats.org/drawingml/2006/main" xmlns:r="http://schemas.openxmlformats.org/officeDocument/2006/relationships" xmlns:p="http://schemas.openxmlformats.org/presentationml/2006/main">
   <p:cSld>
     <p:spTree>
@@ -6590,7 +10169,7 @@
 </p:sld>
 </file>
 
-<file path=ppt/slides/slide23.xml><?xml version="1.0" encoding="utf-8"?>
+<file path=ppt/slides/slide25.xml><?xml version="1.0" encoding="utf-8"?>
 <p:sld xmlns:a="http://schemas.openxmlformats.org/drawingml/2006/main" xmlns:r="http://schemas.openxmlformats.org/officeDocument/2006/relationships" xmlns:p="http://schemas.openxmlformats.org/presentationml/2006/main">
   <p:cSld>
     <p:spTree>
@@ -6710,7 +10289,7 @@
 </p:sld>
 </file>
 
-<file path=ppt/slides/slide24.xml><?xml version="1.0" encoding="utf-8"?>
+<file path=ppt/slides/slide26.xml><?xml version="1.0" encoding="utf-8"?>
 <p:sld xmlns:a="http://schemas.openxmlformats.org/drawingml/2006/main" xmlns:r="http://schemas.openxmlformats.org/officeDocument/2006/relationships" xmlns:p="http://schemas.openxmlformats.org/presentationml/2006/main">
   <p:cSld>
     <p:spTree>
@@ -6830,7 +10409,7 @@
 </p:sld>
 </file>
 
-<file path=ppt/slides/slide25.xml><?xml version="1.0" encoding="utf-8"?>
+<file path=ppt/slides/slide27.xml><?xml version="1.0" encoding="utf-8"?>
 <p:sld xmlns:a="http://schemas.openxmlformats.org/drawingml/2006/main" xmlns:r="http://schemas.openxmlformats.org/officeDocument/2006/relationships" xmlns:p="http://schemas.openxmlformats.org/presentationml/2006/main">
   <p:cSld>
     <p:spTree>
@@ -6966,7 +10545,7 @@
 </p:sld>
 </file>
 
-<file path=ppt/slides/slide26.xml><?xml version="1.0" encoding="utf-8"?>
+<file path=ppt/slides/slide28.xml><?xml version="1.0" encoding="utf-8"?>
 <p:sld xmlns:a="http://schemas.openxmlformats.org/drawingml/2006/main" xmlns:r="http://schemas.openxmlformats.org/officeDocument/2006/relationships" xmlns:p="http://schemas.openxmlformats.org/presentationml/2006/main">
   <p:cSld>
     <p:spTree>
@@ -7115,6 +10694,178 @@
           <p:cNvPr id="2" name="Title 1">
             <a:extLst>
               <a:ext uri="{FF2B5EF4-FFF2-40B4-BE49-F238E27FC236}">
+                <a16:creationId xmlns:a16="http://schemas.microsoft.com/office/drawing/2014/main" id="{B864CA2A-B001-E918-1549-5C7B52CDBB15}"/>
+              </a:ext>
+            </a:extLst>
+          </p:cNvPr>
+          <p:cNvSpPr>
+            <a:spLocks noGrp="1"/>
+          </p:cNvSpPr>
+          <p:nvPr>
+            <p:ph type="title"/>
+          </p:nvPr>
+        </p:nvSpPr>
+        <p:spPr/>
+        <p:txBody>
+          <a:bodyPr/>
+          <a:lstStyle/>
+          <a:p>
+            <a:r>
+              <a:rPr lang="en-US" dirty="0"/>
+              <a:t>Approach</a:t>
+            </a:r>
+          </a:p>
+        </p:txBody>
+      </p:sp>
+      <p:graphicFrame>
+        <p:nvGraphicFramePr>
+          <p:cNvPr id="12" name="Content Placeholder 11">
+            <a:extLst>
+              <a:ext uri="{FF2B5EF4-FFF2-40B4-BE49-F238E27FC236}">
+                <a16:creationId xmlns:a16="http://schemas.microsoft.com/office/drawing/2014/main" id="{0223C0FC-EFAA-360E-271C-02FF95D131DC}"/>
+              </a:ext>
+            </a:extLst>
+          </p:cNvPr>
+          <p:cNvGraphicFramePr>
+            <a:graphicFrameLocks noGrp="1"/>
+          </p:cNvGraphicFramePr>
+          <p:nvPr>
+            <p:ph idx="1"/>
+            <p:extLst>
+              <p:ext uri="{D42A27DB-BD31-4B8C-83A1-F6EECF244321}">
+                <p14:modId xmlns:p14="http://schemas.microsoft.com/office/powerpoint/2010/main" val="4115932969"/>
+              </p:ext>
+            </p:extLst>
+          </p:nvPr>
+        </p:nvGraphicFramePr>
+        <p:xfrm>
+          <a:off x="1069975" y="2120900"/>
+          <a:ext cx="10058400" cy="4051300"/>
+        </p:xfrm>
+        <a:graphic>
+          <a:graphicData uri="http://schemas.openxmlformats.org/drawingml/2006/diagram">
+            <dgm:relIds xmlns:dgm="http://schemas.openxmlformats.org/drawingml/2006/diagram" xmlns:r="http://schemas.openxmlformats.org/officeDocument/2006/relationships" r:dm="rId2" r:lo="rId3" r:qs="rId4" r:cs="rId5"/>
+          </a:graphicData>
+        </a:graphic>
+      </p:graphicFrame>
+    </p:spTree>
+    <p:extLst>
+      <p:ext uri="{BB962C8B-B14F-4D97-AF65-F5344CB8AC3E}">
+        <p14:creationId xmlns:p14="http://schemas.microsoft.com/office/powerpoint/2010/main" val="501518984"/>
+      </p:ext>
+    </p:extLst>
+  </p:cSld>
+  <p:clrMapOvr>
+    <a:masterClrMapping/>
+  </p:clrMapOvr>
+</p:sld>
+</file>
+
+<file path=ppt/slides/slide4.xml><?xml version="1.0" encoding="utf-8"?>
+<p:sld xmlns:a="http://schemas.openxmlformats.org/drawingml/2006/main" xmlns:r="http://schemas.openxmlformats.org/officeDocument/2006/relationships" xmlns:p="http://schemas.openxmlformats.org/presentationml/2006/main">
+  <p:cSld>
+    <p:spTree>
+      <p:nvGrpSpPr>
+        <p:cNvPr id="1" name=""/>
+        <p:cNvGrpSpPr/>
+        <p:nvPr/>
+      </p:nvGrpSpPr>
+      <p:grpSpPr>
+        <a:xfrm>
+          <a:off x="0" y="0"/>
+          <a:ext cx="0" cy="0"/>
+          <a:chOff x="0" y="0"/>
+          <a:chExt cx="0" cy="0"/>
+        </a:xfrm>
+      </p:grpSpPr>
+      <p:sp>
+        <p:nvSpPr>
+          <p:cNvPr id="2" name="Title 1">
+            <a:extLst>
+              <a:ext uri="{FF2B5EF4-FFF2-40B4-BE49-F238E27FC236}">
+                <a16:creationId xmlns:a16="http://schemas.microsoft.com/office/drawing/2014/main" id="{9587873E-309C-EFBA-5A6B-336CECAC87F1}"/>
+              </a:ext>
+            </a:extLst>
+          </p:cNvPr>
+          <p:cNvSpPr>
+            <a:spLocks noGrp="1"/>
+          </p:cNvSpPr>
+          <p:nvPr>
+            <p:ph type="title"/>
+          </p:nvPr>
+        </p:nvSpPr>
+        <p:spPr/>
+        <p:txBody>
+          <a:bodyPr/>
+          <a:lstStyle/>
+          <a:p>
+            <a:r>
+              <a:rPr lang="en-US" dirty="0"/>
+              <a:t>Let us understand the factors which Influence Charged Off</a:t>
+            </a:r>
+          </a:p>
+        </p:txBody>
+      </p:sp>
+      <p:sp>
+        <p:nvSpPr>
+          <p:cNvPr id="3" name="Text Placeholder 2">
+            <a:extLst>
+              <a:ext uri="{FF2B5EF4-FFF2-40B4-BE49-F238E27FC236}">
+                <a16:creationId xmlns:a16="http://schemas.microsoft.com/office/drawing/2014/main" id="{E7ABF87F-D147-993C-4CC7-1FABDBAEC819}"/>
+              </a:ext>
+            </a:extLst>
+          </p:cNvPr>
+          <p:cNvSpPr>
+            <a:spLocks noGrp="1"/>
+          </p:cNvSpPr>
+          <p:nvPr>
+            <p:ph type="body" idx="1"/>
+          </p:nvPr>
+        </p:nvSpPr>
+        <p:spPr/>
+        <p:txBody>
+          <a:bodyPr/>
+          <a:lstStyle/>
+          <a:p>
+            <a:endParaRPr lang="en-US"/>
+          </a:p>
+        </p:txBody>
+      </p:sp>
+    </p:spTree>
+    <p:extLst>
+      <p:ext uri="{BB962C8B-B14F-4D97-AF65-F5344CB8AC3E}">
+        <p14:creationId xmlns:p14="http://schemas.microsoft.com/office/powerpoint/2010/main" val="2713953449"/>
+      </p:ext>
+    </p:extLst>
+  </p:cSld>
+  <p:clrMapOvr>
+    <a:masterClrMapping/>
+  </p:clrMapOvr>
+</p:sld>
+</file>
+
+<file path=ppt/slides/slide5.xml><?xml version="1.0" encoding="utf-8"?>
+<p:sld xmlns:a="http://schemas.openxmlformats.org/drawingml/2006/main" xmlns:r="http://schemas.openxmlformats.org/officeDocument/2006/relationships" xmlns:p="http://schemas.openxmlformats.org/presentationml/2006/main">
+  <p:cSld>
+    <p:spTree>
+      <p:nvGrpSpPr>
+        <p:cNvPr id="1" name=""/>
+        <p:cNvGrpSpPr/>
+        <p:nvPr/>
+      </p:nvGrpSpPr>
+      <p:grpSpPr>
+        <a:xfrm>
+          <a:off x="0" y="0"/>
+          <a:ext cx="0" cy="0"/>
+          <a:chOff x="0" y="0"/>
+          <a:chExt cx="0" cy="0"/>
+        </a:xfrm>
+      </p:grpSpPr>
+      <p:sp>
+        <p:nvSpPr>
+          <p:cNvPr id="2" name="Title 1">
+            <a:extLst>
+              <a:ext uri="{FF2B5EF4-FFF2-40B4-BE49-F238E27FC236}">
                 <a16:creationId xmlns:a16="http://schemas.microsoft.com/office/drawing/2014/main" id="{5E28134D-6B5F-5844-284E-FAD8B9F06950}"/>
               </a:ext>
             </a:extLst>
@@ -7190,7 +10941,7 @@
 </p:sld>
 </file>
 
-<file path=ppt/slides/slide4.xml><?xml version="1.0" encoding="utf-8"?>
+<file path=ppt/slides/slide6.xml><?xml version="1.0" encoding="utf-8"?>
 <p:sld xmlns:a="http://schemas.openxmlformats.org/drawingml/2006/main" xmlns:r="http://schemas.openxmlformats.org/officeDocument/2006/relationships" xmlns:p="http://schemas.openxmlformats.org/presentationml/2006/main">
   <p:cSld>
     <p:spTree>
@@ -7310,7 +11061,7 @@
 </p:sld>
 </file>
 
-<file path=ppt/slides/slide5.xml><?xml version="1.0" encoding="utf-8"?>
+<file path=ppt/slides/slide7.xml><?xml version="1.0" encoding="utf-8"?>
 <p:sld xmlns:a="http://schemas.openxmlformats.org/drawingml/2006/main" xmlns:r="http://schemas.openxmlformats.org/officeDocument/2006/relationships" xmlns:p="http://schemas.openxmlformats.org/presentationml/2006/main">
   <p:cSld>
     <p:spTree>
@@ -7465,7 +11216,7 @@
 </p:sld>
 </file>
 
-<file path=ppt/slides/slide6.xml><?xml version="1.0" encoding="utf-8"?>
+<file path=ppt/slides/slide8.xml><?xml version="1.0" encoding="utf-8"?>
 <p:sld xmlns:a="http://schemas.openxmlformats.org/drawingml/2006/main" xmlns:r="http://schemas.openxmlformats.org/officeDocument/2006/relationships" xmlns:p="http://schemas.openxmlformats.org/presentationml/2006/main">
   <p:cSld>
     <p:spTree>
@@ -7620,7 +11371,7 @@
 </p:sld>
 </file>
 
-<file path=ppt/slides/slide7.xml><?xml version="1.0" encoding="utf-8"?>
+<file path=ppt/slides/slide9.xml><?xml version="1.0" encoding="utf-8"?>
 <p:sld xmlns:a="http://schemas.openxmlformats.org/drawingml/2006/main" xmlns:r="http://schemas.openxmlformats.org/officeDocument/2006/relationships" xmlns:p="http://schemas.openxmlformats.org/presentationml/2006/main">
   <p:cSld>
     <p:spTree>
@@ -7766,315 +11517,6 @@
     <p:extLst>
       <p:ext uri="{BB962C8B-B14F-4D97-AF65-F5344CB8AC3E}">
         <p14:creationId xmlns:p14="http://schemas.microsoft.com/office/powerpoint/2010/main" val="1686610633"/>
-      </p:ext>
-    </p:extLst>
-  </p:cSld>
-  <p:clrMapOvr>
-    <a:masterClrMapping/>
-  </p:clrMapOvr>
-</p:sld>
-</file>
-
-<file path=ppt/slides/slide8.xml><?xml version="1.0" encoding="utf-8"?>
-<p:sld xmlns:a="http://schemas.openxmlformats.org/drawingml/2006/main" xmlns:r="http://schemas.openxmlformats.org/officeDocument/2006/relationships" xmlns:p="http://schemas.openxmlformats.org/presentationml/2006/main">
-  <p:cSld>
-    <p:spTree>
-      <p:nvGrpSpPr>
-        <p:cNvPr id="1" name=""/>
-        <p:cNvGrpSpPr/>
-        <p:nvPr/>
-      </p:nvGrpSpPr>
-      <p:grpSpPr>
-        <a:xfrm>
-          <a:off x="0" y="0"/>
-          <a:ext cx="0" cy="0"/>
-          <a:chOff x="0" y="0"/>
-          <a:chExt cx="0" cy="0"/>
-        </a:xfrm>
-      </p:grpSpPr>
-      <p:sp>
-        <p:nvSpPr>
-          <p:cNvPr id="2" name="Title 1">
-            <a:extLst>
-              <a:ext uri="{FF2B5EF4-FFF2-40B4-BE49-F238E27FC236}">
-                <a16:creationId xmlns:a16="http://schemas.microsoft.com/office/drawing/2014/main" id="{5E28134D-6B5F-5844-284E-FAD8B9F06950}"/>
-              </a:ext>
-            </a:extLst>
-          </p:cNvPr>
-          <p:cNvSpPr>
-            <a:spLocks noGrp="1"/>
-          </p:cNvSpPr>
-          <p:nvPr>
-            <p:ph type="title"/>
-          </p:nvPr>
-        </p:nvSpPr>
-        <p:spPr>
-          <a:xfrm>
-            <a:off x="8631836" y="918652"/>
-            <a:ext cx="3420256" cy="3733764"/>
-          </a:xfrm>
-        </p:spPr>
-        <p:txBody>
-          <a:bodyPr>
-            <a:normAutofit/>
-          </a:bodyPr>
-          <a:lstStyle/>
-          <a:p>
-            <a:r>
-              <a:rPr lang="en-US" dirty="0"/>
-              <a:t>Applicant’s verification status if Not verified, then most changes for defaulting</a:t>
-            </a:r>
-          </a:p>
-        </p:txBody>
-      </p:sp>
-      <p:sp>
-        <p:nvSpPr>
-          <p:cNvPr id="4" name="Content Placeholder 3">
-            <a:extLst>
-              <a:ext uri="{FF2B5EF4-FFF2-40B4-BE49-F238E27FC236}">
-                <a16:creationId xmlns:a16="http://schemas.microsoft.com/office/drawing/2014/main" id="{0DCB427B-AEC3-94A2-9F4D-3B43C74DA463}"/>
-              </a:ext>
-            </a:extLst>
-          </p:cNvPr>
-          <p:cNvSpPr>
-            <a:spLocks noGrp="1"/>
-          </p:cNvSpPr>
-          <p:nvPr>
-            <p:ph idx="1"/>
-          </p:nvPr>
-        </p:nvSpPr>
-        <p:spPr/>
-        <p:txBody>
-          <a:bodyPr/>
-          <a:lstStyle/>
-          <a:p>
-            <a:endParaRPr lang="en-US"/>
-          </a:p>
-        </p:txBody>
-      </p:sp>
-      <p:sp>
-        <p:nvSpPr>
-          <p:cNvPr id="5" name="TextBox 4">
-            <a:extLst>
-              <a:ext uri="{FF2B5EF4-FFF2-40B4-BE49-F238E27FC236}">
-                <a16:creationId xmlns:a16="http://schemas.microsoft.com/office/drawing/2014/main" id="{F9D8EC37-0652-4CB8-D329-4FAB280EF4D1}"/>
-              </a:ext>
-            </a:extLst>
-          </p:cNvPr>
-          <p:cNvSpPr txBox="1"/>
-          <p:nvPr/>
-        </p:nvSpPr>
-        <p:spPr>
-          <a:xfrm>
-            <a:off x="8610600" y="4931765"/>
-            <a:ext cx="3066738" cy="923330"/>
-          </a:xfrm>
-          <a:prstGeom prst="rect">
-            <a:avLst/>
-          </a:prstGeom>
-          <a:noFill/>
-        </p:spPr>
-        <p:txBody>
-          <a:bodyPr wrap="square" rtlCol="0">
-            <a:spAutoFit/>
-          </a:bodyPr>
-          <a:lstStyle/>
-          <a:p>
-            <a:r>
-              <a:rPr lang="en-US" dirty="0"/>
-              <a:t>A bank may consider Source Verified over Verified/Not Verified</a:t>
-            </a:r>
-          </a:p>
-        </p:txBody>
-      </p:sp>
-      <p:pic>
-        <p:nvPicPr>
-          <p:cNvPr id="6" name="Picture 5">
-            <a:extLst>
-              <a:ext uri="{FF2B5EF4-FFF2-40B4-BE49-F238E27FC236}">
-                <a16:creationId xmlns:a16="http://schemas.microsoft.com/office/drawing/2014/main" id="{555044DB-4823-BF43-FC73-3982E70D89F9}"/>
-              </a:ext>
-            </a:extLst>
-          </p:cNvPr>
-          <p:cNvPicPr>
-            <a:picLocks noChangeAspect="1"/>
-          </p:cNvPicPr>
-          <p:nvPr/>
-        </p:nvPicPr>
-        <p:blipFill>
-          <a:blip r:embed="rId2"/>
-          <a:stretch>
-            <a:fillRect/>
-          </a:stretch>
-        </p:blipFill>
-        <p:spPr>
-          <a:xfrm>
-            <a:off x="382927" y="172387"/>
-            <a:ext cx="7166969" cy="6513226"/>
-          </a:xfrm>
-          <a:prstGeom prst="rect">
-            <a:avLst/>
-          </a:prstGeom>
-        </p:spPr>
-      </p:pic>
-    </p:spTree>
-    <p:extLst>
-      <p:ext uri="{BB962C8B-B14F-4D97-AF65-F5344CB8AC3E}">
-        <p14:creationId xmlns:p14="http://schemas.microsoft.com/office/powerpoint/2010/main" val="3061500286"/>
-      </p:ext>
-    </p:extLst>
-  </p:cSld>
-  <p:clrMapOvr>
-    <a:masterClrMapping/>
-  </p:clrMapOvr>
-</p:sld>
-</file>
-
-<file path=ppt/slides/slide9.xml><?xml version="1.0" encoding="utf-8"?>
-<p:sld xmlns:a="http://schemas.openxmlformats.org/drawingml/2006/main" xmlns:r="http://schemas.openxmlformats.org/officeDocument/2006/relationships" xmlns:p="http://schemas.openxmlformats.org/presentationml/2006/main">
-  <p:cSld>
-    <p:spTree>
-      <p:nvGrpSpPr>
-        <p:cNvPr id="1" name=""/>
-        <p:cNvGrpSpPr/>
-        <p:nvPr/>
-      </p:nvGrpSpPr>
-      <p:grpSpPr>
-        <a:xfrm>
-          <a:off x="0" y="0"/>
-          <a:ext cx="0" cy="0"/>
-          <a:chOff x="0" y="0"/>
-          <a:chExt cx="0" cy="0"/>
-        </a:xfrm>
-      </p:grpSpPr>
-      <p:sp>
-        <p:nvSpPr>
-          <p:cNvPr id="2" name="Title 1">
-            <a:extLst>
-              <a:ext uri="{FF2B5EF4-FFF2-40B4-BE49-F238E27FC236}">
-                <a16:creationId xmlns:a16="http://schemas.microsoft.com/office/drawing/2014/main" id="{5E28134D-6B5F-5844-284E-FAD8B9F06950}"/>
-              </a:ext>
-            </a:extLst>
-          </p:cNvPr>
-          <p:cNvSpPr>
-            <a:spLocks noGrp="1"/>
-          </p:cNvSpPr>
-          <p:nvPr>
-            <p:ph type="title"/>
-          </p:nvPr>
-        </p:nvSpPr>
-        <p:spPr>
-          <a:xfrm>
-            <a:off x="8631836" y="918652"/>
-            <a:ext cx="3420256" cy="3733764"/>
-          </a:xfrm>
-        </p:spPr>
-        <p:txBody>
-          <a:bodyPr>
-            <a:normAutofit/>
-          </a:bodyPr>
-          <a:lstStyle/>
-          <a:p>
-            <a:r>
-              <a:rPr lang="en-US" dirty="0"/>
-              <a:t>Applicants’ probability of defaulting is high if he/she is from California state</a:t>
-            </a:r>
-          </a:p>
-        </p:txBody>
-      </p:sp>
-      <p:sp>
-        <p:nvSpPr>
-          <p:cNvPr id="4" name="Content Placeholder 3">
-            <a:extLst>
-              <a:ext uri="{FF2B5EF4-FFF2-40B4-BE49-F238E27FC236}">
-                <a16:creationId xmlns:a16="http://schemas.microsoft.com/office/drawing/2014/main" id="{0DCB427B-AEC3-94A2-9F4D-3B43C74DA463}"/>
-              </a:ext>
-            </a:extLst>
-          </p:cNvPr>
-          <p:cNvSpPr>
-            <a:spLocks noGrp="1"/>
-          </p:cNvSpPr>
-          <p:nvPr>
-            <p:ph idx="1"/>
-          </p:nvPr>
-        </p:nvSpPr>
-        <p:spPr/>
-        <p:txBody>
-          <a:bodyPr/>
-          <a:lstStyle/>
-          <a:p>
-            <a:endParaRPr lang="en-US"/>
-          </a:p>
-        </p:txBody>
-      </p:sp>
-      <p:sp>
-        <p:nvSpPr>
-          <p:cNvPr id="5" name="TextBox 4">
-            <a:extLst>
-              <a:ext uri="{FF2B5EF4-FFF2-40B4-BE49-F238E27FC236}">
-                <a16:creationId xmlns:a16="http://schemas.microsoft.com/office/drawing/2014/main" id="{F9D8EC37-0652-4CB8-D329-4FAB280EF4D1}"/>
-              </a:ext>
-            </a:extLst>
-          </p:cNvPr>
-          <p:cNvSpPr txBox="1"/>
-          <p:nvPr/>
-        </p:nvSpPr>
-        <p:spPr>
-          <a:xfrm>
-            <a:off x="8610600" y="4931765"/>
-            <a:ext cx="3066738" cy="923330"/>
-          </a:xfrm>
-          <a:prstGeom prst="rect">
-            <a:avLst/>
-          </a:prstGeom>
-          <a:noFill/>
-        </p:spPr>
-        <p:txBody>
-          <a:bodyPr wrap="square" rtlCol="0">
-            <a:spAutoFit/>
-          </a:bodyPr>
-          <a:lstStyle/>
-          <a:p>
-            <a:r>
-              <a:rPr lang="en-US" dirty="0"/>
-              <a:t>A bank can take extra steps/scrutiny before giving loan to CA residents</a:t>
-            </a:r>
-          </a:p>
-        </p:txBody>
-      </p:sp>
-      <p:pic>
-        <p:nvPicPr>
-          <p:cNvPr id="3" name="Picture 2">
-            <a:extLst>
-              <a:ext uri="{FF2B5EF4-FFF2-40B4-BE49-F238E27FC236}">
-                <a16:creationId xmlns:a16="http://schemas.microsoft.com/office/drawing/2014/main" id="{591AC3CA-73EE-9EDD-C1F1-39563517D0FE}"/>
-              </a:ext>
-            </a:extLst>
-          </p:cNvPr>
-          <p:cNvPicPr>
-            <a:picLocks noChangeAspect="1"/>
-          </p:cNvPicPr>
-          <p:nvPr/>
-        </p:nvPicPr>
-        <p:blipFill rotWithShape="1">
-          <a:blip r:embed="rId2"/>
-          <a:srcRect l="2483" t="3005"/>
-          <a:stretch/>
-        </p:blipFill>
-        <p:spPr>
-          <a:xfrm>
-            <a:off x="292158" y="292345"/>
-            <a:ext cx="7257738" cy="5806966"/>
-          </a:xfrm>
-          <a:prstGeom prst="rect">
-            <a:avLst/>
-          </a:prstGeom>
-        </p:spPr>
-      </p:pic>
-    </p:spTree>
-    <p:extLst>
-      <p:ext uri="{BB962C8B-B14F-4D97-AF65-F5344CB8AC3E}">
-        <p14:creationId xmlns:p14="http://schemas.microsoft.com/office/powerpoint/2010/main" val="742544243"/>
       </p:ext>
     </p:extLst>
   </p:cSld>

</xml_diff>